<commit_message>
Add menu to load gpx file by user selection
</commit_message>
<xml_diff>
--- a/gui_design.pptx
+++ b/gui_design.pptx
@@ -3475,6 +3475,53 @@
           </a:p>
         </p:txBody>
       </p:sp>
+      <p:pic>
+        <p:nvPicPr>
+          <p:cNvPr id="1026" name="Picture 2" descr="Rendered Image">
+            <a:extLst>
+              <a:ext uri="{FF2B5EF4-FFF2-40B4-BE49-F238E27FC236}">
+                <a16:creationId xmlns:a16="http://schemas.microsoft.com/office/drawing/2014/main" id="{099DD11F-49EC-4EF6-87E6-604BF4F4D178}"/>
+              </a:ext>
+            </a:extLst>
+          </p:cNvPr>
+          <p:cNvPicPr>
+            <a:picLocks noChangeAspect="1" noChangeArrowheads="1"/>
+          </p:cNvPicPr>
+          <p:nvPr/>
+        </p:nvPicPr>
+        <p:blipFill>
+          <a:blip r:embed="rId4">
+            <a:extLst>
+              <a:ext uri="{28A0092B-C50C-407E-A947-70E740481C1C}">
+                <a14:useLocalDpi xmlns:a14="http://schemas.microsoft.com/office/drawing/2010/main" val="0"/>
+              </a:ext>
+            </a:extLst>
+          </a:blip>
+          <a:srcRect/>
+          <a:stretch>
+            <a:fillRect/>
+          </a:stretch>
+        </p:blipFill>
+        <p:spPr bwMode="auto">
+          <a:xfrm>
+            <a:off x="598240" y="5134504"/>
+            <a:ext cx="2019300" cy="1057275"/>
+          </a:xfrm>
+          <a:prstGeom prst="rect">
+            <a:avLst/>
+          </a:prstGeom>
+          <a:noFill/>
+          <a:extLst>
+            <a:ext uri="{909E8E84-426E-40DD-AFC4-6F175D3DCCD1}">
+              <a14:hiddenFill xmlns:a14="http://schemas.microsoft.com/office/drawing/2010/main">
+                <a:solidFill>
+                  <a:srgbClr val="FFFFFF"/>
+                </a:solidFill>
+              </a14:hiddenFill>
+            </a:ext>
+          </a:extLst>
+        </p:spPr>
+      </p:pic>
     </p:spTree>
     <p:extLst>
       <p:ext uri="{BB962C8B-B14F-4D97-AF65-F5344CB8AC3E}">
@@ -3766,6 +3813,53 @@
           </a:p>
         </p:txBody>
       </p:sp>
+      <p:pic>
+        <p:nvPicPr>
+          <p:cNvPr id="10" name="Picture 2" descr="Rendered Image">
+            <a:extLst>
+              <a:ext uri="{FF2B5EF4-FFF2-40B4-BE49-F238E27FC236}">
+                <a16:creationId xmlns:a16="http://schemas.microsoft.com/office/drawing/2014/main" id="{EDC6CD28-258B-4868-8223-C78FF2DC30B2}"/>
+              </a:ext>
+            </a:extLst>
+          </p:cNvPr>
+          <p:cNvPicPr>
+            <a:picLocks noChangeAspect="1" noChangeArrowheads="1"/>
+          </p:cNvPicPr>
+          <p:nvPr/>
+        </p:nvPicPr>
+        <p:blipFill>
+          <a:blip r:embed="rId4">
+            <a:extLst>
+              <a:ext uri="{28A0092B-C50C-407E-A947-70E740481C1C}">
+                <a14:useLocalDpi xmlns:a14="http://schemas.microsoft.com/office/drawing/2010/main" val="0"/>
+              </a:ext>
+            </a:extLst>
+          </a:blip>
+          <a:srcRect/>
+          <a:stretch>
+            <a:fillRect/>
+          </a:stretch>
+        </p:blipFill>
+        <p:spPr bwMode="auto">
+          <a:xfrm>
+            <a:off x="598240" y="5134504"/>
+            <a:ext cx="2019300" cy="1057275"/>
+          </a:xfrm>
+          <a:prstGeom prst="rect">
+            <a:avLst/>
+          </a:prstGeom>
+          <a:noFill/>
+          <a:extLst>
+            <a:ext uri="{909E8E84-426E-40DD-AFC4-6F175D3DCCD1}">
+              <a14:hiddenFill xmlns:a14="http://schemas.microsoft.com/office/drawing/2010/main">
+                <a:solidFill>
+                  <a:srgbClr val="FFFFFF"/>
+                </a:solidFill>
+              </a14:hiddenFill>
+            </a:ext>
+          </a:extLst>
+        </p:spPr>
+      </p:pic>
     </p:spTree>
     <p:extLst>
       <p:ext uri="{BB962C8B-B14F-4D97-AF65-F5344CB8AC3E}">
@@ -4168,6 +4262,53 @@
           </a:p>
         </p:txBody>
       </p:sp>
+      <p:pic>
+        <p:nvPicPr>
+          <p:cNvPr id="2050" name="Picture 2" descr="Rendered Image">
+            <a:extLst>
+              <a:ext uri="{FF2B5EF4-FFF2-40B4-BE49-F238E27FC236}">
+                <a16:creationId xmlns:a16="http://schemas.microsoft.com/office/drawing/2014/main" id="{64895D16-E4AE-4981-93D4-38061FEC891D}"/>
+              </a:ext>
+            </a:extLst>
+          </p:cNvPr>
+          <p:cNvPicPr>
+            <a:picLocks noChangeAspect="1" noChangeArrowheads="1"/>
+          </p:cNvPicPr>
+          <p:nvPr/>
+        </p:nvPicPr>
+        <p:blipFill>
+          <a:blip r:embed="rId4">
+            <a:extLst>
+              <a:ext uri="{28A0092B-C50C-407E-A947-70E740481C1C}">
+                <a14:useLocalDpi xmlns:a14="http://schemas.microsoft.com/office/drawing/2010/main" val="0"/>
+              </a:ext>
+            </a:extLst>
+          </a:blip>
+          <a:srcRect/>
+          <a:stretch>
+            <a:fillRect/>
+          </a:stretch>
+        </p:blipFill>
+        <p:spPr bwMode="auto">
+          <a:xfrm>
+            <a:off x="324331" y="5331161"/>
+            <a:ext cx="2181225" cy="809625"/>
+          </a:xfrm>
+          <a:prstGeom prst="rect">
+            <a:avLst/>
+          </a:prstGeom>
+          <a:noFill/>
+          <a:extLst>
+            <a:ext uri="{909E8E84-426E-40DD-AFC4-6F175D3DCCD1}">
+              <a14:hiddenFill xmlns:a14="http://schemas.microsoft.com/office/drawing/2010/main">
+                <a:solidFill>
+                  <a:srgbClr val="FFFFFF"/>
+                </a:solidFill>
+              </a14:hiddenFill>
+            </a:ext>
+          </a:extLst>
+        </p:spPr>
+      </p:pic>
     </p:spTree>
     <p:extLst>
       <p:ext uri="{BB962C8B-B14F-4D97-AF65-F5344CB8AC3E}">
@@ -4713,6 +4854,53 @@
           </p:txBody>
         </p:sp>
       </p:grpSp>
+      <p:pic>
+        <p:nvPicPr>
+          <p:cNvPr id="15" name="Picture 2" descr="Rendered Image">
+            <a:extLst>
+              <a:ext uri="{FF2B5EF4-FFF2-40B4-BE49-F238E27FC236}">
+                <a16:creationId xmlns:a16="http://schemas.microsoft.com/office/drawing/2014/main" id="{7B2E289B-43CF-4B37-97C5-425FBF055A8C}"/>
+              </a:ext>
+            </a:extLst>
+          </p:cNvPr>
+          <p:cNvPicPr>
+            <a:picLocks noChangeAspect="1" noChangeArrowheads="1"/>
+          </p:cNvPicPr>
+          <p:nvPr/>
+        </p:nvPicPr>
+        <p:blipFill>
+          <a:blip r:embed="rId4">
+            <a:extLst>
+              <a:ext uri="{28A0092B-C50C-407E-A947-70E740481C1C}">
+                <a14:useLocalDpi xmlns:a14="http://schemas.microsoft.com/office/drawing/2010/main" val="0"/>
+              </a:ext>
+            </a:extLst>
+          </a:blip>
+          <a:srcRect/>
+          <a:stretch>
+            <a:fillRect/>
+          </a:stretch>
+        </p:blipFill>
+        <p:spPr bwMode="auto">
+          <a:xfrm>
+            <a:off x="324331" y="5331161"/>
+            <a:ext cx="2181225" cy="809625"/>
+          </a:xfrm>
+          <a:prstGeom prst="rect">
+            <a:avLst/>
+          </a:prstGeom>
+          <a:noFill/>
+          <a:extLst>
+            <a:ext uri="{909E8E84-426E-40DD-AFC4-6F175D3DCCD1}">
+              <a14:hiddenFill xmlns:a14="http://schemas.microsoft.com/office/drawing/2010/main">
+                <a:solidFill>
+                  <a:srgbClr val="FFFFFF"/>
+                </a:solidFill>
+              </a14:hiddenFill>
+            </a:ext>
+          </a:extLst>
+        </p:spPr>
+      </p:pic>
     </p:spTree>
     <p:extLst>
       <p:ext uri="{BB962C8B-B14F-4D97-AF65-F5344CB8AC3E}">

</xml_diff>

<commit_message>
Load several gpx files
</commit_message>
<xml_diff>
--- a/gui_design.pptx
+++ b/gui_design.pptx
@@ -8,7 +8,8 @@
     <p:sldId id="256" r:id="rId2"/>
     <p:sldId id="259" r:id="rId3"/>
     <p:sldId id="257" r:id="rId4"/>
-    <p:sldId id="258" r:id="rId5"/>
+    <p:sldId id="260" r:id="rId5"/>
+    <p:sldId id="258" r:id="rId6"/>
   </p:sldIdLst>
   <p:sldSz cx="12192000" cy="6858000"/>
   <p:notesSz cx="6858000" cy="9144000"/>
@@ -3965,7 +3966,7 @@
         <p:spPr>
           <a:xfrm>
             <a:off x="8783273" y="234892"/>
-            <a:ext cx="3087149" cy="1200329"/>
+            <a:ext cx="3087149" cy="1477328"/>
           </a:xfrm>
           <a:prstGeom prst="rect">
             <a:avLst/>
@@ -4000,13 +4001,35 @@
             </a:pPr>
             <a:r>
               <a:rPr lang="es-ES" dirty="0"/>
-              <a:t>Zoom </a:t>
+              <a:t>Load </a:t>
             </a:r>
             <a:r>
               <a:rPr lang="es-ES" dirty="0" err="1"/>
-              <a:t>management</a:t>
+              <a:t>multiple</a:t>
+            </a:r>
+            <a:r>
+              <a:rPr lang="es-ES" dirty="0"/>
+              <a:t> </a:t>
+            </a:r>
+            <a:r>
+              <a:rPr lang="es-ES" dirty="0" err="1"/>
+              <a:t>tracks</a:t>
             </a:r>
             <a:endParaRPr lang="es-ES" dirty="0"/>
+          </a:p>
+          <a:p>
+            <a:pPr marL="285750" indent="-285750">
+              <a:buFontTx/>
+              <a:buChar char="-"/>
+            </a:pPr>
+            <a:r>
+              <a:rPr lang="es-ES" dirty="0" err="1"/>
+              <a:t>Refactor</a:t>
+            </a:r>
+            <a:r>
+              <a:rPr lang="es-ES" dirty="0"/>
+              <a:t> GUI</a:t>
+            </a:r>
           </a:p>
           <a:p>
             <a:endParaRPr lang="es-ES" dirty="0"/>
@@ -4401,10 +4424,184 @@
       </p:pic>
       <p:sp>
         <p:nvSpPr>
+          <p:cNvPr id="14" name="CuadroTexto 13">
+            <a:extLst>
+              <a:ext uri="{FF2B5EF4-FFF2-40B4-BE49-F238E27FC236}">
+                <a16:creationId xmlns:a16="http://schemas.microsoft.com/office/drawing/2014/main" id="{141CAC72-0D93-49C6-8913-A7593E1C4044}"/>
+              </a:ext>
+            </a:extLst>
+          </p:cNvPr>
+          <p:cNvSpPr txBox="1"/>
+          <p:nvPr/>
+        </p:nvSpPr>
+        <p:spPr>
+          <a:xfrm>
+            <a:off x="8783273" y="234892"/>
+            <a:ext cx="3087149" cy="1200329"/>
+          </a:xfrm>
+          <a:prstGeom prst="rect">
+            <a:avLst/>
+          </a:prstGeom>
+          <a:noFill/>
+        </p:spPr>
+        <p:txBody>
+          <a:bodyPr wrap="square" rtlCol="0">
+            <a:spAutoFit/>
+          </a:bodyPr>
+          <a:lstStyle/>
+          <a:p>
+            <a:r>
+              <a:rPr lang="es-ES" dirty="0"/>
+              <a:t>Notes:</a:t>
+            </a:r>
+          </a:p>
+          <a:p>
+            <a:pPr marL="285750" indent="-285750">
+              <a:buFontTx/>
+              <a:buChar char="-"/>
+            </a:pPr>
+            <a:r>
+              <a:rPr lang="es-ES" dirty="0"/>
+              <a:t>V00.03</a:t>
+            </a:r>
+          </a:p>
+          <a:p>
+            <a:pPr marL="285750" indent="-285750">
+              <a:buFontTx/>
+              <a:buChar char="-"/>
+            </a:pPr>
+            <a:r>
+              <a:rPr lang="es-ES" dirty="0"/>
+              <a:t>Zoom </a:t>
+            </a:r>
+            <a:r>
+              <a:rPr lang="es-ES" dirty="0" err="1"/>
+              <a:t>management</a:t>
+            </a:r>
+            <a:endParaRPr lang="es-ES" dirty="0"/>
+          </a:p>
+          <a:p>
+            <a:endParaRPr lang="es-ES" dirty="0"/>
+          </a:p>
+        </p:txBody>
+      </p:sp>
+      <p:grpSp>
+        <p:nvGrpSpPr>
+          <p:cNvPr id="18" name="Grupo 17">
+            <a:extLst>
+              <a:ext uri="{FF2B5EF4-FFF2-40B4-BE49-F238E27FC236}">
+                <a16:creationId xmlns:a16="http://schemas.microsoft.com/office/drawing/2014/main" id="{CE082FDB-5094-4F0F-8661-7B8640501D0A}"/>
+              </a:ext>
+            </a:extLst>
+          </p:cNvPr>
+          <p:cNvGrpSpPr/>
+          <p:nvPr/>
+        </p:nvGrpSpPr>
+        <p:grpSpPr>
+          <a:xfrm>
+            <a:off x="7945770" y="3897247"/>
+            <a:ext cx="267052" cy="615554"/>
+            <a:chOff x="8851781" y="2520917"/>
+            <a:chExt cx="267052" cy="615554"/>
+          </a:xfrm>
+        </p:grpSpPr>
+        <p:sp>
+          <p:nvSpPr>
+            <p:cNvPr id="16" name="CuadroTexto 15">
+              <a:extLst>
+                <a:ext uri="{FF2B5EF4-FFF2-40B4-BE49-F238E27FC236}">
+                  <a16:creationId xmlns:a16="http://schemas.microsoft.com/office/drawing/2014/main" id="{19713EAB-5261-4665-91F7-2DFD19C8A273}"/>
+                </a:ext>
+              </a:extLst>
+            </p:cNvPr>
+            <p:cNvSpPr txBox="1"/>
+            <p:nvPr/>
+          </p:nvSpPr>
+          <p:spPr>
+            <a:xfrm>
+              <a:off x="8851782" y="2520917"/>
+              <a:ext cx="267051" cy="307777"/>
+            </a:xfrm>
+            <a:prstGeom prst="rect">
+              <a:avLst/>
+            </a:prstGeom>
+            <a:solidFill>
+              <a:schemeClr val="bg1">
+                <a:lumMod val="85000"/>
+              </a:schemeClr>
+            </a:solidFill>
+            <a:ln>
+              <a:solidFill>
+                <a:schemeClr val="tx1"/>
+              </a:solidFill>
+            </a:ln>
+          </p:spPr>
+          <p:txBody>
+            <a:bodyPr wrap="square" rtlCol="0">
+              <a:spAutoFit/>
+            </a:bodyPr>
+            <a:lstStyle/>
+            <a:p>
+              <a:pPr algn="ctr"/>
+              <a:r>
+                <a:rPr lang="es-ES" sz="1400" dirty="0"/>
+                <a:t>+</a:t>
+              </a:r>
+            </a:p>
+          </p:txBody>
+        </p:sp>
+        <p:sp>
+          <p:nvSpPr>
+            <p:cNvPr id="17" name="CuadroTexto 16">
+              <a:extLst>
+                <a:ext uri="{FF2B5EF4-FFF2-40B4-BE49-F238E27FC236}">
+                  <a16:creationId xmlns:a16="http://schemas.microsoft.com/office/drawing/2014/main" id="{F98C1302-45BF-449D-BD36-6743087E2F05}"/>
+                </a:ext>
+              </a:extLst>
+            </p:cNvPr>
+            <p:cNvSpPr txBox="1"/>
+            <p:nvPr/>
+          </p:nvSpPr>
+          <p:spPr>
+            <a:xfrm>
+              <a:off x="8851781" y="2828694"/>
+              <a:ext cx="267051" cy="307777"/>
+            </a:xfrm>
+            <a:prstGeom prst="rect">
+              <a:avLst/>
+            </a:prstGeom>
+            <a:solidFill>
+              <a:schemeClr val="bg1">
+                <a:lumMod val="85000"/>
+              </a:schemeClr>
+            </a:solidFill>
+            <a:ln>
+              <a:solidFill>
+                <a:schemeClr val="tx1"/>
+              </a:solidFill>
+            </a:ln>
+          </p:spPr>
+          <p:txBody>
+            <a:bodyPr wrap="square" rtlCol="0">
+              <a:spAutoFit/>
+            </a:bodyPr>
+            <a:lstStyle/>
+            <a:p>
+              <a:pPr algn="ctr"/>
+              <a:r>
+                <a:rPr lang="es-ES" sz="1400" dirty="0"/>
+                <a:t>-</a:t>
+              </a:r>
+            </a:p>
+          </p:txBody>
+        </p:sp>
+      </p:grpSp>
+      <p:sp>
+        <p:nvSpPr>
           <p:cNvPr id="8" name="CuadroTexto 7">
             <a:extLst>
               <a:ext uri="{FF2B5EF4-FFF2-40B4-BE49-F238E27FC236}">
-                <a16:creationId xmlns:a16="http://schemas.microsoft.com/office/drawing/2014/main" id="{87D8C68F-3C3F-474E-B2E2-87E9ABCA7C2D}"/>
+                <a16:creationId xmlns:a16="http://schemas.microsoft.com/office/drawing/2014/main" id="{41765758-26E6-469B-9C88-CCB495D94C5D}"/>
               </a:ext>
             </a:extLst>
           </p:cNvPr>
@@ -4448,7 +4645,7 @@
           <p:cNvPr id="9" name="CuadroTexto 8">
             <a:extLst>
               <a:ext uri="{FF2B5EF4-FFF2-40B4-BE49-F238E27FC236}">
-                <a16:creationId xmlns:a16="http://schemas.microsoft.com/office/drawing/2014/main" id="{69B7775D-6619-47FA-95FC-2BFF98F90E33}"/>
+                <a16:creationId xmlns:a16="http://schemas.microsoft.com/office/drawing/2014/main" id="{63396B0F-C78C-41F2-969C-0648502A0803}"/>
               </a:ext>
             </a:extLst>
           </p:cNvPr>
@@ -4497,7 +4694,7 @@
           <p:cNvPr id="10" name="CuadroTexto 9">
             <a:extLst>
               <a:ext uri="{FF2B5EF4-FFF2-40B4-BE49-F238E27FC236}">
-                <a16:creationId xmlns:a16="http://schemas.microsoft.com/office/drawing/2014/main" id="{E6B399B8-DA52-4C30-972E-53ADA9421924}"/>
+                <a16:creationId xmlns:a16="http://schemas.microsoft.com/office/drawing/2014/main" id="{8B5E7E50-90DC-4E6F-A3F0-F177D680C922}"/>
               </a:ext>
             </a:extLst>
           </p:cNvPr>
@@ -4506,7 +4703,7 @@
         </p:nvSpPr>
         <p:spPr>
           <a:xfrm>
-            <a:off x="1476460" y="1323061"/>
+            <a:off x="1476459" y="1323906"/>
             <a:ext cx="1325461" cy="307777"/>
           </a:xfrm>
           <a:prstGeom prst="rect">
@@ -4530,23 +4727,156 @@
           <a:lstStyle/>
           <a:p>
             <a:r>
-              <a:rPr lang="es-ES" sz="1400" dirty="0"/>
-              <a:t>Load </a:t>
-            </a:r>
-            <a:r>
               <a:rPr lang="es-ES" sz="1400" dirty="0" err="1"/>
-              <a:t>session</a:t>
+              <a:t>Exit</a:t>
             </a:r>
             <a:endParaRPr lang="es-ES" sz="1400" dirty="0"/>
           </a:p>
         </p:txBody>
       </p:sp>
-      <p:sp>
-        <p:nvSpPr>
-          <p:cNvPr id="11" name="CuadroTexto 10">
-            <a:extLst>
-              <a:ext uri="{FF2B5EF4-FFF2-40B4-BE49-F238E27FC236}">
-                <a16:creationId xmlns:a16="http://schemas.microsoft.com/office/drawing/2014/main" id="{D9B563DB-707C-4CD4-803E-C6573FDAE050}"/>
+      <p:pic>
+        <p:nvPicPr>
+          <p:cNvPr id="2050" name="Picture 2" descr="Rendered Image">
+            <a:extLst>
+              <a:ext uri="{FF2B5EF4-FFF2-40B4-BE49-F238E27FC236}">
+                <a16:creationId xmlns:a16="http://schemas.microsoft.com/office/drawing/2014/main" id="{64895D16-E4AE-4981-93D4-38061FEC891D}"/>
+              </a:ext>
+            </a:extLst>
+          </p:cNvPr>
+          <p:cNvPicPr>
+            <a:picLocks noChangeAspect="1" noChangeArrowheads="1"/>
+          </p:cNvPicPr>
+          <p:nvPr/>
+        </p:nvPicPr>
+        <p:blipFill>
+          <a:blip r:embed="rId4">
+            <a:extLst>
+              <a:ext uri="{28A0092B-C50C-407E-A947-70E740481C1C}">
+                <a14:useLocalDpi xmlns:a14="http://schemas.microsoft.com/office/drawing/2010/main" val="0"/>
+              </a:ext>
+            </a:extLst>
+          </a:blip>
+          <a:srcRect/>
+          <a:stretch>
+            <a:fillRect/>
+          </a:stretch>
+        </p:blipFill>
+        <p:spPr bwMode="auto">
+          <a:xfrm>
+            <a:off x="324331" y="5331161"/>
+            <a:ext cx="2181225" cy="809625"/>
+          </a:xfrm>
+          <a:prstGeom prst="rect">
+            <a:avLst/>
+          </a:prstGeom>
+          <a:noFill/>
+          <a:extLst>
+            <a:ext uri="{909E8E84-426E-40DD-AFC4-6F175D3DCCD1}">
+              <a14:hiddenFill xmlns:a14="http://schemas.microsoft.com/office/drawing/2010/main">
+                <a:solidFill>
+                  <a:srgbClr val="FFFFFF"/>
+                </a:solidFill>
+              </a14:hiddenFill>
+            </a:ext>
+          </a:extLst>
+        </p:spPr>
+      </p:pic>
+    </p:spTree>
+    <p:extLst>
+      <p:ext uri="{BB962C8B-B14F-4D97-AF65-F5344CB8AC3E}">
+        <p14:creationId xmlns:p14="http://schemas.microsoft.com/office/powerpoint/2010/main" val="2520566424"/>
+      </p:ext>
+    </p:extLst>
+  </p:cSld>
+  <p:clrMapOvr>
+    <a:masterClrMapping/>
+  </p:clrMapOvr>
+</p:sld>
+</file>
+
+<file path=ppt/slides/slide5.xml><?xml version="1.0" encoding="utf-8"?>
+<p:sld xmlns:a="http://schemas.openxmlformats.org/drawingml/2006/main" xmlns:r="http://schemas.openxmlformats.org/officeDocument/2006/relationships" xmlns:p="http://schemas.openxmlformats.org/presentationml/2006/main">
+  <p:cSld>
+    <p:spTree>
+      <p:nvGrpSpPr>
+        <p:cNvPr id="1" name=""/>
+        <p:cNvGrpSpPr/>
+        <p:nvPr/>
+      </p:nvGrpSpPr>
+      <p:grpSpPr>
+        <a:xfrm>
+          <a:off x="0" y="0"/>
+          <a:ext cx="0" cy="0"/>
+          <a:chOff x="0" y="0"/>
+          <a:chExt cx="0" cy="0"/>
+        </a:xfrm>
+      </p:grpSpPr>
+      <p:pic>
+        <p:nvPicPr>
+          <p:cNvPr id="5" name="Imagen 4">
+            <a:extLst>
+              <a:ext uri="{FF2B5EF4-FFF2-40B4-BE49-F238E27FC236}">
+                <a16:creationId xmlns:a16="http://schemas.microsoft.com/office/drawing/2014/main" id="{20B84089-D466-4D04-9783-CB6ADAAD6C96}"/>
+              </a:ext>
+            </a:extLst>
+          </p:cNvPr>
+          <p:cNvPicPr>
+            <a:picLocks noChangeAspect="1"/>
+          </p:cNvPicPr>
+          <p:nvPr/>
+        </p:nvPicPr>
+        <p:blipFill>
+          <a:blip r:embed="rId2"/>
+          <a:stretch>
+            <a:fillRect/>
+          </a:stretch>
+        </p:blipFill>
+        <p:spPr>
+          <a:xfrm>
+            <a:off x="3318057" y="1193683"/>
+            <a:ext cx="5087713" cy="3562875"/>
+          </a:xfrm>
+          <a:prstGeom prst="rect">
+            <a:avLst/>
+          </a:prstGeom>
+        </p:spPr>
+      </p:pic>
+      <p:pic>
+        <p:nvPicPr>
+          <p:cNvPr id="6" name="Imagen 5">
+            <a:extLst>
+              <a:ext uri="{FF2B5EF4-FFF2-40B4-BE49-F238E27FC236}">
+                <a16:creationId xmlns:a16="http://schemas.microsoft.com/office/drawing/2014/main" id="{4A8A3EDD-413E-4611-B0F7-F3E7B0E8B4B8}"/>
+              </a:ext>
+            </a:extLst>
+          </p:cNvPr>
+          <p:cNvPicPr>
+            <a:picLocks noChangeAspect="1"/>
+          </p:cNvPicPr>
+          <p:nvPr/>
+        </p:nvPicPr>
+        <p:blipFill>
+          <a:blip r:embed="rId3"/>
+          <a:stretch>
+            <a:fillRect/>
+          </a:stretch>
+        </p:blipFill>
+        <p:spPr>
+          <a:xfrm>
+            <a:off x="3216217" y="4884598"/>
+            <a:ext cx="5332428" cy="1411427"/>
+          </a:xfrm>
+          <a:prstGeom prst="rect">
+            <a:avLst/>
+          </a:prstGeom>
+        </p:spPr>
+      </p:pic>
+      <p:sp>
+        <p:nvSpPr>
+          <p:cNvPr id="8" name="CuadroTexto 7">
+            <a:extLst>
+              <a:ext uri="{FF2B5EF4-FFF2-40B4-BE49-F238E27FC236}">
+                <a16:creationId xmlns:a16="http://schemas.microsoft.com/office/drawing/2014/main" id="{87D8C68F-3C3F-474E-B2E2-87E9ABCA7C2D}"/>
               </a:ext>
             </a:extLst>
           </p:cNvPr>
@@ -4555,8 +4885,8 @@
         </p:nvSpPr>
         <p:spPr>
           <a:xfrm>
-            <a:off x="1476460" y="1615478"/>
-            <a:ext cx="1325461" cy="307777"/>
+            <a:off x="1325461" y="645952"/>
+            <a:ext cx="964734" cy="369332"/>
           </a:xfrm>
           <a:prstGeom prst="rect">
             <a:avLst/>
@@ -4579,23 +4909,18 @@
           <a:lstStyle/>
           <a:p>
             <a:r>
-              <a:rPr lang="es-ES" sz="1400" dirty="0"/>
-              <a:t>New </a:t>
-            </a:r>
-            <a:r>
-              <a:rPr lang="es-ES" sz="1400" dirty="0" err="1"/>
-              <a:t>session</a:t>
-            </a:r>
-            <a:endParaRPr lang="es-ES" sz="1400" dirty="0"/>
-          </a:p>
-        </p:txBody>
-      </p:sp>
-      <p:sp>
-        <p:nvSpPr>
-          <p:cNvPr id="12" name="CuadroTexto 11">
-            <a:extLst>
-              <a:ext uri="{FF2B5EF4-FFF2-40B4-BE49-F238E27FC236}">
-                <a16:creationId xmlns:a16="http://schemas.microsoft.com/office/drawing/2014/main" id="{33980FAD-8BDF-4D61-BA99-FBF4A8BD191D}"/>
+              <a:rPr lang="es-ES" dirty="0"/>
+              <a:t>File</a:t>
+            </a:r>
+          </a:p>
+        </p:txBody>
+      </p:sp>
+      <p:sp>
+        <p:nvSpPr>
+          <p:cNvPr id="9" name="CuadroTexto 8">
+            <a:extLst>
+              <a:ext uri="{FF2B5EF4-FFF2-40B4-BE49-F238E27FC236}">
+                <a16:creationId xmlns:a16="http://schemas.microsoft.com/office/drawing/2014/main" id="{69B7775D-6619-47FA-95FC-2BFF98F90E33}"/>
               </a:ext>
             </a:extLst>
           </p:cNvPr>
@@ -4604,7 +4929,7 @@
         </p:nvSpPr>
         <p:spPr>
           <a:xfrm>
-            <a:off x="1476460" y="1905363"/>
+            <a:off x="1476461" y="1015284"/>
             <a:ext cx="1325461" cy="307777"/>
           </a:xfrm>
           <a:prstGeom prst="rect">
@@ -4628,8 +4953,12 @@
           <a:lstStyle/>
           <a:p>
             <a:r>
+              <a:rPr lang="es-ES" sz="1400" dirty="0"/>
+              <a:t>Load </a:t>
+            </a:r>
+            <a:r>
               <a:rPr lang="es-ES" sz="1400" dirty="0" err="1"/>
-              <a:t>Save</a:t>
+              <a:t>track</a:t>
             </a:r>
             <a:endParaRPr lang="es-ES" sz="1400" dirty="0"/>
           </a:p>
@@ -4637,10 +4966,10 @@
       </p:sp>
       <p:sp>
         <p:nvSpPr>
-          <p:cNvPr id="13" name="CuadroTexto 12">
-            <a:extLst>
-              <a:ext uri="{FF2B5EF4-FFF2-40B4-BE49-F238E27FC236}">
-                <a16:creationId xmlns:a16="http://schemas.microsoft.com/office/drawing/2014/main" id="{785F6E4A-3AFF-444D-931D-D0FEA190FED5}"/>
+          <p:cNvPr id="10" name="CuadroTexto 9">
+            <a:extLst>
+              <a:ext uri="{FF2B5EF4-FFF2-40B4-BE49-F238E27FC236}">
+                <a16:creationId xmlns:a16="http://schemas.microsoft.com/office/drawing/2014/main" id="{E6B399B8-DA52-4C30-972E-53ADA9421924}"/>
               </a:ext>
             </a:extLst>
           </p:cNvPr>
@@ -4649,7 +4978,7 @@
         </p:nvSpPr>
         <p:spPr>
           <a:xfrm>
-            <a:off x="1476459" y="2213140"/>
+            <a:off x="1476460" y="1323061"/>
             <a:ext cx="1325461" cy="307777"/>
           </a:xfrm>
           <a:prstGeom prst="rect">
@@ -4673,6 +5002,149 @@
           <a:lstStyle/>
           <a:p>
             <a:r>
+              <a:rPr lang="es-ES" sz="1400" dirty="0"/>
+              <a:t>Load </a:t>
+            </a:r>
+            <a:r>
+              <a:rPr lang="es-ES" sz="1400" dirty="0" err="1"/>
+              <a:t>session</a:t>
+            </a:r>
+            <a:endParaRPr lang="es-ES" sz="1400" dirty="0"/>
+          </a:p>
+        </p:txBody>
+      </p:sp>
+      <p:sp>
+        <p:nvSpPr>
+          <p:cNvPr id="11" name="CuadroTexto 10">
+            <a:extLst>
+              <a:ext uri="{FF2B5EF4-FFF2-40B4-BE49-F238E27FC236}">
+                <a16:creationId xmlns:a16="http://schemas.microsoft.com/office/drawing/2014/main" id="{D9B563DB-707C-4CD4-803E-C6573FDAE050}"/>
+              </a:ext>
+            </a:extLst>
+          </p:cNvPr>
+          <p:cNvSpPr txBox="1"/>
+          <p:nvPr/>
+        </p:nvSpPr>
+        <p:spPr>
+          <a:xfrm>
+            <a:off x="1476460" y="1615478"/>
+            <a:ext cx="1325461" cy="307777"/>
+          </a:xfrm>
+          <a:prstGeom prst="rect">
+            <a:avLst/>
+          </a:prstGeom>
+          <a:solidFill>
+            <a:schemeClr val="bg1">
+              <a:lumMod val="75000"/>
+            </a:schemeClr>
+          </a:solidFill>
+          <a:ln>
+            <a:solidFill>
+              <a:schemeClr val="tx1"/>
+            </a:solidFill>
+          </a:ln>
+        </p:spPr>
+        <p:txBody>
+          <a:bodyPr wrap="square" rtlCol="0">
+            <a:spAutoFit/>
+          </a:bodyPr>
+          <a:lstStyle/>
+          <a:p>
+            <a:r>
+              <a:rPr lang="es-ES" sz="1400" dirty="0"/>
+              <a:t>New </a:t>
+            </a:r>
+            <a:r>
+              <a:rPr lang="es-ES" sz="1400" dirty="0" err="1"/>
+              <a:t>session</a:t>
+            </a:r>
+            <a:endParaRPr lang="es-ES" sz="1400" dirty="0"/>
+          </a:p>
+        </p:txBody>
+      </p:sp>
+      <p:sp>
+        <p:nvSpPr>
+          <p:cNvPr id="12" name="CuadroTexto 11">
+            <a:extLst>
+              <a:ext uri="{FF2B5EF4-FFF2-40B4-BE49-F238E27FC236}">
+                <a16:creationId xmlns:a16="http://schemas.microsoft.com/office/drawing/2014/main" id="{33980FAD-8BDF-4D61-BA99-FBF4A8BD191D}"/>
+              </a:ext>
+            </a:extLst>
+          </p:cNvPr>
+          <p:cNvSpPr txBox="1"/>
+          <p:nvPr/>
+        </p:nvSpPr>
+        <p:spPr>
+          <a:xfrm>
+            <a:off x="1476460" y="1905363"/>
+            <a:ext cx="1325461" cy="307777"/>
+          </a:xfrm>
+          <a:prstGeom prst="rect">
+            <a:avLst/>
+          </a:prstGeom>
+          <a:solidFill>
+            <a:schemeClr val="bg1">
+              <a:lumMod val="75000"/>
+            </a:schemeClr>
+          </a:solidFill>
+          <a:ln>
+            <a:solidFill>
+              <a:schemeClr val="tx1"/>
+            </a:solidFill>
+          </a:ln>
+        </p:spPr>
+        <p:txBody>
+          <a:bodyPr wrap="square" rtlCol="0">
+            <a:spAutoFit/>
+          </a:bodyPr>
+          <a:lstStyle/>
+          <a:p>
+            <a:r>
+              <a:rPr lang="es-ES" sz="1400" dirty="0" err="1"/>
+              <a:t>Save</a:t>
+            </a:r>
+            <a:endParaRPr lang="es-ES" sz="1400" dirty="0"/>
+          </a:p>
+        </p:txBody>
+      </p:sp>
+      <p:sp>
+        <p:nvSpPr>
+          <p:cNvPr id="13" name="CuadroTexto 12">
+            <a:extLst>
+              <a:ext uri="{FF2B5EF4-FFF2-40B4-BE49-F238E27FC236}">
+                <a16:creationId xmlns:a16="http://schemas.microsoft.com/office/drawing/2014/main" id="{785F6E4A-3AFF-444D-931D-D0FEA190FED5}"/>
+              </a:ext>
+            </a:extLst>
+          </p:cNvPr>
+          <p:cNvSpPr txBox="1"/>
+          <p:nvPr/>
+        </p:nvSpPr>
+        <p:spPr>
+          <a:xfrm>
+            <a:off x="1476459" y="2213140"/>
+            <a:ext cx="1325461" cy="307777"/>
+          </a:xfrm>
+          <a:prstGeom prst="rect">
+            <a:avLst/>
+          </a:prstGeom>
+          <a:solidFill>
+            <a:schemeClr val="bg1">
+              <a:lumMod val="75000"/>
+            </a:schemeClr>
+          </a:solidFill>
+          <a:ln>
+            <a:solidFill>
+              <a:schemeClr val="tx1"/>
+            </a:solidFill>
+          </a:ln>
+        </p:spPr>
+        <p:txBody>
+          <a:bodyPr wrap="square" rtlCol="0">
+            <a:spAutoFit/>
+          </a:bodyPr>
+          <a:lstStyle/>
+          <a:p>
+            <a:r>
               <a:rPr lang="es-ES" sz="1400" dirty="0" err="1"/>
               <a:t>Exit</a:t>
             </a:r>
@@ -4720,7 +5192,7 @@
             </a:pPr>
             <a:r>
               <a:rPr lang="es-ES" dirty="0"/>
-              <a:t>V00.03</a:t>
+              <a:t>V00.04</a:t>
             </a:r>
           </a:p>
           <a:p>

</xml_diff>

<commit_message>
Refactor GUI and load multiple gpx files
</commit_message>
<xml_diff>
--- a/gui_design.pptx
+++ b/gui_design.pptx
@@ -10,6 +10,7 @@
     <p:sldId id="257" r:id="rId4"/>
     <p:sldId id="260" r:id="rId5"/>
     <p:sldId id="258" r:id="rId6"/>
+    <p:sldId id="261" r:id="rId7"/>
   </p:sldIdLst>
   <p:sldSz cx="12192000" cy="6858000"/>
   <p:notesSz cx="6858000" cy="9144000"/>
@@ -3966,7 +3967,7 @@
         <p:spPr>
           <a:xfrm>
             <a:off x="8783273" y="234892"/>
-            <a:ext cx="3087149" cy="1477328"/>
+            <a:ext cx="3087149" cy="1754326"/>
           </a:xfrm>
           <a:prstGeom prst="rect">
             <a:avLst/>
@@ -4032,121 +4033,32 @@
             </a:r>
           </a:p>
           <a:p>
+            <a:pPr marL="285750" indent="-285750">
+              <a:buFontTx/>
+              <a:buChar char="-"/>
+            </a:pPr>
+            <a:r>
+              <a:rPr lang="es-ES" dirty="0" err="1"/>
+              <a:t>Check</a:t>
+            </a:r>
+            <a:r>
+              <a:rPr lang="es-ES" dirty="0"/>
+              <a:t> </a:t>
+            </a:r>
+            <a:r>
+              <a:rPr lang="es-ES" dirty="0" err="1"/>
+              <a:t>duplicated</a:t>
+            </a:r>
+            <a:r>
+              <a:rPr lang="es-ES" dirty="0"/>
+              <a:t> files</a:t>
+            </a:r>
+          </a:p>
+          <a:p>
             <a:endParaRPr lang="es-ES" dirty="0"/>
           </a:p>
         </p:txBody>
       </p:sp>
-      <p:grpSp>
-        <p:nvGrpSpPr>
-          <p:cNvPr id="18" name="Grupo 17">
-            <a:extLst>
-              <a:ext uri="{FF2B5EF4-FFF2-40B4-BE49-F238E27FC236}">
-                <a16:creationId xmlns:a16="http://schemas.microsoft.com/office/drawing/2014/main" id="{CE082FDB-5094-4F0F-8661-7B8640501D0A}"/>
-              </a:ext>
-            </a:extLst>
-          </p:cNvPr>
-          <p:cNvGrpSpPr/>
-          <p:nvPr/>
-        </p:nvGrpSpPr>
-        <p:grpSpPr>
-          <a:xfrm>
-            <a:off x="7945770" y="3897247"/>
-            <a:ext cx="267052" cy="615554"/>
-            <a:chOff x="8851781" y="2520917"/>
-            <a:chExt cx="267052" cy="615554"/>
-          </a:xfrm>
-        </p:grpSpPr>
-        <p:sp>
-          <p:nvSpPr>
-            <p:cNvPr id="16" name="CuadroTexto 15">
-              <a:extLst>
-                <a:ext uri="{FF2B5EF4-FFF2-40B4-BE49-F238E27FC236}">
-                  <a16:creationId xmlns:a16="http://schemas.microsoft.com/office/drawing/2014/main" id="{19713EAB-5261-4665-91F7-2DFD19C8A273}"/>
-                </a:ext>
-              </a:extLst>
-            </p:cNvPr>
-            <p:cNvSpPr txBox="1"/>
-            <p:nvPr/>
-          </p:nvSpPr>
-          <p:spPr>
-            <a:xfrm>
-              <a:off x="8851782" y="2520917"/>
-              <a:ext cx="267051" cy="307777"/>
-            </a:xfrm>
-            <a:prstGeom prst="rect">
-              <a:avLst/>
-            </a:prstGeom>
-            <a:solidFill>
-              <a:schemeClr val="bg1">
-                <a:lumMod val="85000"/>
-              </a:schemeClr>
-            </a:solidFill>
-            <a:ln>
-              <a:solidFill>
-                <a:schemeClr val="tx1"/>
-              </a:solidFill>
-            </a:ln>
-          </p:spPr>
-          <p:txBody>
-            <a:bodyPr wrap="square" rtlCol="0">
-              <a:spAutoFit/>
-            </a:bodyPr>
-            <a:lstStyle/>
-            <a:p>
-              <a:pPr algn="ctr"/>
-              <a:r>
-                <a:rPr lang="es-ES" sz="1400" dirty="0"/>
-                <a:t>+</a:t>
-              </a:r>
-            </a:p>
-          </p:txBody>
-        </p:sp>
-        <p:sp>
-          <p:nvSpPr>
-            <p:cNvPr id="17" name="CuadroTexto 16">
-              <a:extLst>
-                <a:ext uri="{FF2B5EF4-FFF2-40B4-BE49-F238E27FC236}">
-                  <a16:creationId xmlns:a16="http://schemas.microsoft.com/office/drawing/2014/main" id="{F98C1302-45BF-449D-BD36-6743087E2F05}"/>
-                </a:ext>
-              </a:extLst>
-            </p:cNvPr>
-            <p:cNvSpPr txBox="1"/>
-            <p:nvPr/>
-          </p:nvSpPr>
-          <p:spPr>
-            <a:xfrm>
-              <a:off x="8851781" y="2828694"/>
-              <a:ext cx="267051" cy="307777"/>
-            </a:xfrm>
-            <a:prstGeom prst="rect">
-              <a:avLst/>
-            </a:prstGeom>
-            <a:solidFill>
-              <a:schemeClr val="bg1">
-                <a:lumMod val="85000"/>
-              </a:schemeClr>
-            </a:solidFill>
-            <a:ln>
-              <a:solidFill>
-                <a:schemeClr val="tx1"/>
-              </a:solidFill>
-            </a:ln>
-          </p:spPr>
-          <p:txBody>
-            <a:bodyPr wrap="square" rtlCol="0">
-              <a:spAutoFit/>
-            </a:bodyPr>
-            <a:lstStyle/>
-            <a:p>
-              <a:pPr algn="ctr"/>
-              <a:r>
-                <a:rPr lang="es-ES" sz="1400" dirty="0"/>
-                <a:t>-</a:t>
-              </a:r>
-            </a:p>
-          </p:txBody>
-        </p:sp>
-      </p:grpSp>
       <p:sp>
         <p:nvSpPr>
           <p:cNvPr id="8" name="CuadroTexto 7">
@@ -4287,10 +4199,10 @@
       </p:sp>
       <p:pic>
         <p:nvPicPr>
-          <p:cNvPr id="2050" name="Picture 2" descr="Rendered Image">
-            <a:extLst>
-              <a:ext uri="{FF2B5EF4-FFF2-40B4-BE49-F238E27FC236}">
-                <a16:creationId xmlns:a16="http://schemas.microsoft.com/office/drawing/2014/main" id="{64895D16-E4AE-4981-93D4-38061FEC891D}"/>
+          <p:cNvPr id="12" name="Picture 2" descr="Rendered Image">
+            <a:extLst>
+              <a:ext uri="{FF2B5EF4-FFF2-40B4-BE49-F238E27FC236}">
+                <a16:creationId xmlns:a16="http://schemas.microsoft.com/office/drawing/2014/main" id="{54249FF8-7268-45B6-B82E-4802D7C5513F}"/>
               </a:ext>
             </a:extLst>
           </p:cNvPr>
@@ -4314,8 +4226,8 @@
         </p:blipFill>
         <p:spPr bwMode="auto">
           <a:xfrm>
-            <a:off x="324331" y="5331161"/>
-            <a:ext cx="2181225" cy="809625"/>
+            <a:off x="598240" y="5134504"/>
+            <a:ext cx="2019300" cy="1057275"/>
           </a:xfrm>
           <a:prstGeom prst="rect">
             <a:avLst/>
@@ -5377,6 +5289,143 @@
     <p:extLst>
       <p:ext uri="{BB962C8B-B14F-4D97-AF65-F5344CB8AC3E}">
         <p14:creationId xmlns:p14="http://schemas.microsoft.com/office/powerpoint/2010/main" val="3950845870"/>
+      </p:ext>
+    </p:extLst>
+  </p:cSld>
+  <p:clrMapOvr>
+    <a:masterClrMapping/>
+  </p:clrMapOvr>
+</p:sld>
+</file>
+
+<file path=ppt/slides/slide6.xml><?xml version="1.0" encoding="utf-8"?>
+<p:sld xmlns:a="http://schemas.openxmlformats.org/drawingml/2006/main" xmlns:r="http://schemas.openxmlformats.org/officeDocument/2006/relationships" xmlns:p="http://schemas.openxmlformats.org/presentationml/2006/main">
+  <p:cSld>
+    <p:spTree>
+      <p:nvGrpSpPr>
+        <p:cNvPr id="1" name=""/>
+        <p:cNvGrpSpPr/>
+        <p:nvPr/>
+      </p:nvGrpSpPr>
+      <p:grpSpPr>
+        <a:xfrm>
+          <a:off x="0" y="0"/>
+          <a:ext cx="0" cy="0"/>
+          <a:chOff x="0" y="0"/>
+          <a:chExt cx="0" cy="0"/>
+        </a:xfrm>
+      </p:grpSpPr>
+      <p:sp>
+        <p:nvSpPr>
+          <p:cNvPr id="3" name="Marcador de contenido 2">
+            <a:extLst>
+              <a:ext uri="{FF2B5EF4-FFF2-40B4-BE49-F238E27FC236}">
+                <a16:creationId xmlns:a16="http://schemas.microsoft.com/office/drawing/2014/main" id="{6B5F60B9-F51F-4741-9701-C8B0CFB0CF21}"/>
+              </a:ext>
+            </a:extLst>
+          </p:cNvPr>
+          <p:cNvSpPr>
+            <a:spLocks noGrp="1"/>
+          </p:cNvSpPr>
+          <p:nvPr>
+            <p:ph idx="1"/>
+          </p:nvPr>
+        </p:nvSpPr>
+        <p:spPr>
+          <a:xfrm>
+            <a:off x="838200" y="654341"/>
+            <a:ext cx="10515600" cy="5522622"/>
+          </a:xfrm>
+        </p:spPr>
+        <p:txBody>
+          <a:bodyPr/>
+          <a:lstStyle/>
+          <a:p>
+            <a:pPr marL="0" indent="0">
+              <a:buNone/>
+            </a:pPr>
+            <a:r>
+              <a:rPr lang="es-ES" sz="1600" b="1" dirty="0" err="1"/>
+              <a:t>Useful</a:t>
+            </a:r>
+            <a:r>
+              <a:rPr lang="es-ES" sz="1600" b="1" dirty="0"/>
+              <a:t> links</a:t>
+            </a:r>
+            <a:endParaRPr lang="es-ES" sz="1600" dirty="0"/>
+          </a:p>
+          <a:p>
+            <a:r>
+              <a:rPr lang="es-ES" sz="1400" dirty="0" err="1"/>
+              <a:t>Tkinter</a:t>
+            </a:r>
+            <a:r>
+              <a:rPr lang="es-ES" sz="1400" dirty="0"/>
+              <a:t> </a:t>
+            </a:r>
+            <a:r>
+              <a:rPr lang="es-ES" sz="1400" dirty="0" err="1"/>
+              <a:t>course</a:t>
+            </a:r>
+            <a:r>
+              <a:rPr lang="es-ES" sz="1400" dirty="0"/>
+              <a:t>: </a:t>
+            </a:r>
+            <a:r>
+              <a:rPr lang="en-US" sz="1400" dirty="0">
+                <a:hlinkClick r:id="rId2"/>
+              </a:rPr>
+              <a:t>https://pythonprogramming.net/tkinter-depth-tutorial-making-actual-program/</a:t>
+            </a:r>
+            <a:r>
+              <a:rPr lang="en-US" sz="1400" dirty="0"/>
+              <a:t> </a:t>
+            </a:r>
+            <a:r>
+              <a:rPr lang="en-US" sz="1400" dirty="0">
+                <a:hlinkClick r:id="rId3"/>
+              </a:rPr>
+              <a:t>https://www.youtube.com/playlist?list=PLQVvvaa0QuDclKx-QpC9wntnURXVJqLyk</a:t>
+            </a:r>
+            <a:endParaRPr lang="es-ES" sz="1400" dirty="0"/>
+          </a:p>
+          <a:p>
+            <a:r>
+              <a:rPr lang="es-ES" sz="1400" dirty="0" err="1"/>
+              <a:t>Tkinter</a:t>
+            </a:r>
+            <a:r>
+              <a:rPr lang="es-ES" sz="1400" dirty="0"/>
+              <a:t> </a:t>
+            </a:r>
+            <a:r>
+              <a:rPr lang="es-ES" sz="1400" dirty="0" err="1"/>
+              <a:t>organization</a:t>
+            </a:r>
+            <a:r>
+              <a:rPr lang="es-ES" sz="1400" dirty="0"/>
+              <a:t>: </a:t>
+            </a:r>
+            <a:r>
+              <a:rPr lang="en-US" altLang="en-US" sz="1400" dirty="0"/>
+              <a:t>https://stackoverflow.com/questions/17466561/best-way-to-structure-a-tk-application</a:t>
+            </a:r>
+          </a:p>
+          <a:p>
+            <a:pPr marL="0" indent="0">
+              <a:buNone/>
+            </a:pPr>
+            <a:r>
+              <a:rPr lang="es-ES" sz="1400" dirty="0"/>
+              <a:t> </a:t>
+            </a:r>
+          </a:p>
+        </p:txBody>
+      </p:sp>
+    </p:spTree>
+    <p:extLst>
+      <p:ext uri="{BB962C8B-B14F-4D97-AF65-F5344CB8AC3E}">
+        <p14:creationId xmlns:p14="http://schemas.microsoft.com/office/powerpoint/2010/main" val="3630283077"/>
       </p:ext>
     </p:extLst>
   </p:cSld>

</xml_diff>

<commit_message>
- New session option - Display a confirmation message before removing current session - Bug to obtain positive gained elevation is corrected - Preliminary changes to load extra tiles have been added, but disabled - Update design document
</commit_message>
<xml_diff>
--- a/gui_design.pptx
+++ b/gui_design.pptx
@@ -6314,10 +6314,10 @@
       </p:grpSp>
       <p:pic>
         <p:nvPicPr>
-          <p:cNvPr id="15" name="Picture 2" descr="Rendered Image">
-            <a:extLst>
-              <a:ext uri="{FF2B5EF4-FFF2-40B4-BE49-F238E27FC236}">
-                <a16:creationId xmlns:a16="http://schemas.microsoft.com/office/drawing/2014/main" id="{7B2E289B-43CF-4B37-97C5-425FBF055A8C}"/>
+          <p:cNvPr id="19" name="Picture 2" descr="Rendered Image">
+            <a:extLst>
+              <a:ext uri="{FF2B5EF4-FFF2-40B4-BE49-F238E27FC236}">
+                <a16:creationId xmlns:a16="http://schemas.microsoft.com/office/drawing/2014/main" id="{33779A03-33C4-42CE-8D14-70C44AE26E37}"/>
               </a:ext>
             </a:extLst>
           </p:cNvPr>
@@ -6341,8 +6341,8 @@
         </p:blipFill>
         <p:spPr bwMode="auto">
           <a:xfrm>
-            <a:off x="324331" y="5331161"/>
-            <a:ext cx="2181225" cy="809625"/>
+            <a:off x="598240" y="5134504"/>
+            <a:ext cx="2019300" cy="1057275"/>
           </a:xfrm>
           <a:prstGeom prst="rect">
             <a:avLst/>

</xml_diff>

<commit_message>
Display table with segments information
</commit_message>
<xml_diff>
--- a/gui_design.pptx
+++ b/gui_design.pptx
@@ -9,15 +9,13 @@
     <p:sldId id="259" r:id="rId3"/>
     <p:sldId id="257" r:id="rId4"/>
     <p:sldId id="258" r:id="rId5"/>
-    <p:sldId id="260" r:id="rId6"/>
-    <p:sldId id="262" r:id="rId7"/>
-    <p:sldId id="263" r:id="rId8"/>
+    <p:sldId id="262" r:id="rId6"/>
+    <p:sldId id="263" r:id="rId7"/>
+    <p:sldId id="260" r:id="rId8"/>
     <p:sldId id="266" r:id="rId9"/>
     <p:sldId id="265" r:id="rId10"/>
     <p:sldId id="264" r:id="rId11"/>
     <p:sldId id="261" r:id="rId12"/>
-    <p:sldId id="267" r:id="rId13"/>
-    <p:sldId id="268" r:id="rId14"/>
   </p:sldIdLst>
   <p:sldSz cx="12192000" cy="6858000"/>
   <p:notesSz cx="6858000" cy="9144000"/>
@@ -4835,223 +4833,6 @@
 </p:sld>
 </file>
 
-<file path=ppt/slides/slide12.xml><?xml version="1.0" encoding="utf-8"?>
-<p:sld xmlns:a="http://schemas.openxmlformats.org/drawingml/2006/main" xmlns:r="http://schemas.openxmlformats.org/officeDocument/2006/relationships" xmlns:p="http://schemas.openxmlformats.org/presentationml/2006/main">
-  <p:cSld>
-    <p:spTree>
-      <p:nvGrpSpPr>
-        <p:cNvPr id="1" name=""/>
-        <p:cNvGrpSpPr/>
-        <p:nvPr/>
-      </p:nvGrpSpPr>
-      <p:grpSpPr>
-        <a:xfrm>
-          <a:off x="0" y="0"/>
-          <a:ext cx="0" cy="0"/>
-          <a:chOff x="0" y="0"/>
-          <a:chExt cx="0" cy="0"/>
-        </a:xfrm>
-      </p:grpSpPr>
-      <p:sp>
-        <p:nvSpPr>
-          <p:cNvPr id="2" name="Título 1">
-            <a:extLst>
-              <a:ext uri="{FF2B5EF4-FFF2-40B4-BE49-F238E27FC236}">
-                <a16:creationId xmlns:a16="http://schemas.microsoft.com/office/drawing/2014/main" id="{6E53BFF6-5403-49B0-8D87-9850C7504B95}"/>
-              </a:ext>
-            </a:extLst>
-          </p:cNvPr>
-          <p:cNvSpPr>
-            <a:spLocks noGrp="1"/>
-          </p:cNvSpPr>
-          <p:nvPr>
-            <p:ph type="title"/>
-          </p:nvPr>
-        </p:nvSpPr>
-        <p:spPr/>
-        <p:txBody>
-          <a:bodyPr/>
-          <a:lstStyle/>
-          <a:p>
-            <a:endParaRPr lang="es-ES"/>
-          </a:p>
-        </p:txBody>
-      </p:sp>
-      <p:sp>
-        <p:nvSpPr>
-          <p:cNvPr id="3" name="Marcador de contenido 2">
-            <a:extLst>
-              <a:ext uri="{FF2B5EF4-FFF2-40B4-BE49-F238E27FC236}">
-                <a16:creationId xmlns:a16="http://schemas.microsoft.com/office/drawing/2014/main" id="{390EBC8B-70FA-40C0-B4DC-BCFAF23D3B05}"/>
-              </a:ext>
-            </a:extLst>
-          </p:cNvPr>
-          <p:cNvSpPr>
-            <a:spLocks noGrp="1"/>
-          </p:cNvSpPr>
-          <p:nvPr>
-            <p:ph idx="1"/>
-          </p:nvPr>
-        </p:nvSpPr>
-        <p:spPr/>
-        <p:txBody>
-          <a:bodyPr/>
-          <a:lstStyle/>
-          <a:p>
-            <a:endParaRPr lang="es-ES"/>
-          </a:p>
-        </p:txBody>
-      </p:sp>
-    </p:spTree>
-    <p:extLst>
-      <p:ext uri="{BB962C8B-B14F-4D97-AF65-F5344CB8AC3E}">
-        <p14:creationId xmlns:p14="http://schemas.microsoft.com/office/powerpoint/2010/main" val="2768463862"/>
-      </p:ext>
-    </p:extLst>
-  </p:cSld>
-  <p:clrMapOvr>
-    <a:masterClrMapping/>
-  </p:clrMapOvr>
-</p:sld>
-</file>
-
-<file path=ppt/slides/slide13.xml><?xml version="1.0" encoding="utf-8"?>
-<p:sld xmlns:a="http://schemas.openxmlformats.org/drawingml/2006/main" xmlns:r="http://schemas.openxmlformats.org/officeDocument/2006/relationships" xmlns:p="http://schemas.openxmlformats.org/presentationml/2006/main">
-  <p:cSld>
-    <p:spTree>
-      <p:nvGrpSpPr>
-        <p:cNvPr id="1" name=""/>
-        <p:cNvGrpSpPr/>
-        <p:nvPr/>
-      </p:nvGrpSpPr>
-      <p:grpSpPr>
-        <a:xfrm>
-          <a:off x="0" y="0"/>
-          <a:ext cx="0" cy="0"/>
-          <a:chOff x="0" y="0"/>
-          <a:chExt cx="0" cy="0"/>
-        </a:xfrm>
-      </p:grpSpPr>
-      <p:pic>
-        <p:nvPicPr>
-          <p:cNvPr id="5" name="Marcador de contenido 4">
-            <a:extLst>
-              <a:ext uri="{FF2B5EF4-FFF2-40B4-BE49-F238E27FC236}">
-                <a16:creationId xmlns:a16="http://schemas.microsoft.com/office/drawing/2014/main" id="{13F76615-C0EA-414D-B15D-495D1F31CCE8}"/>
-              </a:ext>
-            </a:extLst>
-          </p:cNvPr>
-          <p:cNvPicPr>
-            <a:picLocks noGrp="1" noChangeAspect="1"/>
-          </p:cNvPicPr>
-          <p:nvPr>
-            <p:ph idx="1"/>
-          </p:nvPr>
-        </p:nvPicPr>
-        <p:blipFill>
-          <a:blip r:embed="rId2">
-            <a:extLst>
-              <a:ext uri="{28A0092B-C50C-407E-A947-70E740481C1C}">
-                <a14:useLocalDpi xmlns:a14="http://schemas.microsoft.com/office/drawing/2010/main" val="0"/>
-              </a:ext>
-            </a:extLst>
-          </a:blip>
-          <a:stretch>
-            <a:fillRect/>
-          </a:stretch>
-        </p:blipFill>
-        <p:spPr>
-          <a:xfrm>
-            <a:off x="389331" y="160190"/>
-            <a:ext cx="2438400" cy="2438400"/>
-          </a:xfrm>
-        </p:spPr>
-      </p:pic>
-      <p:pic>
-        <p:nvPicPr>
-          <p:cNvPr id="7" name="Imagen 6">
-            <a:extLst>
-              <a:ext uri="{FF2B5EF4-FFF2-40B4-BE49-F238E27FC236}">
-                <a16:creationId xmlns:a16="http://schemas.microsoft.com/office/drawing/2014/main" id="{0ECFAEC0-88E4-4EC7-BCFE-16E83C892169}"/>
-              </a:ext>
-            </a:extLst>
-          </p:cNvPr>
-          <p:cNvPicPr>
-            <a:picLocks noChangeAspect="1"/>
-          </p:cNvPicPr>
-          <p:nvPr/>
-        </p:nvPicPr>
-        <p:blipFill>
-          <a:blip r:embed="rId3">
-            <a:extLst>
-              <a:ext uri="{28A0092B-C50C-407E-A947-70E740481C1C}">
-                <a14:useLocalDpi xmlns:a14="http://schemas.microsoft.com/office/drawing/2010/main" val="0"/>
-              </a:ext>
-            </a:extLst>
-          </a:blip>
-          <a:stretch>
-            <a:fillRect/>
-          </a:stretch>
-        </p:blipFill>
-        <p:spPr>
-          <a:xfrm>
-            <a:off x="389331" y="2598590"/>
-            <a:ext cx="2438400" cy="2438400"/>
-          </a:xfrm>
-          <a:prstGeom prst="rect">
-            <a:avLst/>
-          </a:prstGeom>
-        </p:spPr>
-      </p:pic>
-      <p:pic>
-        <p:nvPicPr>
-          <p:cNvPr id="9" name="Imagen 8">
-            <a:extLst>
-              <a:ext uri="{FF2B5EF4-FFF2-40B4-BE49-F238E27FC236}">
-                <a16:creationId xmlns:a16="http://schemas.microsoft.com/office/drawing/2014/main" id="{EBCED83E-2457-40FB-9299-D74057BF284D}"/>
-              </a:ext>
-            </a:extLst>
-          </p:cNvPr>
-          <p:cNvPicPr>
-            <a:picLocks noChangeAspect="1"/>
-          </p:cNvPicPr>
-          <p:nvPr/>
-        </p:nvPicPr>
-        <p:blipFill>
-          <a:blip r:embed="rId4">
-            <a:extLst>
-              <a:ext uri="{28A0092B-C50C-407E-A947-70E740481C1C}">
-                <a14:useLocalDpi xmlns:a14="http://schemas.microsoft.com/office/drawing/2010/main" val="0"/>
-              </a:ext>
-            </a:extLst>
-          </a:blip>
-          <a:stretch>
-            <a:fillRect/>
-          </a:stretch>
-        </p:blipFill>
-        <p:spPr>
-          <a:xfrm rot="5400000">
-            <a:off x="2827731" y="160190"/>
-            <a:ext cx="2438400" cy="2438400"/>
-          </a:xfrm>
-          <a:prstGeom prst="rect">
-            <a:avLst/>
-          </a:prstGeom>
-        </p:spPr>
-      </p:pic>
-    </p:spTree>
-    <p:extLst>
-      <p:ext uri="{BB962C8B-B14F-4D97-AF65-F5344CB8AC3E}">
-        <p14:creationId xmlns:p14="http://schemas.microsoft.com/office/powerpoint/2010/main" val="1492174276"/>
-      </p:ext>
-    </p:extLst>
-  </p:cSld>
-  <p:clrMapOvr>
-    <a:masterClrMapping/>
-  </p:clrMapOvr>
-</p:sld>
-</file>
-
 <file path=ppt/slides/slide2.xml><?xml version="1.0" encoding="utf-8"?>
 <p:sld xmlns:a="http://schemas.openxmlformats.org/drawingml/2006/main" xmlns:r="http://schemas.openxmlformats.org/officeDocument/2006/relationships" xmlns:p="http://schemas.openxmlformats.org/presentationml/2006/main">
   <p:cSld>
@@ -6451,6 +6232,295 @@
       </p:pic>
       <p:sp>
         <p:nvSpPr>
+          <p:cNvPr id="8" name="CuadroTexto 7">
+            <a:extLst>
+              <a:ext uri="{FF2B5EF4-FFF2-40B4-BE49-F238E27FC236}">
+                <a16:creationId xmlns:a16="http://schemas.microsoft.com/office/drawing/2014/main" id="{87D8C68F-3C3F-474E-B2E2-87E9ABCA7C2D}"/>
+              </a:ext>
+            </a:extLst>
+          </p:cNvPr>
+          <p:cNvSpPr txBox="1"/>
+          <p:nvPr/>
+        </p:nvSpPr>
+        <p:spPr>
+          <a:xfrm>
+            <a:off x="1325461" y="645952"/>
+            <a:ext cx="964734" cy="369332"/>
+          </a:xfrm>
+          <a:prstGeom prst="rect">
+            <a:avLst/>
+          </a:prstGeom>
+          <a:solidFill>
+            <a:schemeClr val="bg1">
+              <a:lumMod val="75000"/>
+            </a:schemeClr>
+          </a:solidFill>
+          <a:ln>
+            <a:solidFill>
+              <a:schemeClr val="tx1"/>
+            </a:solidFill>
+          </a:ln>
+        </p:spPr>
+        <p:txBody>
+          <a:bodyPr wrap="square" rtlCol="0">
+            <a:spAutoFit/>
+          </a:bodyPr>
+          <a:lstStyle/>
+          <a:p>
+            <a:r>
+              <a:rPr lang="es-ES" dirty="0"/>
+              <a:t>File</a:t>
+            </a:r>
+          </a:p>
+        </p:txBody>
+      </p:sp>
+      <p:sp>
+        <p:nvSpPr>
+          <p:cNvPr id="9" name="CuadroTexto 8">
+            <a:extLst>
+              <a:ext uri="{FF2B5EF4-FFF2-40B4-BE49-F238E27FC236}">
+                <a16:creationId xmlns:a16="http://schemas.microsoft.com/office/drawing/2014/main" id="{69B7775D-6619-47FA-95FC-2BFF98F90E33}"/>
+              </a:ext>
+            </a:extLst>
+          </p:cNvPr>
+          <p:cNvSpPr txBox="1"/>
+          <p:nvPr/>
+        </p:nvSpPr>
+        <p:spPr>
+          <a:xfrm>
+            <a:off x="1476461" y="1015284"/>
+            <a:ext cx="1325461" cy="307777"/>
+          </a:xfrm>
+          <a:prstGeom prst="rect">
+            <a:avLst/>
+          </a:prstGeom>
+          <a:solidFill>
+            <a:schemeClr val="bg1">
+              <a:lumMod val="75000"/>
+            </a:schemeClr>
+          </a:solidFill>
+          <a:ln>
+            <a:solidFill>
+              <a:schemeClr val="tx1"/>
+            </a:solidFill>
+          </a:ln>
+        </p:spPr>
+        <p:txBody>
+          <a:bodyPr wrap="square" rtlCol="0">
+            <a:spAutoFit/>
+          </a:bodyPr>
+          <a:lstStyle/>
+          <a:p>
+            <a:r>
+              <a:rPr lang="es-ES" sz="1400" dirty="0"/>
+              <a:t>Load </a:t>
+            </a:r>
+            <a:r>
+              <a:rPr lang="es-ES" sz="1400" dirty="0" err="1"/>
+              <a:t>track</a:t>
+            </a:r>
+            <a:endParaRPr lang="es-ES" sz="1400" dirty="0"/>
+          </a:p>
+        </p:txBody>
+      </p:sp>
+      <p:sp>
+        <p:nvSpPr>
+          <p:cNvPr id="10" name="CuadroTexto 9">
+            <a:extLst>
+              <a:ext uri="{FF2B5EF4-FFF2-40B4-BE49-F238E27FC236}">
+                <a16:creationId xmlns:a16="http://schemas.microsoft.com/office/drawing/2014/main" id="{E6B399B8-DA52-4C30-972E-53ADA9421924}"/>
+              </a:ext>
+            </a:extLst>
+          </p:cNvPr>
+          <p:cNvSpPr txBox="1"/>
+          <p:nvPr/>
+        </p:nvSpPr>
+        <p:spPr>
+          <a:xfrm>
+            <a:off x="1476460" y="1323061"/>
+            <a:ext cx="1325461" cy="307777"/>
+          </a:xfrm>
+          <a:prstGeom prst="rect">
+            <a:avLst/>
+          </a:prstGeom>
+          <a:solidFill>
+            <a:schemeClr val="bg1">
+              <a:lumMod val="75000"/>
+            </a:schemeClr>
+          </a:solidFill>
+          <a:ln>
+            <a:solidFill>
+              <a:schemeClr val="tx1"/>
+            </a:solidFill>
+          </a:ln>
+        </p:spPr>
+        <p:txBody>
+          <a:bodyPr wrap="square" rtlCol="0">
+            <a:spAutoFit/>
+          </a:bodyPr>
+          <a:lstStyle/>
+          <a:p>
+            <a:r>
+              <a:rPr lang="es-ES" sz="1400" dirty="0"/>
+              <a:t>Load </a:t>
+            </a:r>
+            <a:r>
+              <a:rPr lang="es-ES" sz="1400" dirty="0" err="1"/>
+              <a:t>session</a:t>
+            </a:r>
+            <a:endParaRPr lang="es-ES" sz="1400" dirty="0"/>
+          </a:p>
+        </p:txBody>
+      </p:sp>
+      <p:sp>
+        <p:nvSpPr>
+          <p:cNvPr id="11" name="CuadroTexto 10">
+            <a:extLst>
+              <a:ext uri="{FF2B5EF4-FFF2-40B4-BE49-F238E27FC236}">
+                <a16:creationId xmlns:a16="http://schemas.microsoft.com/office/drawing/2014/main" id="{D9B563DB-707C-4CD4-803E-C6573FDAE050}"/>
+              </a:ext>
+            </a:extLst>
+          </p:cNvPr>
+          <p:cNvSpPr txBox="1"/>
+          <p:nvPr/>
+        </p:nvSpPr>
+        <p:spPr>
+          <a:xfrm>
+            <a:off x="1476460" y="1615478"/>
+            <a:ext cx="1325461" cy="307777"/>
+          </a:xfrm>
+          <a:prstGeom prst="rect">
+            <a:avLst/>
+          </a:prstGeom>
+          <a:solidFill>
+            <a:schemeClr val="bg1">
+              <a:lumMod val="75000"/>
+            </a:schemeClr>
+          </a:solidFill>
+          <a:ln>
+            <a:solidFill>
+              <a:schemeClr val="tx1"/>
+            </a:solidFill>
+          </a:ln>
+        </p:spPr>
+        <p:txBody>
+          <a:bodyPr wrap="square" rtlCol="0">
+            <a:spAutoFit/>
+          </a:bodyPr>
+          <a:lstStyle/>
+          <a:p>
+            <a:r>
+              <a:rPr lang="es-ES" sz="1400" dirty="0"/>
+              <a:t>New </a:t>
+            </a:r>
+            <a:r>
+              <a:rPr lang="es-ES" sz="1400" dirty="0" err="1"/>
+              <a:t>session</a:t>
+            </a:r>
+            <a:endParaRPr lang="es-ES" sz="1400" dirty="0"/>
+          </a:p>
+        </p:txBody>
+      </p:sp>
+      <p:sp>
+        <p:nvSpPr>
+          <p:cNvPr id="12" name="CuadroTexto 11">
+            <a:extLst>
+              <a:ext uri="{FF2B5EF4-FFF2-40B4-BE49-F238E27FC236}">
+                <a16:creationId xmlns:a16="http://schemas.microsoft.com/office/drawing/2014/main" id="{33980FAD-8BDF-4D61-BA99-FBF4A8BD191D}"/>
+              </a:ext>
+            </a:extLst>
+          </p:cNvPr>
+          <p:cNvSpPr txBox="1"/>
+          <p:nvPr/>
+        </p:nvSpPr>
+        <p:spPr>
+          <a:xfrm>
+            <a:off x="1476460" y="1905363"/>
+            <a:ext cx="1325461" cy="307777"/>
+          </a:xfrm>
+          <a:prstGeom prst="rect">
+            <a:avLst/>
+          </a:prstGeom>
+          <a:solidFill>
+            <a:schemeClr val="bg1">
+              <a:lumMod val="75000"/>
+            </a:schemeClr>
+          </a:solidFill>
+          <a:ln>
+            <a:solidFill>
+              <a:schemeClr val="tx1"/>
+            </a:solidFill>
+          </a:ln>
+        </p:spPr>
+        <p:txBody>
+          <a:bodyPr wrap="square" rtlCol="0">
+            <a:spAutoFit/>
+          </a:bodyPr>
+          <a:lstStyle/>
+          <a:p>
+            <a:r>
+              <a:rPr lang="es-ES" sz="1400" dirty="0" err="1"/>
+              <a:t>Save</a:t>
+            </a:r>
+            <a:r>
+              <a:rPr lang="es-ES" sz="1400" dirty="0"/>
+              <a:t> </a:t>
+            </a:r>
+            <a:r>
+              <a:rPr lang="es-ES" sz="1400" dirty="0" err="1"/>
+              <a:t>session</a:t>
+            </a:r>
+            <a:endParaRPr lang="es-ES" sz="1400" dirty="0"/>
+          </a:p>
+        </p:txBody>
+      </p:sp>
+      <p:sp>
+        <p:nvSpPr>
+          <p:cNvPr id="13" name="CuadroTexto 12">
+            <a:extLst>
+              <a:ext uri="{FF2B5EF4-FFF2-40B4-BE49-F238E27FC236}">
+                <a16:creationId xmlns:a16="http://schemas.microsoft.com/office/drawing/2014/main" id="{785F6E4A-3AFF-444D-931D-D0FEA190FED5}"/>
+              </a:ext>
+            </a:extLst>
+          </p:cNvPr>
+          <p:cNvSpPr txBox="1"/>
+          <p:nvPr/>
+        </p:nvSpPr>
+        <p:spPr>
+          <a:xfrm>
+            <a:off x="1476459" y="2213140"/>
+            <a:ext cx="1325461" cy="307777"/>
+          </a:xfrm>
+          <a:prstGeom prst="rect">
+            <a:avLst/>
+          </a:prstGeom>
+          <a:solidFill>
+            <a:schemeClr val="bg1">
+              <a:lumMod val="75000"/>
+            </a:schemeClr>
+          </a:solidFill>
+          <a:ln>
+            <a:solidFill>
+              <a:schemeClr val="tx1"/>
+            </a:solidFill>
+          </a:ln>
+        </p:spPr>
+        <p:txBody>
+          <a:bodyPr wrap="square" rtlCol="0">
+            <a:spAutoFit/>
+          </a:bodyPr>
+          <a:lstStyle/>
+          <a:p>
+            <a:r>
+              <a:rPr lang="es-ES" sz="1400" dirty="0" err="1"/>
+              <a:t>Exit</a:t>
+            </a:r>
+            <a:endParaRPr lang="es-ES" sz="1400" dirty="0"/>
+          </a:p>
+        </p:txBody>
+      </p:sp>
+      <p:sp>
+        <p:nvSpPr>
           <p:cNvPr id="14" name="CuadroTexto 13">
             <a:extLst>
               <a:ext uri="{FF2B5EF4-FFF2-40B4-BE49-F238E27FC236}">
@@ -6464,7 +6534,7 @@
         <p:spPr>
           <a:xfrm>
             <a:off x="8783273" y="234892"/>
-            <a:ext cx="3087149" cy="2308324"/>
+            <a:ext cx="3087149" cy="1477328"/>
           </a:xfrm>
           <a:prstGeom prst="rect">
             <a:avLst/>
@@ -6490,6 +6560,1383 @@
             <a:r>
               <a:rPr lang="es-ES" dirty="0"/>
               <a:t>V00.04</a:t>
+            </a:r>
+          </a:p>
+          <a:p>
+            <a:pPr marL="285750" indent="-285750">
+              <a:buFontTx/>
+              <a:buChar char="-"/>
+            </a:pPr>
+            <a:r>
+              <a:rPr lang="es-ES" dirty="0" err="1"/>
+              <a:t>Summary</a:t>
+            </a:r>
+            <a:r>
+              <a:rPr lang="es-ES" dirty="0"/>
+              <a:t> </a:t>
+            </a:r>
+            <a:r>
+              <a:rPr lang="es-ES" dirty="0" err="1"/>
+              <a:t>of</a:t>
+            </a:r>
+            <a:r>
+              <a:rPr lang="es-ES" dirty="0"/>
+              <a:t> full </a:t>
+            </a:r>
+            <a:r>
+              <a:rPr lang="es-ES" dirty="0" err="1"/>
+              <a:t>track</a:t>
+            </a:r>
+            <a:r>
+              <a:rPr lang="es-ES" dirty="0"/>
+              <a:t> in table and single </a:t>
+            </a:r>
+            <a:r>
+              <a:rPr lang="es-ES" dirty="0" err="1"/>
+              <a:t>segments</a:t>
+            </a:r>
+            <a:endParaRPr lang="es-ES" dirty="0"/>
+          </a:p>
+          <a:p>
+            <a:endParaRPr lang="es-ES" dirty="0"/>
+          </a:p>
+        </p:txBody>
+      </p:sp>
+      <p:grpSp>
+        <p:nvGrpSpPr>
+          <p:cNvPr id="18" name="Grupo 17">
+            <a:extLst>
+              <a:ext uri="{FF2B5EF4-FFF2-40B4-BE49-F238E27FC236}">
+                <a16:creationId xmlns:a16="http://schemas.microsoft.com/office/drawing/2014/main" id="{CE082FDB-5094-4F0F-8661-7B8640501D0A}"/>
+              </a:ext>
+            </a:extLst>
+          </p:cNvPr>
+          <p:cNvGrpSpPr/>
+          <p:nvPr/>
+        </p:nvGrpSpPr>
+        <p:grpSpPr>
+          <a:xfrm>
+            <a:off x="7945770" y="3897247"/>
+            <a:ext cx="267052" cy="615554"/>
+            <a:chOff x="8851781" y="2520917"/>
+            <a:chExt cx="267052" cy="615554"/>
+          </a:xfrm>
+        </p:grpSpPr>
+        <p:sp>
+          <p:nvSpPr>
+            <p:cNvPr id="16" name="CuadroTexto 15">
+              <a:extLst>
+                <a:ext uri="{FF2B5EF4-FFF2-40B4-BE49-F238E27FC236}">
+                  <a16:creationId xmlns:a16="http://schemas.microsoft.com/office/drawing/2014/main" id="{19713EAB-5261-4665-91F7-2DFD19C8A273}"/>
+                </a:ext>
+              </a:extLst>
+            </p:cNvPr>
+            <p:cNvSpPr txBox="1"/>
+            <p:nvPr/>
+          </p:nvSpPr>
+          <p:spPr>
+            <a:xfrm>
+              <a:off x="8851782" y="2520917"/>
+              <a:ext cx="267051" cy="307777"/>
+            </a:xfrm>
+            <a:prstGeom prst="rect">
+              <a:avLst/>
+            </a:prstGeom>
+            <a:solidFill>
+              <a:schemeClr val="bg1">
+                <a:lumMod val="85000"/>
+              </a:schemeClr>
+            </a:solidFill>
+            <a:ln>
+              <a:solidFill>
+                <a:schemeClr val="tx1"/>
+              </a:solidFill>
+            </a:ln>
+          </p:spPr>
+          <p:txBody>
+            <a:bodyPr wrap="square" rtlCol="0">
+              <a:spAutoFit/>
+            </a:bodyPr>
+            <a:lstStyle/>
+            <a:p>
+              <a:pPr algn="ctr"/>
+              <a:r>
+                <a:rPr lang="es-ES" sz="1400" dirty="0"/>
+                <a:t>+</a:t>
+              </a:r>
+            </a:p>
+          </p:txBody>
+        </p:sp>
+        <p:sp>
+          <p:nvSpPr>
+            <p:cNvPr id="17" name="CuadroTexto 16">
+              <a:extLst>
+                <a:ext uri="{FF2B5EF4-FFF2-40B4-BE49-F238E27FC236}">
+                  <a16:creationId xmlns:a16="http://schemas.microsoft.com/office/drawing/2014/main" id="{F98C1302-45BF-449D-BD36-6743087E2F05}"/>
+                </a:ext>
+              </a:extLst>
+            </p:cNvPr>
+            <p:cNvSpPr txBox="1"/>
+            <p:nvPr/>
+          </p:nvSpPr>
+          <p:spPr>
+            <a:xfrm>
+              <a:off x="8851781" y="2828694"/>
+              <a:ext cx="267051" cy="307777"/>
+            </a:xfrm>
+            <a:prstGeom prst="rect">
+              <a:avLst/>
+            </a:prstGeom>
+            <a:solidFill>
+              <a:schemeClr val="bg1">
+                <a:lumMod val="85000"/>
+              </a:schemeClr>
+            </a:solidFill>
+            <a:ln>
+              <a:solidFill>
+                <a:schemeClr val="tx1"/>
+              </a:solidFill>
+            </a:ln>
+          </p:spPr>
+          <p:txBody>
+            <a:bodyPr wrap="square" rtlCol="0">
+              <a:spAutoFit/>
+            </a:bodyPr>
+            <a:lstStyle/>
+            <a:p>
+              <a:pPr algn="ctr"/>
+              <a:r>
+                <a:rPr lang="es-ES" sz="1400" dirty="0"/>
+                <a:t>-</a:t>
+              </a:r>
+            </a:p>
+          </p:txBody>
+        </p:sp>
+      </p:grpSp>
+      <p:sp>
+        <p:nvSpPr>
+          <p:cNvPr id="2" name="CuadroTexto 1">
+            <a:extLst>
+              <a:ext uri="{FF2B5EF4-FFF2-40B4-BE49-F238E27FC236}">
+                <a16:creationId xmlns:a16="http://schemas.microsoft.com/office/drawing/2014/main" id="{13EBE1A3-05B8-4CBB-94EE-98EFCC3BCE00}"/>
+              </a:ext>
+            </a:extLst>
+          </p:cNvPr>
+          <p:cNvSpPr txBox="1"/>
+          <p:nvPr/>
+        </p:nvSpPr>
+        <p:spPr>
+          <a:xfrm>
+            <a:off x="8513878" y="2278600"/>
+            <a:ext cx="2201663" cy="923330"/>
+          </a:xfrm>
+          <a:prstGeom prst="rect">
+            <a:avLst/>
+          </a:prstGeom>
+          <a:noFill/>
+          <a:ln w="6350">
+            <a:solidFill>
+              <a:schemeClr val="tx1"/>
+            </a:solidFill>
+          </a:ln>
+        </p:spPr>
+        <p:txBody>
+          <a:bodyPr wrap="square" rtlCol="0">
+            <a:spAutoFit/>
+          </a:bodyPr>
+          <a:lstStyle/>
+          <a:p>
+            <a:r>
+              <a:rPr lang="es-ES" dirty="0"/>
+              <a:t>Total </a:t>
+            </a:r>
+            <a:r>
+              <a:rPr lang="es-ES" dirty="0" err="1"/>
+              <a:t>distance</a:t>
+            </a:r>
+            <a:endParaRPr lang="es-ES" dirty="0"/>
+          </a:p>
+          <a:p>
+            <a:r>
+              <a:rPr lang="es-ES" dirty="0" err="1"/>
+              <a:t>Uphill</a:t>
+            </a:r>
+            <a:r>
+              <a:rPr lang="es-ES" dirty="0"/>
+              <a:t> </a:t>
+            </a:r>
+            <a:r>
+              <a:rPr lang="es-ES" dirty="0" err="1"/>
+              <a:t>elevation</a:t>
+            </a:r>
+            <a:endParaRPr lang="es-ES" dirty="0"/>
+          </a:p>
+          <a:p>
+            <a:r>
+              <a:rPr lang="es-ES" dirty="0" err="1"/>
+              <a:t>Downhill</a:t>
+            </a:r>
+            <a:r>
+              <a:rPr lang="es-ES" dirty="0"/>
+              <a:t> </a:t>
+            </a:r>
+            <a:r>
+              <a:rPr lang="es-ES" dirty="0" err="1"/>
+              <a:t>elevation</a:t>
+            </a:r>
+            <a:endParaRPr lang="es-ES" dirty="0"/>
+          </a:p>
+        </p:txBody>
+      </p:sp>
+      <p:pic>
+        <p:nvPicPr>
+          <p:cNvPr id="19" name="Picture 2" descr="Rendered Image">
+            <a:extLst>
+              <a:ext uri="{FF2B5EF4-FFF2-40B4-BE49-F238E27FC236}">
+                <a16:creationId xmlns:a16="http://schemas.microsoft.com/office/drawing/2014/main" id="{C873BD29-DB74-4368-82A1-D91AF8E68B7B}"/>
+              </a:ext>
+            </a:extLst>
+          </p:cNvPr>
+          <p:cNvPicPr>
+            <a:picLocks noChangeAspect="1" noChangeArrowheads="1"/>
+          </p:cNvPicPr>
+          <p:nvPr/>
+        </p:nvPicPr>
+        <p:blipFill>
+          <a:blip r:embed="rId4">
+            <a:extLst>
+              <a:ext uri="{28A0092B-C50C-407E-A947-70E740481C1C}">
+                <a14:useLocalDpi xmlns:a14="http://schemas.microsoft.com/office/drawing/2010/main" val="0"/>
+              </a:ext>
+            </a:extLst>
+          </a:blip>
+          <a:srcRect/>
+          <a:stretch>
+            <a:fillRect/>
+          </a:stretch>
+        </p:blipFill>
+        <p:spPr bwMode="auto">
+          <a:xfrm>
+            <a:off x="598240" y="5134504"/>
+            <a:ext cx="2019300" cy="1057275"/>
+          </a:xfrm>
+          <a:prstGeom prst="rect">
+            <a:avLst/>
+          </a:prstGeom>
+          <a:noFill/>
+          <a:extLst>
+            <a:ext uri="{909E8E84-426E-40DD-AFC4-6F175D3DCCD1}">
+              <a14:hiddenFill xmlns:a14="http://schemas.microsoft.com/office/drawing/2010/main">
+                <a:solidFill>
+                  <a:srgbClr val="FFFFFF"/>
+                </a:solidFill>
+              </a14:hiddenFill>
+            </a:ext>
+          </a:extLst>
+        </p:spPr>
+      </p:pic>
+    </p:spTree>
+    <p:extLst>
+      <p:ext uri="{BB962C8B-B14F-4D97-AF65-F5344CB8AC3E}">
+        <p14:creationId xmlns:p14="http://schemas.microsoft.com/office/powerpoint/2010/main" val="3703521982"/>
+      </p:ext>
+    </p:extLst>
+  </p:cSld>
+  <p:clrMapOvr>
+    <a:masterClrMapping/>
+  </p:clrMapOvr>
+</p:sld>
+</file>
+
+<file path=ppt/slides/slide6.xml><?xml version="1.0" encoding="utf-8"?>
+<p:sld xmlns:a="http://schemas.openxmlformats.org/drawingml/2006/main" xmlns:r="http://schemas.openxmlformats.org/officeDocument/2006/relationships" xmlns:p="http://schemas.openxmlformats.org/presentationml/2006/main">
+  <p:cSld>
+    <p:spTree>
+      <p:nvGrpSpPr>
+        <p:cNvPr id="1" name=""/>
+        <p:cNvGrpSpPr/>
+        <p:nvPr/>
+      </p:nvGrpSpPr>
+      <p:grpSpPr>
+        <a:xfrm>
+          <a:off x="0" y="0"/>
+          <a:ext cx="0" cy="0"/>
+          <a:chOff x="0" y="0"/>
+          <a:chExt cx="0" cy="0"/>
+        </a:xfrm>
+      </p:grpSpPr>
+      <p:pic>
+        <p:nvPicPr>
+          <p:cNvPr id="5" name="Imagen 4">
+            <a:extLst>
+              <a:ext uri="{FF2B5EF4-FFF2-40B4-BE49-F238E27FC236}">
+                <a16:creationId xmlns:a16="http://schemas.microsoft.com/office/drawing/2014/main" id="{20B84089-D466-4D04-9783-CB6ADAAD6C96}"/>
+              </a:ext>
+            </a:extLst>
+          </p:cNvPr>
+          <p:cNvPicPr>
+            <a:picLocks noChangeAspect="1"/>
+          </p:cNvPicPr>
+          <p:nvPr/>
+        </p:nvPicPr>
+        <p:blipFill>
+          <a:blip r:embed="rId2"/>
+          <a:stretch>
+            <a:fillRect/>
+          </a:stretch>
+        </p:blipFill>
+        <p:spPr>
+          <a:xfrm>
+            <a:off x="3318057" y="1193683"/>
+            <a:ext cx="5087713" cy="3562875"/>
+          </a:xfrm>
+          <a:prstGeom prst="rect">
+            <a:avLst/>
+          </a:prstGeom>
+        </p:spPr>
+      </p:pic>
+      <p:sp>
+        <p:nvSpPr>
+          <p:cNvPr id="8" name="CuadroTexto 7">
+            <a:extLst>
+              <a:ext uri="{FF2B5EF4-FFF2-40B4-BE49-F238E27FC236}">
+                <a16:creationId xmlns:a16="http://schemas.microsoft.com/office/drawing/2014/main" id="{87D8C68F-3C3F-474E-B2E2-87E9ABCA7C2D}"/>
+              </a:ext>
+            </a:extLst>
+          </p:cNvPr>
+          <p:cNvSpPr txBox="1"/>
+          <p:nvPr/>
+        </p:nvSpPr>
+        <p:spPr>
+          <a:xfrm>
+            <a:off x="1325461" y="645952"/>
+            <a:ext cx="964734" cy="369332"/>
+          </a:xfrm>
+          <a:prstGeom prst="rect">
+            <a:avLst/>
+          </a:prstGeom>
+          <a:solidFill>
+            <a:schemeClr val="bg1">
+              <a:lumMod val="75000"/>
+            </a:schemeClr>
+          </a:solidFill>
+          <a:ln>
+            <a:solidFill>
+              <a:schemeClr val="tx1"/>
+            </a:solidFill>
+          </a:ln>
+        </p:spPr>
+        <p:txBody>
+          <a:bodyPr wrap="square" rtlCol="0">
+            <a:spAutoFit/>
+          </a:bodyPr>
+          <a:lstStyle/>
+          <a:p>
+            <a:r>
+              <a:rPr lang="es-ES" dirty="0"/>
+              <a:t>File</a:t>
+            </a:r>
+          </a:p>
+        </p:txBody>
+      </p:sp>
+      <p:sp>
+        <p:nvSpPr>
+          <p:cNvPr id="9" name="CuadroTexto 8">
+            <a:extLst>
+              <a:ext uri="{FF2B5EF4-FFF2-40B4-BE49-F238E27FC236}">
+                <a16:creationId xmlns:a16="http://schemas.microsoft.com/office/drawing/2014/main" id="{69B7775D-6619-47FA-95FC-2BFF98F90E33}"/>
+              </a:ext>
+            </a:extLst>
+          </p:cNvPr>
+          <p:cNvSpPr txBox="1"/>
+          <p:nvPr/>
+        </p:nvSpPr>
+        <p:spPr>
+          <a:xfrm>
+            <a:off x="1476461" y="1015284"/>
+            <a:ext cx="1325461" cy="307777"/>
+          </a:xfrm>
+          <a:prstGeom prst="rect">
+            <a:avLst/>
+          </a:prstGeom>
+          <a:solidFill>
+            <a:schemeClr val="bg1">
+              <a:lumMod val="75000"/>
+            </a:schemeClr>
+          </a:solidFill>
+          <a:ln>
+            <a:solidFill>
+              <a:schemeClr val="tx1"/>
+            </a:solidFill>
+          </a:ln>
+        </p:spPr>
+        <p:txBody>
+          <a:bodyPr wrap="square" rtlCol="0">
+            <a:spAutoFit/>
+          </a:bodyPr>
+          <a:lstStyle/>
+          <a:p>
+            <a:r>
+              <a:rPr lang="es-ES" sz="1400" dirty="0"/>
+              <a:t>Load </a:t>
+            </a:r>
+            <a:r>
+              <a:rPr lang="es-ES" sz="1400" dirty="0" err="1"/>
+              <a:t>track</a:t>
+            </a:r>
+            <a:endParaRPr lang="es-ES" sz="1400" dirty="0"/>
+          </a:p>
+        </p:txBody>
+      </p:sp>
+      <p:sp>
+        <p:nvSpPr>
+          <p:cNvPr id="10" name="CuadroTexto 9">
+            <a:extLst>
+              <a:ext uri="{FF2B5EF4-FFF2-40B4-BE49-F238E27FC236}">
+                <a16:creationId xmlns:a16="http://schemas.microsoft.com/office/drawing/2014/main" id="{E6B399B8-DA52-4C30-972E-53ADA9421924}"/>
+              </a:ext>
+            </a:extLst>
+          </p:cNvPr>
+          <p:cNvSpPr txBox="1"/>
+          <p:nvPr/>
+        </p:nvSpPr>
+        <p:spPr>
+          <a:xfrm>
+            <a:off x="1476460" y="1323061"/>
+            <a:ext cx="1325461" cy="307777"/>
+          </a:xfrm>
+          <a:prstGeom prst="rect">
+            <a:avLst/>
+          </a:prstGeom>
+          <a:solidFill>
+            <a:schemeClr val="bg1">
+              <a:lumMod val="75000"/>
+            </a:schemeClr>
+          </a:solidFill>
+          <a:ln>
+            <a:solidFill>
+              <a:schemeClr val="tx1"/>
+            </a:solidFill>
+          </a:ln>
+        </p:spPr>
+        <p:txBody>
+          <a:bodyPr wrap="square" rtlCol="0">
+            <a:spAutoFit/>
+          </a:bodyPr>
+          <a:lstStyle/>
+          <a:p>
+            <a:r>
+              <a:rPr lang="es-ES" sz="1400" dirty="0"/>
+              <a:t>Load </a:t>
+            </a:r>
+            <a:r>
+              <a:rPr lang="es-ES" sz="1400" dirty="0" err="1"/>
+              <a:t>session</a:t>
+            </a:r>
+            <a:endParaRPr lang="es-ES" sz="1400" dirty="0"/>
+          </a:p>
+        </p:txBody>
+      </p:sp>
+      <p:sp>
+        <p:nvSpPr>
+          <p:cNvPr id="11" name="CuadroTexto 10">
+            <a:extLst>
+              <a:ext uri="{FF2B5EF4-FFF2-40B4-BE49-F238E27FC236}">
+                <a16:creationId xmlns:a16="http://schemas.microsoft.com/office/drawing/2014/main" id="{D9B563DB-707C-4CD4-803E-C6573FDAE050}"/>
+              </a:ext>
+            </a:extLst>
+          </p:cNvPr>
+          <p:cNvSpPr txBox="1"/>
+          <p:nvPr/>
+        </p:nvSpPr>
+        <p:spPr>
+          <a:xfrm>
+            <a:off x="1476460" y="1615478"/>
+            <a:ext cx="1325461" cy="307777"/>
+          </a:xfrm>
+          <a:prstGeom prst="rect">
+            <a:avLst/>
+          </a:prstGeom>
+          <a:solidFill>
+            <a:schemeClr val="bg1">
+              <a:lumMod val="75000"/>
+            </a:schemeClr>
+          </a:solidFill>
+          <a:ln>
+            <a:solidFill>
+              <a:schemeClr val="tx1"/>
+            </a:solidFill>
+          </a:ln>
+        </p:spPr>
+        <p:txBody>
+          <a:bodyPr wrap="square" rtlCol="0">
+            <a:spAutoFit/>
+          </a:bodyPr>
+          <a:lstStyle/>
+          <a:p>
+            <a:r>
+              <a:rPr lang="es-ES" sz="1400" dirty="0"/>
+              <a:t>New </a:t>
+            </a:r>
+            <a:r>
+              <a:rPr lang="es-ES" sz="1400" dirty="0" err="1"/>
+              <a:t>session</a:t>
+            </a:r>
+            <a:endParaRPr lang="es-ES" sz="1400" dirty="0"/>
+          </a:p>
+        </p:txBody>
+      </p:sp>
+      <p:sp>
+        <p:nvSpPr>
+          <p:cNvPr id="12" name="CuadroTexto 11">
+            <a:extLst>
+              <a:ext uri="{FF2B5EF4-FFF2-40B4-BE49-F238E27FC236}">
+                <a16:creationId xmlns:a16="http://schemas.microsoft.com/office/drawing/2014/main" id="{33980FAD-8BDF-4D61-BA99-FBF4A8BD191D}"/>
+              </a:ext>
+            </a:extLst>
+          </p:cNvPr>
+          <p:cNvSpPr txBox="1"/>
+          <p:nvPr/>
+        </p:nvSpPr>
+        <p:spPr>
+          <a:xfrm>
+            <a:off x="1476460" y="1905363"/>
+            <a:ext cx="1325461" cy="307777"/>
+          </a:xfrm>
+          <a:prstGeom prst="rect">
+            <a:avLst/>
+          </a:prstGeom>
+          <a:solidFill>
+            <a:schemeClr val="bg1">
+              <a:lumMod val="75000"/>
+            </a:schemeClr>
+          </a:solidFill>
+          <a:ln>
+            <a:solidFill>
+              <a:schemeClr val="tx1"/>
+            </a:solidFill>
+          </a:ln>
+        </p:spPr>
+        <p:txBody>
+          <a:bodyPr wrap="square" rtlCol="0">
+            <a:spAutoFit/>
+          </a:bodyPr>
+          <a:lstStyle/>
+          <a:p>
+            <a:r>
+              <a:rPr lang="es-ES" sz="1400" dirty="0" err="1"/>
+              <a:t>Save</a:t>
+            </a:r>
+            <a:r>
+              <a:rPr lang="es-ES" sz="1400" dirty="0"/>
+              <a:t> </a:t>
+            </a:r>
+            <a:r>
+              <a:rPr lang="es-ES" sz="1400" dirty="0" err="1"/>
+              <a:t>session</a:t>
+            </a:r>
+            <a:endParaRPr lang="es-ES" sz="1400" dirty="0"/>
+          </a:p>
+        </p:txBody>
+      </p:sp>
+      <p:sp>
+        <p:nvSpPr>
+          <p:cNvPr id="13" name="CuadroTexto 12">
+            <a:extLst>
+              <a:ext uri="{FF2B5EF4-FFF2-40B4-BE49-F238E27FC236}">
+                <a16:creationId xmlns:a16="http://schemas.microsoft.com/office/drawing/2014/main" id="{785F6E4A-3AFF-444D-931D-D0FEA190FED5}"/>
+              </a:ext>
+            </a:extLst>
+          </p:cNvPr>
+          <p:cNvSpPr txBox="1"/>
+          <p:nvPr/>
+        </p:nvSpPr>
+        <p:spPr>
+          <a:xfrm>
+            <a:off x="1476459" y="2213140"/>
+            <a:ext cx="1325461" cy="307777"/>
+          </a:xfrm>
+          <a:prstGeom prst="rect">
+            <a:avLst/>
+          </a:prstGeom>
+          <a:solidFill>
+            <a:schemeClr val="bg1">
+              <a:lumMod val="75000"/>
+            </a:schemeClr>
+          </a:solidFill>
+          <a:ln>
+            <a:solidFill>
+              <a:schemeClr val="tx1"/>
+            </a:solidFill>
+          </a:ln>
+        </p:spPr>
+        <p:txBody>
+          <a:bodyPr wrap="square" rtlCol="0">
+            <a:spAutoFit/>
+          </a:bodyPr>
+          <a:lstStyle/>
+          <a:p>
+            <a:r>
+              <a:rPr lang="es-ES" sz="1400" dirty="0" err="1"/>
+              <a:t>Exit</a:t>
+            </a:r>
+            <a:endParaRPr lang="es-ES" sz="1400" dirty="0"/>
+          </a:p>
+        </p:txBody>
+      </p:sp>
+      <p:sp>
+        <p:nvSpPr>
+          <p:cNvPr id="14" name="CuadroTexto 13">
+            <a:extLst>
+              <a:ext uri="{FF2B5EF4-FFF2-40B4-BE49-F238E27FC236}">
+                <a16:creationId xmlns:a16="http://schemas.microsoft.com/office/drawing/2014/main" id="{141CAC72-0D93-49C6-8913-A7593E1C4044}"/>
+              </a:ext>
+            </a:extLst>
+          </p:cNvPr>
+          <p:cNvSpPr txBox="1"/>
+          <p:nvPr/>
+        </p:nvSpPr>
+        <p:spPr>
+          <a:xfrm>
+            <a:off x="8854294" y="105013"/>
+            <a:ext cx="3087149" cy="1938992"/>
+          </a:xfrm>
+          <a:prstGeom prst="rect">
+            <a:avLst/>
+          </a:prstGeom>
+          <a:noFill/>
+        </p:spPr>
+        <p:txBody>
+          <a:bodyPr wrap="square" rtlCol="0">
+            <a:spAutoFit/>
+          </a:bodyPr>
+          <a:lstStyle/>
+          <a:p>
+            <a:r>
+              <a:rPr lang="es-ES" dirty="0"/>
+              <a:t>Notes:</a:t>
+            </a:r>
+          </a:p>
+          <a:p>
+            <a:pPr marL="285750" indent="-285750">
+              <a:buFontTx/>
+              <a:buChar char="-"/>
+            </a:pPr>
+            <a:r>
+              <a:rPr lang="es-ES" dirty="0"/>
+              <a:t>V00.05</a:t>
+            </a:r>
+          </a:p>
+          <a:p>
+            <a:pPr marL="285750" indent="-285750">
+              <a:buFontTx/>
+              <a:buChar char="-"/>
+            </a:pPr>
+            <a:r>
+              <a:rPr lang="es-ES" sz="1400" dirty="0" err="1"/>
+              <a:t>When</a:t>
+            </a:r>
+            <a:r>
+              <a:rPr lang="es-ES" sz="1400" dirty="0"/>
+              <a:t> </a:t>
+            </a:r>
+            <a:r>
+              <a:rPr lang="es-ES" sz="1400" dirty="0" err="1"/>
+              <a:t>selecting</a:t>
+            </a:r>
+            <a:r>
+              <a:rPr lang="es-ES" sz="1400" dirty="0"/>
+              <a:t> a line in </a:t>
+            </a:r>
+            <a:r>
+              <a:rPr lang="es-ES" sz="1400" dirty="0" err="1"/>
+              <a:t>the</a:t>
+            </a:r>
+            <a:r>
+              <a:rPr lang="es-ES" sz="1400" dirty="0"/>
+              <a:t> </a:t>
+            </a:r>
+            <a:r>
+              <a:rPr lang="es-ES" sz="1400" dirty="0" err="1"/>
+              <a:t>plot</a:t>
+            </a:r>
+            <a:r>
+              <a:rPr lang="es-ES" sz="1400" dirty="0"/>
+              <a:t>: </a:t>
+            </a:r>
+          </a:p>
+          <a:p>
+            <a:pPr marL="742950" lvl="1" indent="-285750">
+              <a:buFontTx/>
+              <a:buChar char="-"/>
+            </a:pPr>
+            <a:r>
+              <a:rPr lang="es-ES" sz="1400" dirty="0"/>
+              <a:t> </a:t>
+            </a:r>
+            <a:r>
+              <a:rPr lang="es-ES" sz="1400" dirty="0" err="1"/>
+              <a:t>its</a:t>
+            </a:r>
+            <a:r>
+              <a:rPr lang="es-ES" sz="1400" dirty="0"/>
+              <a:t> </a:t>
+            </a:r>
+            <a:r>
+              <a:rPr lang="es-ES" sz="1400" dirty="0" err="1"/>
+              <a:t>thickness</a:t>
+            </a:r>
+            <a:r>
+              <a:rPr lang="es-ES" sz="1400" dirty="0"/>
+              <a:t> </a:t>
+            </a:r>
+            <a:r>
+              <a:rPr lang="es-ES" sz="1400" dirty="0" err="1"/>
+              <a:t>is</a:t>
+            </a:r>
+            <a:r>
+              <a:rPr lang="es-ES" sz="1400" dirty="0"/>
+              <a:t> </a:t>
+            </a:r>
+            <a:r>
+              <a:rPr lang="es-ES" sz="1400" dirty="0" err="1"/>
+              <a:t>increased</a:t>
+            </a:r>
+            <a:endParaRPr lang="es-ES" sz="1400" dirty="0"/>
+          </a:p>
+          <a:p>
+            <a:pPr marL="742950" lvl="1" indent="-285750">
+              <a:buFontTx/>
+              <a:buChar char="-"/>
+            </a:pPr>
+            <a:r>
+              <a:rPr lang="es-ES" sz="1400" dirty="0" err="1"/>
+              <a:t>Elevation</a:t>
+            </a:r>
+            <a:r>
+              <a:rPr lang="es-ES" sz="1400" dirty="0"/>
+              <a:t> </a:t>
+            </a:r>
+            <a:r>
+              <a:rPr lang="es-ES" sz="1400" dirty="0" err="1"/>
+              <a:t>of</a:t>
+            </a:r>
+            <a:r>
+              <a:rPr lang="es-ES" sz="1400" dirty="0"/>
+              <a:t> </a:t>
+            </a:r>
+            <a:r>
+              <a:rPr lang="es-ES" sz="1400" dirty="0" err="1"/>
+              <a:t>that</a:t>
+            </a:r>
+            <a:r>
+              <a:rPr lang="es-ES" sz="1400" dirty="0"/>
+              <a:t> </a:t>
+            </a:r>
+            <a:r>
+              <a:rPr lang="es-ES" sz="1400" dirty="0" err="1"/>
+              <a:t>segment</a:t>
+            </a:r>
+            <a:r>
+              <a:rPr lang="es-ES" sz="1400" dirty="0"/>
+              <a:t> </a:t>
+            </a:r>
+            <a:r>
+              <a:rPr lang="es-ES" sz="1400" dirty="0" err="1"/>
+              <a:t>is</a:t>
+            </a:r>
+            <a:r>
+              <a:rPr lang="es-ES" sz="1400" dirty="0"/>
+              <a:t> </a:t>
+            </a:r>
+            <a:r>
+              <a:rPr lang="es-ES" sz="1400" dirty="0" err="1"/>
+              <a:t>displayd</a:t>
+            </a:r>
+            <a:endParaRPr lang="es-ES" sz="1400" dirty="0"/>
+          </a:p>
+          <a:p>
+            <a:pPr marL="742950" lvl="1" indent="-285750">
+              <a:buFontTx/>
+              <a:buChar char="-"/>
+            </a:pPr>
+            <a:r>
+              <a:rPr lang="es-ES" sz="1400" dirty="0" err="1"/>
+              <a:t>Information</a:t>
+            </a:r>
+            <a:r>
+              <a:rPr lang="es-ES" sz="1400" dirty="0"/>
+              <a:t> table </a:t>
+            </a:r>
+            <a:r>
+              <a:rPr lang="es-ES" sz="1400" dirty="0" err="1"/>
+              <a:t>for</a:t>
+            </a:r>
+            <a:r>
+              <a:rPr lang="es-ES" sz="1400" dirty="0"/>
+              <a:t> </a:t>
+            </a:r>
+            <a:r>
+              <a:rPr lang="es-ES" sz="1400" dirty="0" err="1"/>
+              <a:t>that</a:t>
+            </a:r>
+            <a:r>
+              <a:rPr lang="es-ES" sz="1400" dirty="0"/>
+              <a:t> single </a:t>
+            </a:r>
+            <a:r>
+              <a:rPr lang="es-ES" sz="1400" dirty="0" err="1"/>
+              <a:t>segment</a:t>
+            </a:r>
+            <a:r>
+              <a:rPr lang="es-ES" sz="1400" dirty="0"/>
+              <a:t> in </a:t>
+            </a:r>
+            <a:r>
+              <a:rPr lang="es-ES" sz="1400" dirty="0" err="1"/>
+              <a:t>bold</a:t>
+            </a:r>
+            <a:endParaRPr lang="es-ES" sz="1400" dirty="0"/>
+          </a:p>
+        </p:txBody>
+      </p:sp>
+      <p:grpSp>
+        <p:nvGrpSpPr>
+          <p:cNvPr id="18" name="Grupo 17">
+            <a:extLst>
+              <a:ext uri="{FF2B5EF4-FFF2-40B4-BE49-F238E27FC236}">
+                <a16:creationId xmlns:a16="http://schemas.microsoft.com/office/drawing/2014/main" id="{CE082FDB-5094-4F0F-8661-7B8640501D0A}"/>
+              </a:ext>
+            </a:extLst>
+          </p:cNvPr>
+          <p:cNvGrpSpPr/>
+          <p:nvPr/>
+        </p:nvGrpSpPr>
+        <p:grpSpPr>
+          <a:xfrm>
+            <a:off x="7945770" y="3897247"/>
+            <a:ext cx="267052" cy="615554"/>
+            <a:chOff x="8851781" y="2520917"/>
+            <a:chExt cx="267052" cy="615554"/>
+          </a:xfrm>
+        </p:grpSpPr>
+        <p:sp>
+          <p:nvSpPr>
+            <p:cNvPr id="16" name="CuadroTexto 15">
+              <a:extLst>
+                <a:ext uri="{FF2B5EF4-FFF2-40B4-BE49-F238E27FC236}">
+                  <a16:creationId xmlns:a16="http://schemas.microsoft.com/office/drawing/2014/main" id="{19713EAB-5261-4665-91F7-2DFD19C8A273}"/>
+                </a:ext>
+              </a:extLst>
+            </p:cNvPr>
+            <p:cNvSpPr txBox="1"/>
+            <p:nvPr/>
+          </p:nvSpPr>
+          <p:spPr>
+            <a:xfrm>
+              <a:off x="8851782" y="2520917"/>
+              <a:ext cx="267051" cy="307777"/>
+            </a:xfrm>
+            <a:prstGeom prst="rect">
+              <a:avLst/>
+            </a:prstGeom>
+            <a:solidFill>
+              <a:schemeClr val="bg1">
+                <a:lumMod val="85000"/>
+              </a:schemeClr>
+            </a:solidFill>
+            <a:ln>
+              <a:solidFill>
+                <a:schemeClr val="tx1"/>
+              </a:solidFill>
+            </a:ln>
+          </p:spPr>
+          <p:txBody>
+            <a:bodyPr wrap="square" rtlCol="0">
+              <a:spAutoFit/>
+            </a:bodyPr>
+            <a:lstStyle/>
+            <a:p>
+              <a:pPr algn="ctr"/>
+              <a:r>
+                <a:rPr lang="es-ES" sz="1400" dirty="0"/>
+                <a:t>+</a:t>
+              </a:r>
+            </a:p>
+          </p:txBody>
+        </p:sp>
+        <p:sp>
+          <p:nvSpPr>
+            <p:cNvPr id="17" name="CuadroTexto 16">
+              <a:extLst>
+                <a:ext uri="{FF2B5EF4-FFF2-40B4-BE49-F238E27FC236}">
+                  <a16:creationId xmlns:a16="http://schemas.microsoft.com/office/drawing/2014/main" id="{F98C1302-45BF-449D-BD36-6743087E2F05}"/>
+                </a:ext>
+              </a:extLst>
+            </p:cNvPr>
+            <p:cNvSpPr txBox="1"/>
+            <p:nvPr/>
+          </p:nvSpPr>
+          <p:spPr>
+            <a:xfrm>
+              <a:off x="8851781" y="2828694"/>
+              <a:ext cx="267051" cy="307777"/>
+            </a:xfrm>
+            <a:prstGeom prst="rect">
+              <a:avLst/>
+            </a:prstGeom>
+            <a:solidFill>
+              <a:schemeClr val="bg1">
+                <a:lumMod val="85000"/>
+              </a:schemeClr>
+            </a:solidFill>
+            <a:ln>
+              <a:solidFill>
+                <a:schemeClr val="tx1"/>
+              </a:solidFill>
+            </a:ln>
+          </p:spPr>
+          <p:txBody>
+            <a:bodyPr wrap="square" rtlCol="0">
+              <a:spAutoFit/>
+            </a:bodyPr>
+            <a:lstStyle/>
+            <a:p>
+              <a:pPr algn="ctr"/>
+              <a:r>
+                <a:rPr lang="es-ES" sz="1400" dirty="0"/>
+                <a:t>-</a:t>
+              </a:r>
+            </a:p>
+          </p:txBody>
+        </p:sp>
+      </p:grpSp>
+      <p:pic>
+        <p:nvPicPr>
+          <p:cNvPr id="15" name="Picture 2" descr="Rendered Image">
+            <a:extLst>
+              <a:ext uri="{FF2B5EF4-FFF2-40B4-BE49-F238E27FC236}">
+                <a16:creationId xmlns:a16="http://schemas.microsoft.com/office/drawing/2014/main" id="{7B2E289B-43CF-4B37-97C5-425FBF055A8C}"/>
+              </a:ext>
+            </a:extLst>
+          </p:cNvPr>
+          <p:cNvPicPr>
+            <a:picLocks noChangeAspect="1" noChangeArrowheads="1"/>
+          </p:cNvPicPr>
+          <p:nvPr/>
+        </p:nvPicPr>
+        <p:blipFill>
+          <a:blip r:embed="rId3">
+            <a:extLst>
+              <a:ext uri="{28A0092B-C50C-407E-A947-70E740481C1C}">
+                <a14:useLocalDpi xmlns:a14="http://schemas.microsoft.com/office/drawing/2010/main" val="0"/>
+              </a:ext>
+            </a:extLst>
+          </a:blip>
+          <a:srcRect/>
+          <a:stretch>
+            <a:fillRect/>
+          </a:stretch>
+        </p:blipFill>
+        <p:spPr bwMode="auto">
+          <a:xfrm>
+            <a:off x="324331" y="5331161"/>
+            <a:ext cx="2181225" cy="809625"/>
+          </a:xfrm>
+          <a:prstGeom prst="rect">
+            <a:avLst/>
+          </a:prstGeom>
+          <a:noFill/>
+          <a:extLst>
+            <a:ext uri="{909E8E84-426E-40DD-AFC4-6F175D3DCCD1}">
+              <a14:hiddenFill xmlns:a14="http://schemas.microsoft.com/office/drawing/2010/main">
+                <a:solidFill>
+                  <a:srgbClr val="FFFFFF"/>
+                </a:solidFill>
+              </a14:hiddenFill>
+            </a:ext>
+          </a:extLst>
+        </p:spPr>
+      </p:pic>
+      <p:sp>
+        <p:nvSpPr>
+          <p:cNvPr id="2" name="CuadroTexto 1">
+            <a:extLst>
+              <a:ext uri="{FF2B5EF4-FFF2-40B4-BE49-F238E27FC236}">
+                <a16:creationId xmlns:a16="http://schemas.microsoft.com/office/drawing/2014/main" id="{13EBE1A3-05B8-4CBB-94EE-98EFCC3BCE00}"/>
+              </a:ext>
+            </a:extLst>
+          </p:cNvPr>
+          <p:cNvSpPr txBox="1"/>
+          <p:nvPr/>
+        </p:nvSpPr>
+        <p:spPr>
+          <a:xfrm>
+            <a:off x="8646850" y="2213140"/>
+            <a:ext cx="2201663" cy="923330"/>
+          </a:xfrm>
+          <a:prstGeom prst="rect">
+            <a:avLst/>
+          </a:prstGeom>
+          <a:noFill/>
+          <a:ln w="6350">
+            <a:solidFill>
+              <a:schemeClr val="tx1"/>
+            </a:solidFill>
+          </a:ln>
+        </p:spPr>
+        <p:txBody>
+          <a:bodyPr wrap="square" rtlCol="0">
+            <a:spAutoFit/>
+          </a:bodyPr>
+          <a:lstStyle/>
+          <a:p>
+            <a:r>
+              <a:rPr lang="es-ES" dirty="0"/>
+              <a:t>Total </a:t>
+            </a:r>
+            <a:r>
+              <a:rPr lang="es-ES" dirty="0" err="1"/>
+              <a:t>distance</a:t>
+            </a:r>
+            <a:endParaRPr lang="es-ES" dirty="0"/>
+          </a:p>
+          <a:p>
+            <a:r>
+              <a:rPr lang="es-ES" dirty="0" err="1"/>
+              <a:t>Uphill</a:t>
+            </a:r>
+            <a:r>
+              <a:rPr lang="es-ES" dirty="0"/>
+              <a:t> </a:t>
+            </a:r>
+            <a:r>
+              <a:rPr lang="es-ES" dirty="0" err="1"/>
+              <a:t>elevation</a:t>
+            </a:r>
+            <a:endParaRPr lang="es-ES" dirty="0"/>
+          </a:p>
+          <a:p>
+            <a:r>
+              <a:rPr lang="es-ES" dirty="0" err="1"/>
+              <a:t>Downhill</a:t>
+            </a:r>
+            <a:r>
+              <a:rPr lang="es-ES" dirty="0"/>
+              <a:t> </a:t>
+            </a:r>
+            <a:r>
+              <a:rPr lang="es-ES" dirty="0" err="1"/>
+              <a:t>elevation</a:t>
+            </a:r>
+            <a:endParaRPr lang="es-ES" dirty="0"/>
+          </a:p>
+        </p:txBody>
+      </p:sp>
+      <p:sp>
+        <p:nvSpPr>
+          <p:cNvPr id="19" name="Flecha: hacia abajo 18">
+            <a:extLst>
+              <a:ext uri="{FF2B5EF4-FFF2-40B4-BE49-F238E27FC236}">
+                <a16:creationId xmlns:a16="http://schemas.microsoft.com/office/drawing/2014/main" id="{615D0BC7-ADE7-459C-B1BC-0D694DC7D9AE}"/>
+              </a:ext>
+            </a:extLst>
+          </p:cNvPr>
+          <p:cNvSpPr/>
+          <p:nvPr/>
+        </p:nvSpPr>
+        <p:spPr>
+          <a:xfrm rot="8514297">
+            <a:off x="10249956" y="3049430"/>
+            <a:ext cx="195309" cy="1695635"/>
+          </a:xfrm>
+          <a:prstGeom prst="downArrow">
+            <a:avLst/>
+          </a:prstGeom>
+        </p:spPr>
+        <p:style>
+          <a:lnRef idx="2">
+            <a:schemeClr val="accent1">
+              <a:shade val="50000"/>
+            </a:schemeClr>
+          </a:lnRef>
+          <a:fillRef idx="1">
+            <a:schemeClr val="accent1"/>
+          </a:fillRef>
+          <a:effectRef idx="0">
+            <a:schemeClr val="accent1"/>
+          </a:effectRef>
+          <a:fontRef idx="minor">
+            <a:schemeClr val="lt1"/>
+          </a:fontRef>
+        </p:style>
+        <p:txBody>
+          <a:bodyPr rtlCol="0" anchor="ctr"/>
+          <a:lstStyle/>
+          <a:p>
+            <a:pPr algn="ctr"/>
+            <a:endParaRPr lang="es-ES"/>
+          </a:p>
+        </p:txBody>
+      </p:sp>
+      <mc:AlternateContent xmlns:mc="http://schemas.openxmlformats.org/markup-compatibility/2006" xmlns:p14="http://schemas.microsoft.com/office/powerpoint/2010/main">
+        <mc:Choice Requires="p14">
+          <p:contentPart p14:bwMode="auto" r:id="rId4">
+            <p14:nvContentPartPr>
+              <p14:cNvPr id="22" name="Entrada de lápiz 21">
+                <a:extLst>
+                  <a:ext uri="{FF2B5EF4-FFF2-40B4-BE49-F238E27FC236}">
+                    <a16:creationId xmlns:a16="http://schemas.microsoft.com/office/drawing/2014/main" id="{5A236FC7-AB2F-44E3-821D-76E45DE63B8A}"/>
+                  </a:ext>
+                </a:extLst>
+              </p14:cNvPr>
+              <p14:cNvContentPartPr/>
+              <p14:nvPr/>
+            </p14:nvContentPartPr>
+            <p14:xfrm>
+              <a:off x="5063755" y="3342260"/>
+              <a:ext cx="537120" cy="443160"/>
+            </p14:xfrm>
+          </p:contentPart>
+        </mc:Choice>
+        <mc:Fallback xmlns="">
+          <p:pic>
+            <p:nvPicPr>
+              <p:cNvPr id="22" name="Entrada de lápiz 21">
+                <a:extLst>
+                  <a:ext uri="{FF2B5EF4-FFF2-40B4-BE49-F238E27FC236}">
+                    <a16:creationId xmlns:a16="http://schemas.microsoft.com/office/drawing/2014/main" id="{5A236FC7-AB2F-44E3-821D-76E45DE63B8A}"/>
+                  </a:ext>
+                </a:extLst>
+              </p:cNvPr>
+              <p:cNvPicPr/>
+              <p:nvPr/>
+            </p:nvPicPr>
+            <p:blipFill>
+              <a:blip r:embed="rId5"/>
+              <a:stretch>
+                <a:fillRect/>
+              </a:stretch>
+            </p:blipFill>
+            <p:spPr>
+              <a:xfrm>
+                <a:off x="5046115" y="3324620"/>
+                <a:ext cx="572760" cy="478800"/>
+              </a:xfrm>
+              <a:prstGeom prst="rect">
+                <a:avLst/>
+              </a:prstGeom>
+            </p:spPr>
+          </p:pic>
+        </mc:Fallback>
+      </mc:AlternateContent>
+      <p:pic>
+        <p:nvPicPr>
+          <p:cNvPr id="28" name="Imagen 27">
+            <a:extLst>
+              <a:ext uri="{FF2B5EF4-FFF2-40B4-BE49-F238E27FC236}">
+                <a16:creationId xmlns:a16="http://schemas.microsoft.com/office/drawing/2014/main" id="{291D2744-3EC0-4703-85C3-FFDDCAC12C9E}"/>
+              </a:ext>
+            </a:extLst>
+          </p:cNvPr>
+          <p:cNvPicPr>
+            <a:picLocks noChangeAspect="1"/>
+          </p:cNvPicPr>
+          <p:nvPr/>
+        </p:nvPicPr>
+        <p:blipFill>
+          <a:blip r:embed="rId6"/>
+          <a:stretch>
+            <a:fillRect/>
+          </a:stretch>
+        </p:blipFill>
+        <p:spPr>
+          <a:xfrm>
+            <a:off x="3263684" y="4799866"/>
+            <a:ext cx="5142086" cy="1770919"/>
+          </a:xfrm>
+          <a:prstGeom prst="rect">
+            <a:avLst/>
+          </a:prstGeom>
+        </p:spPr>
+      </p:pic>
+      <p:sp>
+        <p:nvSpPr>
+          <p:cNvPr id="3" name="Flecha: hacia abajo 2">
+            <a:extLst>
+              <a:ext uri="{FF2B5EF4-FFF2-40B4-BE49-F238E27FC236}">
+                <a16:creationId xmlns:a16="http://schemas.microsoft.com/office/drawing/2014/main" id="{71DE474A-0DE1-4B69-9232-D9BC8AF88DB1}"/>
+              </a:ext>
+            </a:extLst>
+          </p:cNvPr>
+          <p:cNvSpPr/>
+          <p:nvPr/>
+        </p:nvSpPr>
+        <p:spPr>
+          <a:xfrm rot="3380404">
+            <a:off x="8824250" y="4189566"/>
+            <a:ext cx="195309" cy="1695635"/>
+          </a:xfrm>
+          <a:prstGeom prst="downArrow">
+            <a:avLst/>
+          </a:prstGeom>
+        </p:spPr>
+        <p:style>
+          <a:lnRef idx="2">
+            <a:schemeClr val="accent1">
+              <a:shade val="50000"/>
+            </a:schemeClr>
+          </a:lnRef>
+          <a:fillRef idx="1">
+            <a:schemeClr val="accent1"/>
+          </a:fillRef>
+          <a:effectRef idx="0">
+            <a:schemeClr val="accent1"/>
+          </a:effectRef>
+          <a:fontRef idx="minor">
+            <a:schemeClr val="lt1"/>
+          </a:fontRef>
+        </p:style>
+        <p:txBody>
+          <a:bodyPr rtlCol="0" anchor="ctr"/>
+          <a:lstStyle/>
+          <a:p>
+            <a:pPr algn="ctr"/>
+            <a:endParaRPr lang="es-ES"/>
+          </a:p>
+        </p:txBody>
+      </p:sp>
+    </p:spTree>
+    <p:extLst>
+      <p:ext uri="{BB962C8B-B14F-4D97-AF65-F5344CB8AC3E}">
+        <p14:creationId xmlns:p14="http://schemas.microsoft.com/office/powerpoint/2010/main" val="1142972357"/>
+      </p:ext>
+    </p:extLst>
+  </p:cSld>
+  <p:clrMapOvr>
+    <a:masterClrMapping/>
+  </p:clrMapOvr>
+</p:sld>
+</file>
+
+<file path=ppt/slides/slide7.xml><?xml version="1.0" encoding="utf-8"?>
+<p:sld xmlns:a="http://schemas.openxmlformats.org/drawingml/2006/main" xmlns:r="http://schemas.openxmlformats.org/officeDocument/2006/relationships" xmlns:p="http://schemas.openxmlformats.org/presentationml/2006/main">
+  <p:cSld>
+    <p:spTree>
+      <p:nvGrpSpPr>
+        <p:cNvPr id="1" name=""/>
+        <p:cNvGrpSpPr/>
+        <p:nvPr/>
+      </p:nvGrpSpPr>
+      <p:grpSpPr>
+        <a:xfrm>
+          <a:off x="0" y="0"/>
+          <a:ext cx="0" cy="0"/>
+          <a:chOff x="0" y="0"/>
+          <a:chExt cx="0" cy="0"/>
+        </a:xfrm>
+      </p:grpSpPr>
+      <p:pic>
+        <p:nvPicPr>
+          <p:cNvPr id="5" name="Imagen 4">
+            <a:extLst>
+              <a:ext uri="{FF2B5EF4-FFF2-40B4-BE49-F238E27FC236}">
+                <a16:creationId xmlns:a16="http://schemas.microsoft.com/office/drawing/2014/main" id="{20B84089-D466-4D04-9783-CB6ADAAD6C96}"/>
+              </a:ext>
+            </a:extLst>
+          </p:cNvPr>
+          <p:cNvPicPr>
+            <a:picLocks noChangeAspect="1"/>
+          </p:cNvPicPr>
+          <p:nvPr/>
+        </p:nvPicPr>
+        <p:blipFill>
+          <a:blip r:embed="rId2"/>
+          <a:stretch>
+            <a:fillRect/>
+          </a:stretch>
+        </p:blipFill>
+        <p:spPr>
+          <a:xfrm>
+            <a:off x="3318057" y="1193683"/>
+            <a:ext cx="5087713" cy="3562875"/>
+          </a:xfrm>
+          <a:prstGeom prst="rect">
+            <a:avLst/>
+          </a:prstGeom>
+        </p:spPr>
+      </p:pic>
+      <p:pic>
+        <p:nvPicPr>
+          <p:cNvPr id="6" name="Imagen 5">
+            <a:extLst>
+              <a:ext uri="{FF2B5EF4-FFF2-40B4-BE49-F238E27FC236}">
+                <a16:creationId xmlns:a16="http://schemas.microsoft.com/office/drawing/2014/main" id="{4A8A3EDD-413E-4611-B0F7-F3E7B0E8B4B8}"/>
+              </a:ext>
+            </a:extLst>
+          </p:cNvPr>
+          <p:cNvPicPr>
+            <a:picLocks noChangeAspect="1"/>
+          </p:cNvPicPr>
+          <p:nvPr/>
+        </p:nvPicPr>
+        <p:blipFill>
+          <a:blip r:embed="rId3"/>
+          <a:stretch>
+            <a:fillRect/>
+          </a:stretch>
+        </p:blipFill>
+        <p:spPr>
+          <a:xfrm>
+            <a:off x="3216217" y="4884598"/>
+            <a:ext cx="5332428" cy="1411427"/>
+          </a:xfrm>
+          <a:prstGeom prst="rect">
+            <a:avLst/>
+          </a:prstGeom>
+        </p:spPr>
+      </p:pic>
+      <p:sp>
+        <p:nvSpPr>
+          <p:cNvPr id="14" name="CuadroTexto 13">
+            <a:extLst>
+              <a:ext uri="{FF2B5EF4-FFF2-40B4-BE49-F238E27FC236}">
+                <a16:creationId xmlns:a16="http://schemas.microsoft.com/office/drawing/2014/main" id="{141CAC72-0D93-49C6-8913-A7593E1C4044}"/>
+              </a:ext>
+            </a:extLst>
+          </p:cNvPr>
+          <p:cNvSpPr txBox="1"/>
+          <p:nvPr/>
+        </p:nvSpPr>
+        <p:spPr>
+          <a:xfrm>
+            <a:off x="8783273" y="234892"/>
+            <a:ext cx="3087149" cy="2308324"/>
+          </a:xfrm>
+          <a:prstGeom prst="rect">
+            <a:avLst/>
+          </a:prstGeom>
+          <a:noFill/>
+        </p:spPr>
+        <p:txBody>
+          <a:bodyPr wrap="square" rtlCol="0">
+            <a:spAutoFit/>
+          </a:bodyPr>
+          <a:lstStyle/>
+          <a:p>
+            <a:r>
+              <a:rPr lang="es-ES" dirty="0"/>
+              <a:t>Notes:</a:t>
+            </a:r>
+          </a:p>
+          <a:p>
+            <a:pPr marL="285750" indent="-285750">
+              <a:buFontTx/>
+              <a:buChar char="-"/>
+            </a:pPr>
+            <a:r>
+              <a:rPr lang="es-ES" dirty="0"/>
+              <a:t>V00.06</a:t>
             </a:r>
           </a:p>
           <a:p>
@@ -7039,1672 +8486,6 @@
     <p:extLst>
       <p:ext uri="{BB962C8B-B14F-4D97-AF65-F5344CB8AC3E}">
         <p14:creationId xmlns:p14="http://schemas.microsoft.com/office/powerpoint/2010/main" val="2520566424"/>
-      </p:ext>
-    </p:extLst>
-  </p:cSld>
-  <p:clrMapOvr>
-    <a:masterClrMapping/>
-  </p:clrMapOvr>
-</p:sld>
-</file>
-
-<file path=ppt/slides/slide6.xml><?xml version="1.0" encoding="utf-8"?>
-<p:sld xmlns:a="http://schemas.openxmlformats.org/drawingml/2006/main" xmlns:r="http://schemas.openxmlformats.org/officeDocument/2006/relationships" xmlns:p="http://schemas.openxmlformats.org/presentationml/2006/main">
-  <p:cSld>
-    <p:spTree>
-      <p:nvGrpSpPr>
-        <p:cNvPr id="1" name=""/>
-        <p:cNvGrpSpPr/>
-        <p:nvPr/>
-      </p:nvGrpSpPr>
-      <p:grpSpPr>
-        <a:xfrm>
-          <a:off x="0" y="0"/>
-          <a:ext cx="0" cy="0"/>
-          <a:chOff x="0" y="0"/>
-          <a:chExt cx="0" cy="0"/>
-        </a:xfrm>
-      </p:grpSpPr>
-      <p:pic>
-        <p:nvPicPr>
-          <p:cNvPr id="5" name="Imagen 4">
-            <a:extLst>
-              <a:ext uri="{FF2B5EF4-FFF2-40B4-BE49-F238E27FC236}">
-                <a16:creationId xmlns:a16="http://schemas.microsoft.com/office/drawing/2014/main" id="{20B84089-D466-4D04-9783-CB6ADAAD6C96}"/>
-              </a:ext>
-            </a:extLst>
-          </p:cNvPr>
-          <p:cNvPicPr>
-            <a:picLocks noChangeAspect="1"/>
-          </p:cNvPicPr>
-          <p:nvPr/>
-        </p:nvPicPr>
-        <p:blipFill>
-          <a:blip r:embed="rId2"/>
-          <a:stretch>
-            <a:fillRect/>
-          </a:stretch>
-        </p:blipFill>
-        <p:spPr>
-          <a:xfrm>
-            <a:off x="3318057" y="1193683"/>
-            <a:ext cx="5087713" cy="3562875"/>
-          </a:xfrm>
-          <a:prstGeom prst="rect">
-            <a:avLst/>
-          </a:prstGeom>
-        </p:spPr>
-      </p:pic>
-      <p:pic>
-        <p:nvPicPr>
-          <p:cNvPr id="6" name="Imagen 5">
-            <a:extLst>
-              <a:ext uri="{FF2B5EF4-FFF2-40B4-BE49-F238E27FC236}">
-                <a16:creationId xmlns:a16="http://schemas.microsoft.com/office/drawing/2014/main" id="{4A8A3EDD-413E-4611-B0F7-F3E7B0E8B4B8}"/>
-              </a:ext>
-            </a:extLst>
-          </p:cNvPr>
-          <p:cNvPicPr>
-            <a:picLocks noChangeAspect="1"/>
-          </p:cNvPicPr>
-          <p:nvPr/>
-        </p:nvPicPr>
-        <p:blipFill>
-          <a:blip r:embed="rId3"/>
-          <a:stretch>
-            <a:fillRect/>
-          </a:stretch>
-        </p:blipFill>
-        <p:spPr>
-          <a:xfrm>
-            <a:off x="3216217" y="4884598"/>
-            <a:ext cx="5332428" cy="1411427"/>
-          </a:xfrm>
-          <a:prstGeom prst="rect">
-            <a:avLst/>
-          </a:prstGeom>
-        </p:spPr>
-      </p:pic>
-      <p:sp>
-        <p:nvSpPr>
-          <p:cNvPr id="8" name="CuadroTexto 7">
-            <a:extLst>
-              <a:ext uri="{FF2B5EF4-FFF2-40B4-BE49-F238E27FC236}">
-                <a16:creationId xmlns:a16="http://schemas.microsoft.com/office/drawing/2014/main" id="{87D8C68F-3C3F-474E-B2E2-87E9ABCA7C2D}"/>
-              </a:ext>
-            </a:extLst>
-          </p:cNvPr>
-          <p:cNvSpPr txBox="1"/>
-          <p:nvPr/>
-        </p:nvSpPr>
-        <p:spPr>
-          <a:xfrm>
-            <a:off x="1325461" y="645952"/>
-            <a:ext cx="964734" cy="369332"/>
-          </a:xfrm>
-          <a:prstGeom prst="rect">
-            <a:avLst/>
-          </a:prstGeom>
-          <a:solidFill>
-            <a:schemeClr val="bg1">
-              <a:lumMod val="75000"/>
-            </a:schemeClr>
-          </a:solidFill>
-          <a:ln>
-            <a:solidFill>
-              <a:schemeClr val="tx1"/>
-            </a:solidFill>
-          </a:ln>
-        </p:spPr>
-        <p:txBody>
-          <a:bodyPr wrap="square" rtlCol="0">
-            <a:spAutoFit/>
-          </a:bodyPr>
-          <a:lstStyle/>
-          <a:p>
-            <a:r>
-              <a:rPr lang="es-ES" dirty="0"/>
-              <a:t>File</a:t>
-            </a:r>
-          </a:p>
-        </p:txBody>
-      </p:sp>
-      <p:sp>
-        <p:nvSpPr>
-          <p:cNvPr id="9" name="CuadroTexto 8">
-            <a:extLst>
-              <a:ext uri="{FF2B5EF4-FFF2-40B4-BE49-F238E27FC236}">
-                <a16:creationId xmlns:a16="http://schemas.microsoft.com/office/drawing/2014/main" id="{69B7775D-6619-47FA-95FC-2BFF98F90E33}"/>
-              </a:ext>
-            </a:extLst>
-          </p:cNvPr>
-          <p:cNvSpPr txBox="1"/>
-          <p:nvPr/>
-        </p:nvSpPr>
-        <p:spPr>
-          <a:xfrm>
-            <a:off x="1476461" y="1015284"/>
-            <a:ext cx="1325461" cy="307777"/>
-          </a:xfrm>
-          <a:prstGeom prst="rect">
-            <a:avLst/>
-          </a:prstGeom>
-          <a:solidFill>
-            <a:schemeClr val="bg1">
-              <a:lumMod val="75000"/>
-            </a:schemeClr>
-          </a:solidFill>
-          <a:ln>
-            <a:solidFill>
-              <a:schemeClr val="tx1"/>
-            </a:solidFill>
-          </a:ln>
-        </p:spPr>
-        <p:txBody>
-          <a:bodyPr wrap="square" rtlCol="0">
-            <a:spAutoFit/>
-          </a:bodyPr>
-          <a:lstStyle/>
-          <a:p>
-            <a:r>
-              <a:rPr lang="es-ES" sz="1400" dirty="0"/>
-              <a:t>Load </a:t>
-            </a:r>
-            <a:r>
-              <a:rPr lang="es-ES" sz="1400" dirty="0" err="1"/>
-              <a:t>track</a:t>
-            </a:r>
-            <a:endParaRPr lang="es-ES" sz="1400" dirty="0"/>
-          </a:p>
-        </p:txBody>
-      </p:sp>
-      <p:sp>
-        <p:nvSpPr>
-          <p:cNvPr id="10" name="CuadroTexto 9">
-            <a:extLst>
-              <a:ext uri="{FF2B5EF4-FFF2-40B4-BE49-F238E27FC236}">
-                <a16:creationId xmlns:a16="http://schemas.microsoft.com/office/drawing/2014/main" id="{E6B399B8-DA52-4C30-972E-53ADA9421924}"/>
-              </a:ext>
-            </a:extLst>
-          </p:cNvPr>
-          <p:cNvSpPr txBox="1"/>
-          <p:nvPr/>
-        </p:nvSpPr>
-        <p:spPr>
-          <a:xfrm>
-            <a:off x="1476460" y="1323061"/>
-            <a:ext cx="1325461" cy="307777"/>
-          </a:xfrm>
-          <a:prstGeom prst="rect">
-            <a:avLst/>
-          </a:prstGeom>
-          <a:solidFill>
-            <a:schemeClr val="bg1">
-              <a:lumMod val="75000"/>
-            </a:schemeClr>
-          </a:solidFill>
-          <a:ln>
-            <a:solidFill>
-              <a:schemeClr val="tx1"/>
-            </a:solidFill>
-          </a:ln>
-        </p:spPr>
-        <p:txBody>
-          <a:bodyPr wrap="square" rtlCol="0">
-            <a:spAutoFit/>
-          </a:bodyPr>
-          <a:lstStyle/>
-          <a:p>
-            <a:r>
-              <a:rPr lang="es-ES" sz="1400" dirty="0"/>
-              <a:t>Load </a:t>
-            </a:r>
-            <a:r>
-              <a:rPr lang="es-ES" sz="1400" dirty="0" err="1"/>
-              <a:t>session</a:t>
-            </a:r>
-            <a:endParaRPr lang="es-ES" sz="1400" dirty="0"/>
-          </a:p>
-        </p:txBody>
-      </p:sp>
-      <p:sp>
-        <p:nvSpPr>
-          <p:cNvPr id="11" name="CuadroTexto 10">
-            <a:extLst>
-              <a:ext uri="{FF2B5EF4-FFF2-40B4-BE49-F238E27FC236}">
-                <a16:creationId xmlns:a16="http://schemas.microsoft.com/office/drawing/2014/main" id="{D9B563DB-707C-4CD4-803E-C6573FDAE050}"/>
-              </a:ext>
-            </a:extLst>
-          </p:cNvPr>
-          <p:cNvSpPr txBox="1"/>
-          <p:nvPr/>
-        </p:nvSpPr>
-        <p:spPr>
-          <a:xfrm>
-            <a:off x="1476460" y="1615478"/>
-            <a:ext cx="1325461" cy="307777"/>
-          </a:xfrm>
-          <a:prstGeom prst="rect">
-            <a:avLst/>
-          </a:prstGeom>
-          <a:solidFill>
-            <a:schemeClr val="bg1">
-              <a:lumMod val="75000"/>
-            </a:schemeClr>
-          </a:solidFill>
-          <a:ln>
-            <a:solidFill>
-              <a:schemeClr val="tx1"/>
-            </a:solidFill>
-          </a:ln>
-        </p:spPr>
-        <p:txBody>
-          <a:bodyPr wrap="square" rtlCol="0">
-            <a:spAutoFit/>
-          </a:bodyPr>
-          <a:lstStyle/>
-          <a:p>
-            <a:r>
-              <a:rPr lang="es-ES" sz="1400" dirty="0"/>
-              <a:t>New </a:t>
-            </a:r>
-            <a:r>
-              <a:rPr lang="es-ES" sz="1400" dirty="0" err="1"/>
-              <a:t>session</a:t>
-            </a:r>
-            <a:endParaRPr lang="es-ES" sz="1400" dirty="0"/>
-          </a:p>
-        </p:txBody>
-      </p:sp>
-      <p:sp>
-        <p:nvSpPr>
-          <p:cNvPr id="12" name="CuadroTexto 11">
-            <a:extLst>
-              <a:ext uri="{FF2B5EF4-FFF2-40B4-BE49-F238E27FC236}">
-                <a16:creationId xmlns:a16="http://schemas.microsoft.com/office/drawing/2014/main" id="{33980FAD-8BDF-4D61-BA99-FBF4A8BD191D}"/>
-              </a:ext>
-            </a:extLst>
-          </p:cNvPr>
-          <p:cNvSpPr txBox="1"/>
-          <p:nvPr/>
-        </p:nvSpPr>
-        <p:spPr>
-          <a:xfrm>
-            <a:off x="1476460" y="1905363"/>
-            <a:ext cx="1325461" cy="307777"/>
-          </a:xfrm>
-          <a:prstGeom prst="rect">
-            <a:avLst/>
-          </a:prstGeom>
-          <a:solidFill>
-            <a:schemeClr val="bg1">
-              <a:lumMod val="75000"/>
-            </a:schemeClr>
-          </a:solidFill>
-          <a:ln>
-            <a:solidFill>
-              <a:schemeClr val="tx1"/>
-            </a:solidFill>
-          </a:ln>
-        </p:spPr>
-        <p:txBody>
-          <a:bodyPr wrap="square" rtlCol="0">
-            <a:spAutoFit/>
-          </a:bodyPr>
-          <a:lstStyle/>
-          <a:p>
-            <a:r>
-              <a:rPr lang="es-ES" sz="1400" dirty="0" err="1"/>
-              <a:t>Save</a:t>
-            </a:r>
-            <a:r>
-              <a:rPr lang="es-ES" sz="1400" dirty="0"/>
-              <a:t> </a:t>
-            </a:r>
-            <a:r>
-              <a:rPr lang="es-ES" sz="1400" dirty="0" err="1"/>
-              <a:t>session</a:t>
-            </a:r>
-            <a:endParaRPr lang="es-ES" sz="1400" dirty="0"/>
-          </a:p>
-        </p:txBody>
-      </p:sp>
-      <p:sp>
-        <p:nvSpPr>
-          <p:cNvPr id="13" name="CuadroTexto 12">
-            <a:extLst>
-              <a:ext uri="{FF2B5EF4-FFF2-40B4-BE49-F238E27FC236}">
-                <a16:creationId xmlns:a16="http://schemas.microsoft.com/office/drawing/2014/main" id="{785F6E4A-3AFF-444D-931D-D0FEA190FED5}"/>
-              </a:ext>
-            </a:extLst>
-          </p:cNvPr>
-          <p:cNvSpPr txBox="1"/>
-          <p:nvPr/>
-        </p:nvSpPr>
-        <p:spPr>
-          <a:xfrm>
-            <a:off x="1476459" y="2213140"/>
-            <a:ext cx="1325461" cy="307777"/>
-          </a:xfrm>
-          <a:prstGeom prst="rect">
-            <a:avLst/>
-          </a:prstGeom>
-          <a:solidFill>
-            <a:schemeClr val="bg1">
-              <a:lumMod val="75000"/>
-            </a:schemeClr>
-          </a:solidFill>
-          <a:ln>
-            <a:solidFill>
-              <a:schemeClr val="tx1"/>
-            </a:solidFill>
-          </a:ln>
-        </p:spPr>
-        <p:txBody>
-          <a:bodyPr wrap="square" rtlCol="0">
-            <a:spAutoFit/>
-          </a:bodyPr>
-          <a:lstStyle/>
-          <a:p>
-            <a:r>
-              <a:rPr lang="es-ES" sz="1400" dirty="0" err="1"/>
-              <a:t>Exit</a:t>
-            </a:r>
-            <a:endParaRPr lang="es-ES" sz="1400" dirty="0"/>
-          </a:p>
-        </p:txBody>
-      </p:sp>
-      <p:sp>
-        <p:nvSpPr>
-          <p:cNvPr id="14" name="CuadroTexto 13">
-            <a:extLst>
-              <a:ext uri="{FF2B5EF4-FFF2-40B4-BE49-F238E27FC236}">
-                <a16:creationId xmlns:a16="http://schemas.microsoft.com/office/drawing/2014/main" id="{141CAC72-0D93-49C6-8913-A7593E1C4044}"/>
-              </a:ext>
-            </a:extLst>
-          </p:cNvPr>
-          <p:cNvSpPr txBox="1"/>
-          <p:nvPr/>
-        </p:nvSpPr>
-        <p:spPr>
-          <a:xfrm>
-            <a:off x="8783273" y="234892"/>
-            <a:ext cx="3087149" cy="1477328"/>
-          </a:xfrm>
-          <a:prstGeom prst="rect">
-            <a:avLst/>
-          </a:prstGeom>
-          <a:noFill/>
-        </p:spPr>
-        <p:txBody>
-          <a:bodyPr wrap="square" rtlCol="0">
-            <a:spAutoFit/>
-          </a:bodyPr>
-          <a:lstStyle/>
-          <a:p>
-            <a:r>
-              <a:rPr lang="es-ES" dirty="0"/>
-              <a:t>Notes:</a:t>
-            </a:r>
-          </a:p>
-          <a:p>
-            <a:pPr marL="285750" indent="-285750">
-              <a:buFontTx/>
-              <a:buChar char="-"/>
-            </a:pPr>
-            <a:r>
-              <a:rPr lang="es-ES" dirty="0"/>
-              <a:t>V00.05</a:t>
-            </a:r>
-          </a:p>
-          <a:p>
-            <a:pPr marL="285750" indent="-285750">
-              <a:buFontTx/>
-              <a:buChar char="-"/>
-            </a:pPr>
-            <a:r>
-              <a:rPr lang="es-ES" dirty="0" err="1"/>
-              <a:t>Summary</a:t>
-            </a:r>
-            <a:r>
-              <a:rPr lang="es-ES" dirty="0"/>
-              <a:t> </a:t>
-            </a:r>
-            <a:r>
-              <a:rPr lang="es-ES" dirty="0" err="1"/>
-              <a:t>of</a:t>
-            </a:r>
-            <a:r>
-              <a:rPr lang="es-ES" dirty="0"/>
-              <a:t> full </a:t>
-            </a:r>
-            <a:r>
-              <a:rPr lang="es-ES" dirty="0" err="1"/>
-              <a:t>track</a:t>
-            </a:r>
-            <a:r>
-              <a:rPr lang="es-ES" dirty="0"/>
-              <a:t> in table and single </a:t>
-            </a:r>
-            <a:r>
-              <a:rPr lang="es-ES" dirty="0" err="1"/>
-              <a:t>segments</a:t>
-            </a:r>
-            <a:endParaRPr lang="es-ES" dirty="0"/>
-          </a:p>
-          <a:p>
-            <a:endParaRPr lang="es-ES" dirty="0"/>
-          </a:p>
-        </p:txBody>
-      </p:sp>
-      <p:grpSp>
-        <p:nvGrpSpPr>
-          <p:cNvPr id="18" name="Grupo 17">
-            <a:extLst>
-              <a:ext uri="{FF2B5EF4-FFF2-40B4-BE49-F238E27FC236}">
-                <a16:creationId xmlns:a16="http://schemas.microsoft.com/office/drawing/2014/main" id="{CE082FDB-5094-4F0F-8661-7B8640501D0A}"/>
-              </a:ext>
-            </a:extLst>
-          </p:cNvPr>
-          <p:cNvGrpSpPr/>
-          <p:nvPr/>
-        </p:nvGrpSpPr>
-        <p:grpSpPr>
-          <a:xfrm>
-            <a:off x="7945770" y="3897247"/>
-            <a:ext cx="267052" cy="615554"/>
-            <a:chOff x="8851781" y="2520917"/>
-            <a:chExt cx="267052" cy="615554"/>
-          </a:xfrm>
-        </p:grpSpPr>
-        <p:sp>
-          <p:nvSpPr>
-            <p:cNvPr id="16" name="CuadroTexto 15">
-              <a:extLst>
-                <a:ext uri="{FF2B5EF4-FFF2-40B4-BE49-F238E27FC236}">
-                  <a16:creationId xmlns:a16="http://schemas.microsoft.com/office/drawing/2014/main" id="{19713EAB-5261-4665-91F7-2DFD19C8A273}"/>
-                </a:ext>
-              </a:extLst>
-            </p:cNvPr>
-            <p:cNvSpPr txBox="1"/>
-            <p:nvPr/>
-          </p:nvSpPr>
-          <p:spPr>
-            <a:xfrm>
-              <a:off x="8851782" y="2520917"/>
-              <a:ext cx="267051" cy="307777"/>
-            </a:xfrm>
-            <a:prstGeom prst="rect">
-              <a:avLst/>
-            </a:prstGeom>
-            <a:solidFill>
-              <a:schemeClr val="bg1">
-                <a:lumMod val="85000"/>
-              </a:schemeClr>
-            </a:solidFill>
-            <a:ln>
-              <a:solidFill>
-                <a:schemeClr val="tx1"/>
-              </a:solidFill>
-            </a:ln>
-          </p:spPr>
-          <p:txBody>
-            <a:bodyPr wrap="square" rtlCol="0">
-              <a:spAutoFit/>
-            </a:bodyPr>
-            <a:lstStyle/>
-            <a:p>
-              <a:pPr algn="ctr"/>
-              <a:r>
-                <a:rPr lang="es-ES" sz="1400" dirty="0"/>
-                <a:t>+</a:t>
-              </a:r>
-            </a:p>
-          </p:txBody>
-        </p:sp>
-        <p:sp>
-          <p:nvSpPr>
-            <p:cNvPr id="17" name="CuadroTexto 16">
-              <a:extLst>
-                <a:ext uri="{FF2B5EF4-FFF2-40B4-BE49-F238E27FC236}">
-                  <a16:creationId xmlns:a16="http://schemas.microsoft.com/office/drawing/2014/main" id="{F98C1302-45BF-449D-BD36-6743087E2F05}"/>
-                </a:ext>
-              </a:extLst>
-            </p:cNvPr>
-            <p:cNvSpPr txBox="1"/>
-            <p:nvPr/>
-          </p:nvSpPr>
-          <p:spPr>
-            <a:xfrm>
-              <a:off x="8851781" y="2828694"/>
-              <a:ext cx="267051" cy="307777"/>
-            </a:xfrm>
-            <a:prstGeom prst="rect">
-              <a:avLst/>
-            </a:prstGeom>
-            <a:solidFill>
-              <a:schemeClr val="bg1">
-                <a:lumMod val="85000"/>
-              </a:schemeClr>
-            </a:solidFill>
-            <a:ln>
-              <a:solidFill>
-                <a:schemeClr val="tx1"/>
-              </a:solidFill>
-            </a:ln>
-          </p:spPr>
-          <p:txBody>
-            <a:bodyPr wrap="square" rtlCol="0">
-              <a:spAutoFit/>
-            </a:bodyPr>
-            <a:lstStyle/>
-            <a:p>
-              <a:pPr algn="ctr"/>
-              <a:r>
-                <a:rPr lang="es-ES" sz="1400" dirty="0"/>
-                <a:t>-</a:t>
-              </a:r>
-            </a:p>
-          </p:txBody>
-        </p:sp>
-      </p:grpSp>
-      <p:pic>
-        <p:nvPicPr>
-          <p:cNvPr id="15" name="Picture 2" descr="Rendered Image">
-            <a:extLst>
-              <a:ext uri="{FF2B5EF4-FFF2-40B4-BE49-F238E27FC236}">
-                <a16:creationId xmlns:a16="http://schemas.microsoft.com/office/drawing/2014/main" id="{7B2E289B-43CF-4B37-97C5-425FBF055A8C}"/>
-              </a:ext>
-            </a:extLst>
-          </p:cNvPr>
-          <p:cNvPicPr>
-            <a:picLocks noChangeAspect="1" noChangeArrowheads="1"/>
-          </p:cNvPicPr>
-          <p:nvPr/>
-        </p:nvPicPr>
-        <p:blipFill>
-          <a:blip r:embed="rId4">
-            <a:extLst>
-              <a:ext uri="{28A0092B-C50C-407E-A947-70E740481C1C}">
-                <a14:useLocalDpi xmlns:a14="http://schemas.microsoft.com/office/drawing/2010/main" val="0"/>
-              </a:ext>
-            </a:extLst>
-          </a:blip>
-          <a:srcRect/>
-          <a:stretch>
-            <a:fillRect/>
-          </a:stretch>
-        </p:blipFill>
-        <p:spPr bwMode="auto">
-          <a:xfrm>
-            <a:off x="324331" y="5331161"/>
-            <a:ext cx="2181225" cy="809625"/>
-          </a:xfrm>
-          <a:prstGeom prst="rect">
-            <a:avLst/>
-          </a:prstGeom>
-          <a:noFill/>
-          <a:extLst>
-            <a:ext uri="{909E8E84-426E-40DD-AFC4-6F175D3DCCD1}">
-              <a14:hiddenFill xmlns:a14="http://schemas.microsoft.com/office/drawing/2010/main">
-                <a:solidFill>
-                  <a:srgbClr val="FFFFFF"/>
-                </a:solidFill>
-              </a14:hiddenFill>
-            </a:ext>
-          </a:extLst>
-        </p:spPr>
-      </p:pic>
-      <p:sp>
-        <p:nvSpPr>
-          <p:cNvPr id="2" name="CuadroTexto 1">
-            <a:extLst>
-              <a:ext uri="{FF2B5EF4-FFF2-40B4-BE49-F238E27FC236}">
-                <a16:creationId xmlns:a16="http://schemas.microsoft.com/office/drawing/2014/main" id="{13EBE1A3-05B8-4CBB-94EE-98EFCC3BCE00}"/>
-              </a:ext>
-            </a:extLst>
-          </p:cNvPr>
-          <p:cNvSpPr txBox="1"/>
-          <p:nvPr/>
-        </p:nvSpPr>
-        <p:spPr>
-          <a:xfrm>
-            <a:off x="8513878" y="2278600"/>
-            <a:ext cx="2201663" cy="923330"/>
-          </a:xfrm>
-          <a:prstGeom prst="rect">
-            <a:avLst/>
-          </a:prstGeom>
-          <a:noFill/>
-          <a:ln w="6350">
-            <a:solidFill>
-              <a:schemeClr val="tx1"/>
-            </a:solidFill>
-          </a:ln>
-        </p:spPr>
-        <p:txBody>
-          <a:bodyPr wrap="square" rtlCol="0">
-            <a:spAutoFit/>
-          </a:bodyPr>
-          <a:lstStyle/>
-          <a:p>
-            <a:r>
-              <a:rPr lang="es-ES" dirty="0"/>
-              <a:t>Total </a:t>
-            </a:r>
-            <a:r>
-              <a:rPr lang="es-ES" dirty="0" err="1"/>
-              <a:t>distance</a:t>
-            </a:r>
-            <a:endParaRPr lang="es-ES" dirty="0"/>
-          </a:p>
-          <a:p>
-            <a:r>
-              <a:rPr lang="es-ES" dirty="0" err="1"/>
-              <a:t>Uphill</a:t>
-            </a:r>
-            <a:r>
-              <a:rPr lang="es-ES" dirty="0"/>
-              <a:t> </a:t>
-            </a:r>
-            <a:r>
-              <a:rPr lang="es-ES" dirty="0" err="1"/>
-              <a:t>elevation</a:t>
-            </a:r>
-            <a:endParaRPr lang="es-ES" dirty="0"/>
-          </a:p>
-          <a:p>
-            <a:r>
-              <a:rPr lang="es-ES" dirty="0" err="1"/>
-              <a:t>Downhill</a:t>
-            </a:r>
-            <a:r>
-              <a:rPr lang="es-ES" dirty="0"/>
-              <a:t> </a:t>
-            </a:r>
-            <a:r>
-              <a:rPr lang="es-ES" dirty="0" err="1"/>
-              <a:t>elevation</a:t>
-            </a:r>
-            <a:endParaRPr lang="es-ES" dirty="0"/>
-          </a:p>
-        </p:txBody>
-      </p:sp>
-    </p:spTree>
-    <p:extLst>
-      <p:ext uri="{BB962C8B-B14F-4D97-AF65-F5344CB8AC3E}">
-        <p14:creationId xmlns:p14="http://schemas.microsoft.com/office/powerpoint/2010/main" val="3703521982"/>
-      </p:ext>
-    </p:extLst>
-  </p:cSld>
-  <p:clrMapOvr>
-    <a:masterClrMapping/>
-  </p:clrMapOvr>
-</p:sld>
-</file>
-
-<file path=ppt/slides/slide7.xml><?xml version="1.0" encoding="utf-8"?>
-<p:sld xmlns:a="http://schemas.openxmlformats.org/drawingml/2006/main" xmlns:r="http://schemas.openxmlformats.org/officeDocument/2006/relationships" xmlns:p="http://schemas.openxmlformats.org/presentationml/2006/main">
-  <p:cSld>
-    <p:spTree>
-      <p:nvGrpSpPr>
-        <p:cNvPr id="1" name=""/>
-        <p:cNvGrpSpPr/>
-        <p:nvPr/>
-      </p:nvGrpSpPr>
-      <p:grpSpPr>
-        <a:xfrm>
-          <a:off x="0" y="0"/>
-          <a:ext cx="0" cy="0"/>
-          <a:chOff x="0" y="0"/>
-          <a:chExt cx="0" cy="0"/>
-        </a:xfrm>
-      </p:grpSpPr>
-      <p:pic>
-        <p:nvPicPr>
-          <p:cNvPr id="5" name="Imagen 4">
-            <a:extLst>
-              <a:ext uri="{FF2B5EF4-FFF2-40B4-BE49-F238E27FC236}">
-                <a16:creationId xmlns:a16="http://schemas.microsoft.com/office/drawing/2014/main" id="{20B84089-D466-4D04-9783-CB6ADAAD6C96}"/>
-              </a:ext>
-            </a:extLst>
-          </p:cNvPr>
-          <p:cNvPicPr>
-            <a:picLocks noChangeAspect="1"/>
-          </p:cNvPicPr>
-          <p:nvPr/>
-        </p:nvPicPr>
-        <p:blipFill>
-          <a:blip r:embed="rId2"/>
-          <a:stretch>
-            <a:fillRect/>
-          </a:stretch>
-        </p:blipFill>
-        <p:spPr>
-          <a:xfrm>
-            <a:off x="3318057" y="1193683"/>
-            <a:ext cx="5087713" cy="3562875"/>
-          </a:xfrm>
-          <a:prstGeom prst="rect">
-            <a:avLst/>
-          </a:prstGeom>
-        </p:spPr>
-      </p:pic>
-      <p:sp>
-        <p:nvSpPr>
-          <p:cNvPr id="8" name="CuadroTexto 7">
-            <a:extLst>
-              <a:ext uri="{FF2B5EF4-FFF2-40B4-BE49-F238E27FC236}">
-                <a16:creationId xmlns:a16="http://schemas.microsoft.com/office/drawing/2014/main" id="{87D8C68F-3C3F-474E-B2E2-87E9ABCA7C2D}"/>
-              </a:ext>
-            </a:extLst>
-          </p:cNvPr>
-          <p:cNvSpPr txBox="1"/>
-          <p:nvPr/>
-        </p:nvSpPr>
-        <p:spPr>
-          <a:xfrm>
-            <a:off x="1325461" y="645952"/>
-            <a:ext cx="964734" cy="369332"/>
-          </a:xfrm>
-          <a:prstGeom prst="rect">
-            <a:avLst/>
-          </a:prstGeom>
-          <a:solidFill>
-            <a:schemeClr val="bg1">
-              <a:lumMod val="75000"/>
-            </a:schemeClr>
-          </a:solidFill>
-          <a:ln>
-            <a:solidFill>
-              <a:schemeClr val="tx1"/>
-            </a:solidFill>
-          </a:ln>
-        </p:spPr>
-        <p:txBody>
-          <a:bodyPr wrap="square" rtlCol="0">
-            <a:spAutoFit/>
-          </a:bodyPr>
-          <a:lstStyle/>
-          <a:p>
-            <a:r>
-              <a:rPr lang="es-ES" dirty="0"/>
-              <a:t>File</a:t>
-            </a:r>
-          </a:p>
-        </p:txBody>
-      </p:sp>
-      <p:sp>
-        <p:nvSpPr>
-          <p:cNvPr id="9" name="CuadroTexto 8">
-            <a:extLst>
-              <a:ext uri="{FF2B5EF4-FFF2-40B4-BE49-F238E27FC236}">
-                <a16:creationId xmlns:a16="http://schemas.microsoft.com/office/drawing/2014/main" id="{69B7775D-6619-47FA-95FC-2BFF98F90E33}"/>
-              </a:ext>
-            </a:extLst>
-          </p:cNvPr>
-          <p:cNvSpPr txBox="1"/>
-          <p:nvPr/>
-        </p:nvSpPr>
-        <p:spPr>
-          <a:xfrm>
-            <a:off x="1476461" y="1015284"/>
-            <a:ext cx="1325461" cy="307777"/>
-          </a:xfrm>
-          <a:prstGeom prst="rect">
-            <a:avLst/>
-          </a:prstGeom>
-          <a:solidFill>
-            <a:schemeClr val="bg1">
-              <a:lumMod val="75000"/>
-            </a:schemeClr>
-          </a:solidFill>
-          <a:ln>
-            <a:solidFill>
-              <a:schemeClr val="tx1"/>
-            </a:solidFill>
-          </a:ln>
-        </p:spPr>
-        <p:txBody>
-          <a:bodyPr wrap="square" rtlCol="0">
-            <a:spAutoFit/>
-          </a:bodyPr>
-          <a:lstStyle/>
-          <a:p>
-            <a:r>
-              <a:rPr lang="es-ES" sz="1400" dirty="0"/>
-              <a:t>Load </a:t>
-            </a:r>
-            <a:r>
-              <a:rPr lang="es-ES" sz="1400" dirty="0" err="1"/>
-              <a:t>track</a:t>
-            </a:r>
-            <a:endParaRPr lang="es-ES" sz="1400" dirty="0"/>
-          </a:p>
-        </p:txBody>
-      </p:sp>
-      <p:sp>
-        <p:nvSpPr>
-          <p:cNvPr id="10" name="CuadroTexto 9">
-            <a:extLst>
-              <a:ext uri="{FF2B5EF4-FFF2-40B4-BE49-F238E27FC236}">
-                <a16:creationId xmlns:a16="http://schemas.microsoft.com/office/drawing/2014/main" id="{E6B399B8-DA52-4C30-972E-53ADA9421924}"/>
-              </a:ext>
-            </a:extLst>
-          </p:cNvPr>
-          <p:cNvSpPr txBox="1"/>
-          <p:nvPr/>
-        </p:nvSpPr>
-        <p:spPr>
-          <a:xfrm>
-            <a:off x="1476460" y="1323061"/>
-            <a:ext cx="1325461" cy="307777"/>
-          </a:xfrm>
-          <a:prstGeom prst="rect">
-            <a:avLst/>
-          </a:prstGeom>
-          <a:solidFill>
-            <a:schemeClr val="bg1">
-              <a:lumMod val="75000"/>
-            </a:schemeClr>
-          </a:solidFill>
-          <a:ln>
-            <a:solidFill>
-              <a:schemeClr val="tx1"/>
-            </a:solidFill>
-          </a:ln>
-        </p:spPr>
-        <p:txBody>
-          <a:bodyPr wrap="square" rtlCol="0">
-            <a:spAutoFit/>
-          </a:bodyPr>
-          <a:lstStyle/>
-          <a:p>
-            <a:r>
-              <a:rPr lang="es-ES" sz="1400" dirty="0"/>
-              <a:t>Load </a:t>
-            </a:r>
-            <a:r>
-              <a:rPr lang="es-ES" sz="1400" dirty="0" err="1"/>
-              <a:t>session</a:t>
-            </a:r>
-            <a:endParaRPr lang="es-ES" sz="1400" dirty="0"/>
-          </a:p>
-        </p:txBody>
-      </p:sp>
-      <p:sp>
-        <p:nvSpPr>
-          <p:cNvPr id="11" name="CuadroTexto 10">
-            <a:extLst>
-              <a:ext uri="{FF2B5EF4-FFF2-40B4-BE49-F238E27FC236}">
-                <a16:creationId xmlns:a16="http://schemas.microsoft.com/office/drawing/2014/main" id="{D9B563DB-707C-4CD4-803E-C6573FDAE050}"/>
-              </a:ext>
-            </a:extLst>
-          </p:cNvPr>
-          <p:cNvSpPr txBox="1"/>
-          <p:nvPr/>
-        </p:nvSpPr>
-        <p:spPr>
-          <a:xfrm>
-            <a:off x="1476460" y="1615478"/>
-            <a:ext cx="1325461" cy="307777"/>
-          </a:xfrm>
-          <a:prstGeom prst="rect">
-            <a:avLst/>
-          </a:prstGeom>
-          <a:solidFill>
-            <a:schemeClr val="bg1">
-              <a:lumMod val="75000"/>
-            </a:schemeClr>
-          </a:solidFill>
-          <a:ln>
-            <a:solidFill>
-              <a:schemeClr val="tx1"/>
-            </a:solidFill>
-          </a:ln>
-        </p:spPr>
-        <p:txBody>
-          <a:bodyPr wrap="square" rtlCol="0">
-            <a:spAutoFit/>
-          </a:bodyPr>
-          <a:lstStyle/>
-          <a:p>
-            <a:r>
-              <a:rPr lang="es-ES" sz="1400" dirty="0"/>
-              <a:t>New </a:t>
-            </a:r>
-            <a:r>
-              <a:rPr lang="es-ES" sz="1400" dirty="0" err="1"/>
-              <a:t>session</a:t>
-            </a:r>
-            <a:endParaRPr lang="es-ES" sz="1400" dirty="0"/>
-          </a:p>
-        </p:txBody>
-      </p:sp>
-      <p:sp>
-        <p:nvSpPr>
-          <p:cNvPr id="12" name="CuadroTexto 11">
-            <a:extLst>
-              <a:ext uri="{FF2B5EF4-FFF2-40B4-BE49-F238E27FC236}">
-                <a16:creationId xmlns:a16="http://schemas.microsoft.com/office/drawing/2014/main" id="{33980FAD-8BDF-4D61-BA99-FBF4A8BD191D}"/>
-              </a:ext>
-            </a:extLst>
-          </p:cNvPr>
-          <p:cNvSpPr txBox="1"/>
-          <p:nvPr/>
-        </p:nvSpPr>
-        <p:spPr>
-          <a:xfrm>
-            <a:off x="1476460" y="1905363"/>
-            <a:ext cx="1325461" cy="307777"/>
-          </a:xfrm>
-          <a:prstGeom prst="rect">
-            <a:avLst/>
-          </a:prstGeom>
-          <a:solidFill>
-            <a:schemeClr val="bg1">
-              <a:lumMod val="75000"/>
-            </a:schemeClr>
-          </a:solidFill>
-          <a:ln>
-            <a:solidFill>
-              <a:schemeClr val="tx1"/>
-            </a:solidFill>
-          </a:ln>
-        </p:spPr>
-        <p:txBody>
-          <a:bodyPr wrap="square" rtlCol="0">
-            <a:spAutoFit/>
-          </a:bodyPr>
-          <a:lstStyle/>
-          <a:p>
-            <a:r>
-              <a:rPr lang="es-ES" sz="1400" dirty="0" err="1"/>
-              <a:t>Save</a:t>
-            </a:r>
-            <a:r>
-              <a:rPr lang="es-ES" sz="1400" dirty="0"/>
-              <a:t> </a:t>
-            </a:r>
-            <a:r>
-              <a:rPr lang="es-ES" sz="1400" dirty="0" err="1"/>
-              <a:t>session</a:t>
-            </a:r>
-            <a:endParaRPr lang="es-ES" sz="1400" dirty="0"/>
-          </a:p>
-        </p:txBody>
-      </p:sp>
-      <p:sp>
-        <p:nvSpPr>
-          <p:cNvPr id="13" name="CuadroTexto 12">
-            <a:extLst>
-              <a:ext uri="{FF2B5EF4-FFF2-40B4-BE49-F238E27FC236}">
-                <a16:creationId xmlns:a16="http://schemas.microsoft.com/office/drawing/2014/main" id="{785F6E4A-3AFF-444D-931D-D0FEA190FED5}"/>
-              </a:ext>
-            </a:extLst>
-          </p:cNvPr>
-          <p:cNvSpPr txBox="1"/>
-          <p:nvPr/>
-        </p:nvSpPr>
-        <p:spPr>
-          <a:xfrm>
-            <a:off x="1476459" y="2213140"/>
-            <a:ext cx="1325461" cy="307777"/>
-          </a:xfrm>
-          <a:prstGeom prst="rect">
-            <a:avLst/>
-          </a:prstGeom>
-          <a:solidFill>
-            <a:schemeClr val="bg1">
-              <a:lumMod val="75000"/>
-            </a:schemeClr>
-          </a:solidFill>
-          <a:ln>
-            <a:solidFill>
-              <a:schemeClr val="tx1"/>
-            </a:solidFill>
-          </a:ln>
-        </p:spPr>
-        <p:txBody>
-          <a:bodyPr wrap="square" rtlCol="0">
-            <a:spAutoFit/>
-          </a:bodyPr>
-          <a:lstStyle/>
-          <a:p>
-            <a:r>
-              <a:rPr lang="es-ES" sz="1400" dirty="0" err="1"/>
-              <a:t>Exit</a:t>
-            </a:r>
-            <a:endParaRPr lang="es-ES" sz="1400" dirty="0"/>
-          </a:p>
-        </p:txBody>
-      </p:sp>
-      <p:sp>
-        <p:nvSpPr>
-          <p:cNvPr id="14" name="CuadroTexto 13">
-            <a:extLst>
-              <a:ext uri="{FF2B5EF4-FFF2-40B4-BE49-F238E27FC236}">
-                <a16:creationId xmlns:a16="http://schemas.microsoft.com/office/drawing/2014/main" id="{141CAC72-0D93-49C6-8913-A7593E1C4044}"/>
-              </a:ext>
-            </a:extLst>
-          </p:cNvPr>
-          <p:cNvSpPr txBox="1"/>
-          <p:nvPr/>
-        </p:nvSpPr>
-        <p:spPr>
-          <a:xfrm>
-            <a:off x="8854294" y="105013"/>
-            <a:ext cx="3087149" cy="1938992"/>
-          </a:xfrm>
-          <a:prstGeom prst="rect">
-            <a:avLst/>
-          </a:prstGeom>
-          <a:noFill/>
-        </p:spPr>
-        <p:txBody>
-          <a:bodyPr wrap="square" rtlCol="0">
-            <a:spAutoFit/>
-          </a:bodyPr>
-          <a:lstStyle/>
-          <a:p>
-            <a:r>
-              <a:rPr lang="es-ES" dirty="0"/>
-              <a:t>Notes:</a:t>
-            </a:r>
-          </a:p>
-          <a:p>
-            <a:pPr marL="285750" indent="-285750">
-              <a:buFontTx/>
-              <a:buChar char="-"/>
-            </a:pPr>
-            <a:r>
-              <a:rPr lang="es-ES" dirty="0"/>
-              <a:t>V00.06</a:t>
-            </a:r>
-          </a:p>
-          <a:p>
-            <a:pPr marL="285750" indent="-285750">
-              <a:buFontTx/>
-              <a:buChar char="-"/>
-            </a:pPr>
-            <a:r>
-              <a:rPr lang="es-ES" sz="1400" dirty="0" err="1"/>
-              <a:t>When</a:t>
-            </a:r>
-            <a:r>
-              <a:rPr lang="es-ES" sz="1400" dirty="0"/>
-              <a:t> </a:t>
-            </a:r>
-            <a:r>
-              <a:rPr lang="es-ES" sz="1400" dirty="0" err="1"/>
-              <a:t>selecting</a:t>
-            </a:r>
-            <a:r>
-              <a:rPr lang="es-ES" sz="1400" dirty="0"/>
-              <a:t> a line in </a:t>
-            </a:r>
-            <a:r>
-              <a:rPr lang="es-ES" sz="1400" dirty="0" err="1"/>
-              <a:t>the</a:t>
-            </a:r>
-            <a:r>
-              <a:rPr lang="es-ES" sz="1400" dirty="0"/>
-              <a:t> </a:t>
-            </a:r>
-            <a:r>
-              <a:rPr lang="es-ES" sz="1400" dirty="0" err="1"/>
-              <a:t>plot</a:t>
-            </a:r>
-            <a:r>
-              <a:rPr lang="es-ES" sz="1400" dirty="0"/>
-              <a:t>: </a:t>
-            </a:r>
-          </a:p>
-          <a:p>
-            <a:pPr marL="742950" lvl="1" indent="-285750">
-              <a:buFontTx/>
-              <a:buChar char="-"/>
-            </a:pPr>
-            <a:r>
-              <a:rPr lang="es-ES" sz="1400" dirty="0"/>
-              <a:t> </a:t>
-            </a:r>
-            <a:r>
-              <a:rPr lang="es-ES" sz="1400" dirty="0" err="1"/>
-              <a:t>its</a:t>
-            </a:r>
-            <a:r>
-              <a:rPr lang="es-ES" sz="1400" dirty="0"/>
-              <a:t> </a:t>
-            </a:r>
-            <a:r>
-              <a:rPr lang="es-ES" sz="1400" dirty="0" err="1"/>
-              <a:t>thickness</a:t>
-            </a:r>
-            <a:r>
-              <a:rPr lang="es-ES" sz="1400" dirty="0"/>
-              <a:t> </a:t>
-            </a:r>
-            <a:r>
-              <a:rPr lang="es-ES" sz="1400" dirty="0" err="1"/>
-              <a:t>is</a:t>
-            </a:r>
-            <a:r>
-              <a:rPr lang="es-ES" sz="1400" dirty="0"/>
-              <a:t> </a:t>
-            </a:r>
-            <a:r>
-              <a:rPr lang="es-ES" sz="1400" dirty="0" err="1"/>
-              <a:t>increased</a:t>
-            </a:r>
-            <a:endParaRPr lang="es-ES" sz="1400" dirty="0"/>
-          </a:p>
-          <a:p>
-            <a:pPr marL="742950" lvl="1" indent="-285750">
-              <a:buFontTx/>
-              <a:buChar char="-"/>
-            </a:pPr>
-            <a:r>
-              <a:rPr lang="es-ES" sz="1400" dirty="0" err="1"/>
-              <a:t>Elevation</a:t>
-            </a:r>
-            <a:r>
-              <a:rPr lang="es-ES" sz="1400" dirty="0"/>
-              <a:t> </a:t>
-            </a:r>
-            <a:r>
-              <a:rPr lang="es-ES" sz="1400" dirty="0" err="1"/>
-              <a:t>of</a:t>
-            </a:r>
-            <a:r>
-              <a:rPr lang="es-ES" sz="1400" dirty="0"/>
-              <a:t> </a:t>
-            </a:r>
-            <a:r>
-              <a:rPr lang="es-ES" sz="1400" dirty="0" err="1"/>
-              <a:t>that</a:t>
-            </a:r>
-            <a:r>
-              <a:rPr lang="es-ES" sz="1400" dirty="0"/>
-              <a:t> </a:t>
-            </a:r>
-            <a:r>
-              <a:rPr lang="es-ES" sz="1400" dirty="0" err="1"/>
-              <a:t>segment</a:t>
-            </a:r>
-            <a:r>
-              <a:rPr lang="es-ES" sz="1400" dirty="0"/>
-              <a:t> </a:t>
-            </a:r>
-            <a:r>
-              <a:rPr lang="es-ES" sz="1400" dirty="0" err="1"/>
-              <a:t>is</a:t>
-            </a:r>
-            <a:r>
-              <a:rPr lang="es-ES" sz="1400" dirty="0"/>
-              <a:t> </a:t>
-            </a:r>
-            <a:r>
-              <a:rPr lang="es-ES" sz="1400" dirty="0" err="1"/>
-              <a:t>displayd</a:t>
-            </a:r>
-            <a:endParaRPr lang="es-ES" sz="1400" dirty="0"/>
-          </a:p>
-          <a:p>
-            <a:pPr marL="742950" lvl="1" indent="-285750">
-              <a:buFontTx/>
-              <a:buChar char="-"/>
-            </a:pPr>
-            <a:r>
-              <a:rPr lang="es-ES" sz="1400" dirty="0" err="1"/>
-              <a:t>Information</a:t>
-            </a:r>
-            <a:r>
-              <a:rPr lang="es-ES" sz="1400" dirty="0"/>
-              <a:t> table </a:t>
-            </a:r>
-            <a:r>
-              <a:rPr lang="es-ES" sz="1400" dirty="0" err="1"/>
-              <a:t>for</a:t>
-            </a:r>
-            <a:r>
-              <a:rPr lang="es-ES" sz="1400" dirty="0"/>
-              <a:t> </a:t>
-            </a:r>
-            <a:r>
-              <a:rPr lang="es-ES" sz="1400" dirty="0" err="1"/>
-              <a:t>that</a:t>
-            </a:r>
-            <a:r>
-              <a:rPr lang="es-ES" sz="1400" dirty="0"/>
-              <a:t> single </a:t>
-            </a:r>
-            <a:r>
-              <a:rPr lang="es-ES" sz="1400" dirty="0" err="1"/>
-              <a:t>segment</a:t>
-            </a:r>
-            <a:r>
-              <a:rPr lang="es-ES" sz="1400" dirty="0"/>
-              <a:t> in </a:t>
-            </a:r>
-            <a:r>
-              <a:rPr lang="es-ES" sz="1400" dirty="0" err="1"/>
-              <a:t>bold</a:t>
-            </a:r>
-            <a:endParaRPr lang="es-ES" sz="1400" dirty="0"/>
-          </a:p>
-        </p:txBody>
-      </p:sp>
-      <p:grpSp>
-        <p:nvGrpSpPr>
-          <p:cNvPr id="18" name="Grupo 17">
-            <a:extLst>
-              <a:ext uri="{FF2B5EF4-FFF2-40B4-BE49-F238E27FC236}">
-                <a16:creationId xmlns:a16="http://schemas.microsoft.com/office/drawing/2014/main" id="{CE082FDB-5094-4F0F-8661-7B8640501D0A}"/>
-              </a:ext>
-            </a:extLst>
-          </p:cNvPr>
-          <p:cNvGrpSpPr/>
-          <p:nvPr/>
-        </p:nvGrpSpPr>
-        <p:grpSpPr>
-          <a:xfrm>
-            <a:off x="7945770" y="3897247"/>
-            <a:ext cx="267052" cy="615554"/>
-            <a:chOff x="8851781" y="2520917"/>
-            <a:chExt cx="267052" cy="615554"/>
-          </a:xfrm>
-        </p:grpSpPr>
-        <p:sp>
-          <p:nvSpPr>
-            <p:cNvPr id="16" name="CuadroTexto 15">
-              <a:extLst>
-                <a:ext uri="{FF2B5EF4-FFF2-40B4-BE49-F238E27FC236}">
-                  <a16:creationId xmlns:a16="http://schemas.microsoft.com/office/drawing/2014/main" id="{19713EAB-5261-4665-91F7-2DFD19C8A273}"/>
-                </a:ext>
-              </a:extLst>
-            </p:cNvPr>
-            <p:cNvSpPr txBox="1"/>
-            <p:nvPr/>
-          </p:nvSpPr>
-          <p:spPr>
-            <a:xfrm>
-              <a:off x="8851782" y="2520917"/>
-              <a:ext cx="267051" cy="307777"/>
-            </a:xfrm>
-            <a:prstGeom prst="rect">
-              <a:avLst/>
-            </a:prstGeom>
-            <a:solidFill>
-              <a:schemeClr val="bg1">
-                <a:lumMod val="85000"/>
-              </a:schemeClr>
-            </a:solidFill>
-            <a:ln>
-              <a:solidFill>
-                <a:schemeClr val="tx1"/>
-              </a:solidFill>
-            </a:ln>
-          </p:spPr>
-          <p:txBody>
-            <a:bodyPr wrap="square" rtlCol="0">
-              <a:spAutoFit/>
-            </a:bodyPr>
-            <a:lstStyle/>
-            <a:p>
-              <a:pPr algn="ctr"/>
-              <a:r>
-                <a:rPr lang="es-ES" sz="1400" dirty="0"/>
-                <a:t>+</a:t>
-              </a:r>
-            </a:p>
-          </p:txBody>
-        </p:sp>
-        <p:sp>
-          <p:nvSpPr>
-            <p:cNvPr id="17" name="CuadroTexto 16">
-              <a:extLst>
-                <a:ext uri="{FF2B5EF4-FFF2-40B4-BE49-F238E27FC236}">
-                  <a16:creationId xmlns:a16="http://schemas.microsoft.com/office/drawing/2014/main" id="{F98C1302-45BF-449D-BD36-6743087E2F05}"/>
-                </a:ext>
-              </a:extLst>
-            </p:cNvPr>
-            <p:cNvSpPr txBox="1"/>
-            <p:nvPr/>
-          </p:nvSpPr>
-          <p:spPr>
-            <a:xfrm>
-              <a:off x="8851781" y="2828694"/>
-              <a:ext cx="267051" cy="307777"/>
-            </a:xfrm>
-            <a:prstGeom prst="rect">
-              <a:avLst/>
-            </a:prstGeom>
-            <a:solidFill>
-              <a:schemeClr val="bg1">
-                <a:lumMod val="85000"/>
-              </a:schemeClr>
-            </a:solidFill>
-            <a:ln>
-              <a:solidFill>
-                <a:schemeClr val="tx1"/>
-              </a:solidFill>
-            </a:ln>
-          </p:spPr>
-          <p:txBody>
-            <a:bodyPr wrap="square" rtlCol="0">
-              <a:spAutoFit/>
-            </a:bodyPr>
-            <a:lstStyle/>
-            <a:p>
-              <a:pPr algn="ctr"/>
-              <a:r>
-                <a:rPr lang="es-ES" sz="1400" dirty="0"/>
-                <a:t>-</a:t>
-              </a:r>
-            </a:p>
-          </p:txBody>
-        </p:sp>
-      </p:grpSp>
-      <p:pic>
-        <p:nvPicPr>
-          <p:cNvPr id="15" name="Picture 2" descr="Rendered Image">
-            <a:extLst>
-              <a:ext uri="{FF2B5EF4-FFF2-40B4-BE49-F238E27FC236}">
-                <a16:creationId xmlns:a16="http://schemas.microsoft.com/office/drawing/2014/main" id="{7B2E289B-43CF-4B37-97C5-425FBF055A8C}"/>
-              </a:ext>
-            </a:extLst>
-          </p:cNvPr>
-          <p:cNvPicPr>
-            <a:picLocks noChangeAspect="1" noChangeArrowheads="1"/>
-          </p:cNvPicPr>
-          <p:nvPr/>
-        </p:nvPicPr>
-        <p:blipFill>
-          <a:blip r:embed="rId3">
-            <a:extLst>
-              <a:ext uri="{28A0092B-C50C-407E-A947-70E740481C1C}">
-                <a14:useLocalDpi xmlns:a14="http://schemas.microsoft.com/office/drawing/2010/main" val="0"/>
-              </a:ext>
-            </a:extLst>
-          </a:blip>
-          <a:srcRect/>
-          <a:stretch>
-            <a:fillRect/>
-          </a:stretch>
-        </p:blipFill>
-        <p:spPr bwMode="auto">
-          <a:xfrm>
-            <a:off x="324331" y="5331161"/>
-            <a:ext cx="2181225" cy="809625"/>
-          </a:xfrm>
-          <a:prstGeom prst="rect">
-            <a:avLst/>
-          </a:prstGeom>
-          <a:noFill/>
-          <a:extLst>
-            <a:ext uri="{909E8E84-426E-40DD-AFC4-6F175D3DCCD1}">
-              <a14:hiddenFill xmlns:a14="http://schemas.microsoft.com/office/drawing/2010/main">
-                <a:solidFill>
-                  <a:srgbClr val="FFFFFF"/>
-                </a:solidFill>
-              </a14:hiddenFill>
-            </a:ext>
-          </a:extLst>
-        </p:spPr>
-      </p:pic>
-      <p:sp>
-        <p:nvSpPr>
-          <p:cNvPr id="2" name="CuadroTexto 1">
-            <a:extLst>
-              <a:ext uri="{FF2B5EF4-FFF2-40B4-BE49-F238E27FC236}">
-                <a16:creationId xmlns:a16="http://schemas.microsoft.com/office/drawing/2014/main" id="{13EBE1A3-05B8-4CBB-94EE-98EFCC3BCE00}"/>
-              </a:ext>
-            </a:extLst>
-          </p:cNvPr>
-          <p:cNvSpPr txBox="1"/>
-          <p:nvPr/>
-        </p:nvSpPr>
-        <p:spPr>
-          <a:xfrm>
-            <a:off x="8646850" y="2213140"/>
-            <a:ext cx="2201663" cy="923330"/>
-          </a:xfrm>
-          <a:prstGeom prst="rect">
-            <a:avLst/>
-          </a:prstGeom>
-          <a:noFill/>
-          <a:ln w="6350">
-            <a:solidFill>
-              <a:schemeClr val="tx1"/>
-            </a:solidFill>
-          </a:ln>
-        </p:spPr>
-        <p:txBody>
-          <a:bodyPr wrap="square" rtlCol="0">
-            <a:spAutoFit/>
-          </a:bodyPr>
-          <a:lstStyle/>
-          <a:p>
-            <a:r>
-              <a:rPr lang="es-ES" dirty="0"/>
-              <a:t>Total </a:t>
-            </a:r>
-            <a:r>
-              <a:rPr lang="es-ES" dirty="0" err="1"/>
-              <a:t>distance</a:t>
-            </a:r>
-            <a:endParaRPr lang="es-ES" dirty="0"/>
-          </a:p>
-          <a:p>
-            <a:r>
-              <a:rPr lang="es-ES" dirty="0" err="1"/>
-              <a:t>Uphill</a:t>
-            </a:r>
-            <a:r>
-              <a:rPr lang="es-ES" dirty="0"/>
-              <a:t> </a:t>
-            </a:r>
-            <a:r>
-              <a:rPr lang="es-ES" dirty="0" err="1"/>
-              <a:t>elevation</a:t>
-            </a:r>
-            <a:endParaRPr lang="es-ES" dirty="0"/>
-          </a:p>
-          <a:p>
-            <a:r>
-              <a:rPr lang="es-ES" dirty="0" err="1"/>
-              <a:t>Downhill</a:t>
-            </a:r>
-            <a:r>
-              <a:rPr lang="es-ES" dirty="0"/>
-              <a:t> </a:t>
-            </a:r>
-            <a:r>
-              <a:rPr lang="es-ES" dirty="0" err="1"/>
-              <a:t>elevation</a:t>
-            </a:r>
-            <a:endParaRPr lang="es-ES" dirty="0"/>
-          </a:p>
-        </p:txBody>
-      </p:sp>
-      <p:sp>
-        <p:nvSpPr>
-          <p:cNvPr id="19" name="Flecha: hacia abajo 18">
-            <a:extLst>
-              <a:ext uri="{FF2B5EF4-FFF2-40B4-BE49-F238E27FC236}">
-                <a16:creationId xmlns:a16="http://schemas.microsoft.com/office/drawing/2014/main" id="{615D0BC7-ADE7-459C-B1BC-0D694DC7D9AE}"/>
-              </a:ext>
-            </a:extLst>
-          </p:cNvPr>
-          <p:cNvSpPr/>
-          <p:nvPr/>
-        </p:nvSpPr>
-        <p:spPr>
-          <a:xfrm rot="8514297">
-            <a:off x="10249956" y="3049430"/>
-            <a:ext cx="195309" cy="1695635"/>
-          </a:xfrm>
-          <a:prstGeom prst="downArrow">
-            <a:avLst/>
-          </a:prstGeom>
-        </p:spPr>
-        <p:style>
-          <a:lnRef idx="2">
-            <a:schemeClr val="accent1">
-              <a:shade val="50000"/>
-            </a:schemeClr>
-          </a:lnRef>
-          <a:fillRef idx="1">
-            <a:schemeClr val="accent1"/>
-          </a:fillRef>
-          <a:effectRef idx="0">
-            <a:schemeClr val="accent1"/>
-          </a:effectRef>
-          <a:fontRef idx="minor">
-            <a:schemeClr val="lt1"/>
-          </a:fontRef>
-        </p:style>
-        <p:txBody>
-          <a:bodyPr rtlCol="0" anchor="ctr"/>
-          <a:lstStyle/>
-          <a:p>
-            <a:pPr algn="ctr"/>
-            <a:endParaRPr lang="es-ES"/>
-          </a:p>
-        </p:txBody>
-      </p:sp>
-      <mc:AlternateContent xmlns:mc="http://schemas.openxmlformats.org/markup-compatibility/2006" xmlns:p14="http://schemas.microsoft.com/office/powerpoint/2010/main">
-        <mc:Choice Requires="p14">
-          <p:contentPart p14:bwMode="auto" r:id="rId4">
-            <p14:nvContentPartPr>
-              <p14:cNvPr id="22" name="Entrada de lápiz 21">
-                <a:extLst>
-                  <a:ext uri="{FF2B5EF4-FFF2-40B4-BE49-F238E27FC236}">
-                    <a16:creationId xmlns:a16="http://schemas.microsoft.com/office/drawing/2014/main" id="{5A236FC7-AB2F-44E3-821D-76E45DE63B8A}"/>
-                  </a:ext>
-                </a:extLst>
-              </p14:cNvPr>
-              <p14:cNvContentPartPr/>
-              <p14:nvPr/>
-            </p14:nvContentPartPr>
-            <p14:xfrm>
-              <a:off x="5063755" y="3342260"/>
-              <a:ext cx="537120" cy="443160"/>
-            </p14:xfrm>
-          </p:contentPart>
-        </mc:Choice>
-        <mc:Fallback xmlns="">
-          <p:pic>
-            <p:nvPicPr>
-              <p:cNvPr id="22" name="Entrada de lápiz 21">
-                <a:extLst>
-                  <a:ext uri="{FF2B5EF4-FFF2-40B4-BE49-F238E27FC236}">
-                    <a16:creationId xmlns:a16="http://schemas.microsoft.com/office/drawing/2014/main" id="{5A236FC7-AB2F-44E3-821D-76E45DE63B8A}"/>
-                  </a:ext>
-                </a:extLst>
-              </p:cNvPr>
-              <p:cNvPicPr/>
-              <p:nvPr/>
-            </p:nvPicPr>
-            <p:blipFill>
-              <a:blip r:embed="rId5"/>
-              <a:stretch>
-                <a:fillRect/>
-              </a:stretch>
-            </p:blipFill>
-            <p:spPr>
-              <a:xfrm>
-                <a:off x="5046115" y="3324620"/>
-                <a:ext cx="572760" cy="478800"/>
-              </a:xfrm>
-              <a:prstGeom prst="rect">
-                <a:avLst/>
-              </a:prstGeom>
-            </p:spPr>
-          </p:pic>
-        </mc:Fallback>
-      </mc:AlternateContent>
-      <p:pic>
-        <p:nvPicPr>
-          <p:cNvPr id="28" name="Imagen 27">
-            <a:extLst>
-              <a:ext uri="{FF2B5EF4-FFF2-40B4-BE49-F238E27FC236}">
-                <a16:creationId xmlns:a16="http://schemas.microsoft.com/office/drawing/2014/main" id="{291D2744-3EC0-4703-85C3-FFDDCAC12C9E}"/>
-              </a:ext>
-            </a:extLst>
-          </p:cNvPr>
-          <p:cNvPicPr>
-            <a:picLocks noChangeAspect="1"/>
-          </p:cNvPicPr>
-          <p:nvPr/>
-        </p:nvPicPr>
-        <p:blipFill>
-          <a:blip r:embed="rId6"/>
-          <a:stretch>
-            <a:fillRect/>
-          </a:stretch>
-        </p:blipFill>
-        <p:spPr>
-          <a:xfrm>
-            <a:off x="3263684" y="4799866"/>
-            <a:ext cx="5142086" cy="1770919"/>
-          </a:xfrm>
-          <a:prstGeom prst="rect">
-            <a:avLst/>
-          </a:prstGeom>
-        </p:spPr>
-      </p:pic>
-      <p:sp>
-        <p:nvSpPr>
-          <p:cNvPr id="3" name="Flecha: hacia abajo 2">
-            <a:extLst>
-              <a:ext uri="{FF2B5EF4-FFF2-40B4-BE49-F238E27FC236}">
-                <a16:creationId xmlns:a16="http://schemas.microsoft.com/office/drawing/2014/main" id="{71DE474A-0DE1-4B69-9232-D9BC8AF88DB1}"/>
-              </a:ext>
-            </a:extLst>
-          </p:cNvPr>
-          <p:cNvSpPr/>
-          <p:nvPr/>
-        </p:nvSpPr>
-        <p:spPr>
-          <a:xfrm rot="3380404">
-            <a:off x="8824250" y="4189566"/>
-            <a:ext cx="195309" cy="1695635"/>
-          </a:xfrm>
-          <a:prstGeom prst="downArrow">
-            <a:avLst/>
-          </a:prstGeom>
-        </p:spPr>
-        <p:style>
-          <a:lnRef idx="2">
-            <a:schemeClr val="accent1">
-              <a:shade val="50000"/>
-            </a:schemeClr>
-          </a:lnRef>
-          <a:fillRef idx="1">
-            <a:schemeClr val="accent1"/>
-          </a:fillRef>
-          <a:effectRef idx="0">
-            <a:schemeClr val="accent1"/>
-          </a:effectRef>
-          <a:fontRef idx="minor">
-            <a:schemeClr val="lt1"/>
-          </a:fontRef>
-        </p:style>
-        <p:txBody>
-          <a:bodyPr rtlCol="0" anchor="ctr"/>
-          <a:lstStyle/>
-          <a:p>
-            <a:pPr algn="ctr"/>
-            <a:endParaRPr lang="es-ES"/>
-          </a:p>
-        </p:txBody>
-      </p:sp>
-    </p:spTree>
-    <p:extLst>
-      <p:ext uri="{BB962C8B-B14F-4D97-AF65-F5344CB8AC3E}">
-        <p14:creationId xmlns:p14="http://schemas.microsoft.com/office/powerpoint/2010/main" val="1142972357"/>
       </p:ext>
     </p:extLst>
   </p:cSld>

</xml_diff>

<commit_message>
Show bold segment info and elevation for selected segments
</commit_message>
<xml_diff>
--- a/gui_design.pptx
+++ b/gui_design.pptx
@@ -11,8 +11,8 @@
     <p:sldId id="258" r:id="rId5"/>
     <p:sldId id="262" r:id="rId6"/>
     <p:sldId id="263" r:id="rId7"/>
-    <p:sldId id="260" r:id="rId8"/>
-    <p:sldId id="266" r:id="rId9"/>
+    <p:sldId id="266" r:id="rId8"/>
+    <p:sldId id="260" r:id="rId9"/>
     <p:sldId id="265" r:id="rId10"/>
     <p:sldId id="264" r:id="rId11"/>
     <p:sldId id="261" r:id="rId12"/>
@@ -323,7 +323,7 @@
           <a:p>
             <a:fld id="{B3E02414-0C21-4CC3-871B-2D6AD27EF3B6}" type="datetimeFigureOut">
               <a:rPr lang="es-ES" smtClean="0"/>
-              <a:t>06/06/2020</a:t>
+              <a:t>09/06/2020</a:t>
             </a:fld>
             <a:endParaRPr lang="es-ES"/>
           </a:p>
@@ -521,7 +521,7 @@
           <a:p>
             <a:fld id="{B3E02414-0C21-4CC3-871B-2D6AD27EF3B6}" type="datetimeFigureOut">
               <a:rPr lang="es-ES" smtClean="0"/>
-              <a:t>06/06/2020</a:t>
+              <a:t>09/06/2020</a:t>
             </a:fld>
             <a:endParaRPr lang="es-ES"/>
           </a:p>
@@ -729,7 +729,7 @@
           <a:p>
             <a:fld id="{B3E02414-0C21-4CC3-871B-2D6AD27EF3B6}" type="datetimeFigureOut">
               <a:rPr lang="es-ES" smtClean="0"/>
-              <a:t>06/06/2020</a:t>
+              <a:t>09/06/2020</a:t>
             </a:fld>
             <a:endParaRPr lang="es-ES"/>
           </a:p>
@@ -927,7 +927,7 @@
           <a:p>
             <a:fld id="{B3E02414-0C21-4CC3-871B-2D6AD27EF3B6}" type="datetimeFigureOut">
               <a:rPr lang="es-ES" smtClean="0"/>
-              <a:t>06/06/2020</a:t>
+              <a:t>09/06/2020</a:t>
             </a:fld>
             <a:endParaRPr lang="es-ES"/>
           </a:p>
@@ -1202,7 +1202,7 @@
           <a:p>
             <a:fld id="{B3E02414-0C21-4CC3-871B-2D6AD27EF3B6}" type="datetimeFigureOut">
               <a:rPr lang="es-ES" smtClean="0"/>
-              <a:t>06/06/2020</a:t>
+              <a:t>09/06/2020</a:t>
             </a:fld>
             <a:endParaRPr lang="es-ES"/>
           </a:p>
@@ -1467,7 +1467,7 @@
           <a:p>
             <a:fld id="{B3E02414-0C21-4CC3-871B-2D6AD27EF3B6}" type="datetimeFigureOut">
               <a:rPr lang="es-ES" smtClean="0"/>
-              <a:t>06/06/2020</a:t>
+              <a:t>09/06/2020</a:t>
             </a:fld>
             <a:endParaRPr lang="es-ES"/>
           </a:p>
@@ -1879,7 +1879,7 @@
           <a:p>
             <a:fld id="{B3E02414-0C21-4CC3-871B-2D6AD27EF3B6}" type="datetimeFigureOut">
               <a:rPr lang="es-ES" smtClean="0"/>
-              <a:t>06/06/2020</a:t>
+              <a:t>09/06/2020</a:t>
             </a:fld>
             <a:endParaRPr lang="es-ES"/>
           </a:p>
@@ -2020,7 +2020,7 @@
           <a:p>
             <a:fld id="{B3E02414-0C21-4CC3-871B-2D6AD27EF3B6}" type="datetimeFigureOut">
               <a:rPr lang="es-ES" smtClean="0"/>
-              <a:t>06/06/2020</a:t>
+              <a:t>09/06/2020</a:t>
             </a:fld>
             <a:endParaRPr lang="es-ES"/>
           </a:p>
@@ -2133,7 +2133,7 @@
           <a:p>
             <a:fld id="{B3E02414-0C21-4CC3-871B-2D6AD27EF3B6}" type="datetimeFigureOut">
               <a:rPr lang="es-ES" smtClean="0"/>
-              <a:t>06/06/2020</a:t>
+              <a:t>09/06/2020</a:t>
             </a:fld>
             <a:endParaRPr lang="es-ES"/>
           </a:p>
@@ -2444,7 +2444,7 @@
           <a:p>
             <a:fld id="{B3E02414-0C21-4CC3-871B-2D6AD27EF3B6}" type="datetimeFigureOut">
               <a:rPr lang="es-ES" smtClean="0"/>
-              <a:t>06/06/2020</a:t>
+              <a:t>09/06/2020</a:t>
             </a:fld>
             <a:endParaRPr lang="es-ES"/>
           </a:p>
@@ -2732,7 +2732,7 @@
           <a:p>
             <a:fld id="{B3E02414-0C21-4CC3-871B-2D6AD27EF3B6}" type="datetimeFigureOut">
               <a:rPr lang="es-ES" smtClean="0"/>
-              <a:t>06/06/2020</a:t>
+              <a:t>09/06/2020</a:t>
             </a:fld>
             <a:endParaRPr lang="es-ES"/>
           </a:p>
@@ -2973,7 +2973,7 @@
           <a:p>
             <a:fld id="{B3E02414-0C21-4CC3-871B-2D6AD27EF3B6}" type="datetimeFigureOut">
               <a:rPr lang="es-ES" smtClean="0"/>
-              <a:t>06/06/2020</a:t>
+              <a:t>09/06/2020</a:t>
             </a:fld>
             <a:endParaRPr lang="es-ES"/>
           </a:p>
@@ -5982,6 +5982,1202 @@
           </a:p>
         </p:txBody>
       </p:sp>
+      <p:pic>
+        <p:nvPicPr>
+          <p:cNvPr id="19" name="Picture 2" descr="Rendered Image">
+            <a:extLst>
+              <a:ext uri="{FF2B5EF4-FFF2-40B4-BE49-F238E27FC236}">
+                <a16:creationId xmlns:a16="http://schemas.microsoft.com/office/drawing/2014/main" id="{33779A03-33C4-42CE-8D14-70C44AE26E37}"/>
+              </a:ext>
+            </a:extLst>
+          </p:cNvPr>
+          <p:cNvPicPr>
+            <a:picLocks noChangeAspect="1" noChangeArrowheads="1"/>
+          </p:cNvPicPr>
+          <p:nvPr/>
+        </p:nvPicPr>
+        <p:blipFill>
+          <a:blip r:embed="rId4">
+            <a:extLst>
+              <a:ext uri="{28A0092B-C50C-407E-A947-70E740481C1C}">
+                <a14:useLocalDpi xmlns:a14="http://schemas.microsoft.com/office/drawing/2010/main" val="0"/>
+              </a:ext>
+            </a:extLst>
+          </a:blip>
+          <a:srcRect/>
+          <a:stretch>
+            <a:fillRect/>
+          </a:stretch>
+        </p:blipFill>
+        <p:spPr bwMode="auto">
+          <a:xfrm>
+            <a:off x="598240" y="5134504"/>
+            <a:ext cx="2019300" cy="1057275"/>
+          </a:xfrm>
+          <a:prstGeom prst="rect">
+            <a:avLst/>
+          </a:prstGeom>
+          <a:noFill/>
+          <a:extLst>
+            <a:ext uri="{909E8E84-426E-40DD-AFC4-6F175D3DCCD1}">
+              <a14:hiddenFill xmlns:a14="http://schemas.microsoft.com/office/drawing/2010/main">
+                <a:solidFill>
+                  <a:srgbClr val="FFFFFF"/>
+                </a:solidFill>
+              </a14:hiddenFill>
+            </a:ext>
+          </a:extLst>
+        </p:spPr>
+      </p:pic>
+    </p:spTree>
+    <p:extLst>
+      <p:ext uri="{BB962C8B-B14F-4D97-AF65-F5344CB8AC3E}">
+        <p14:creationId xmlns:p14="http://schemas.microsoft.com/office/powerpoint/2010/main" val="3950845870"/>
+      </p:ext>
+    </p:extLst>
+  </p:cSld>
+  <p:clrMapOvr>
+    <a:masterClrMapping/>
+  </p:clrMapOvr>
+</p:sld>
+</file>
+
+<file path=ppt/slides/slide5.xml><?xml version="1.0" encoding="utf-8"?>
+<p:sld xmlns:a="http://schemas.openxmlformats.org/drawingml/2006/main" xmlns:r="http://schemas.openxmlformats.org/officeDocument/2006/relationships" xmlns:p="http://schemas.openxmlformats.org/presentationml/2006/main">
+  <p:cSld>
+    <p:spTree>
+      <p:nvGrpSpPr>
+        <p:cNvPr id="1" name=""/>
+        <p:cNvGrpSpPr/>
+        <p:nvPr/>
+      </p:nvGrpSpPr>
+      <p:grpSpPr>
+        <a:xfrm>
+          <a:off x="0" y="0"/>
+          <a:ext cx="0" cy="0"/>
+          <a:chOff x="0" y="0"/>
+          <a:chExt cx="0" cy="0"/>
+        </a:xfrm>
+      </p:grpSpPr>
+      <p:pic>
+        <p:nvPicPr>
+          <p:cNvPr id="5" name="Imagen 4">
+            <a:extLst>
+              <a:ext uri="{FF2B5EF4-FFF2-40B4-BE49-F238E27FC236}">
+                <a16:creationId xmlns:a16="http://schemas.microsoft.com/office/drawing/2014/main" id="{20B84089-D466-4D04-9783-CB6ADAAD6C96}"/>
+              </a:ext>
+            </a:extLst>
+          </p:cNvPr>
+          <p:cNvPicPr>
+            <a:picLocks noChangeAspect="1"/>
+          </p:cNvPicPr>
+          <p:nvPr/>
+        </p:nvPicPr>
+        <p:blipFill>
+          <a:blip r:embed="rId2"/>
+          <a:stretch>
+            <a:fillRect/>
+          </a:stretch>
+        </p:blipFill>
+        <p:spPr>
+          <a:xfrm>
+            <a:off x="3318057" y="1193683"/>
+            <a:ext cx="5087713" cy="3562875"/>
+          </a:xfrm>
+          <a:prstGeom prst="rect">
+            <a:avLst/>
+          </a:prstGeom>
+        </p:spPr>
+      </p:pic>
+      <p:pic>
+        <p:nvPicPr>
+          <p:cNvPr id="6" name="Imagen 5">
+            <a:extLst>
+              <a:ext uri="{FF2B5EF4-FFF2-40B4-BE49-F238E27FC236}">
+                <a16:creationId xmlns:a16="http://schemas.microsoft.com/office/drawing/2014/main" id="{4A8A3EDD-413E-4611-B0F7-F3E7B0E8B4B8}"/>
+              </a:ext>
+            </a:extLst>
+          </p:cNvPr>
+          <p:cNvPicPr>
+            <a:picLocks noChangeAspect="1"/>
+          </p:cNvPicPr>
+          <p:nvPr/>
+        </p:nvPicPr>
+        <p:blipFill>
+          <a:blip r:embed="rId3"/>
+          <a:stretch>
+            <a:fillRect/>
+          </a:stretch>
+        </p:blipFill>
+        <p:spPr>
+          <a:xfrm>
+            <a:off x="3216217" y="4884598"/>
+            <a:ext cx="5332428" cy="1411427"/>
+          </a:xfrm>
+          <a:prstGeom prst="rect">
+            <a:avLst/>
+          </a:prstGeom>
+        </p:spPr>
+      </p:pic>
+      <p:sp>
+        <p:nvSpPr>
+          <p:cNvPr id="8" name="CuadroTexto 7">
+            <a:extLst>
+              <a:ext uri="{FF2B5EF4-FFF2-40B4-BE49-F238E27FC236}">
+                <a16:creationId xmlns:a16="http://schemas.microsoft.com/office/drawing/2014/main" id="{87D8C68F-3C3F-474E-B2E2-87E9ABCA7C2D}"/>
+              </a:ext>
+            </a:extLst>
+          </p:cNvPr>
+          <p:cNvSpPr txBox="1"/>
+          <p:nvPr/>
+        </p:nvSpPr>
+        <p:spPr>
+          <a:xfrm>
+            <a:off x="1325461" y="645952"/>
+            <a:ext cx="964734" cy="369332"/>
+          </a:xfrm>
+          <a:prstGeom prst="rect">
+            <a:avLst/>
+          </a:prstGeom>
+          <a:solidFill>
+            <a:schemeClr val="bg1">
+              <a:lumMod val="75000"/>
+            </a:schemeClr>
+          </a:solidFill>
+          <a:ln>
+            <a:solidFill>
+              <a:schemeClr val="tx1"/>
+            </a:solidFill>
+          </a:ln>
+        </p:spPr>
+        <p:txBody>
+          <a:bodyPr wrap="square" rtlCol="0">
+            <a:spAutoFit/>
+          </a:bodyPr>
+          <a:lstStyle/>
+          <a:p>
+            <a:r>
+              <a:rPr lang="es-ES" dirty="0"/>
+              <a:t>File</a:t>
+            </a:r>
+          </a:p>
+        </p:txBody>
+      </p:sp>
+      <p:sp>
+        <p:nvSpPr>
+          <p:cNvPr id="9" name="CuadroTexto 8">
+            <a:extLst>
+              <a:ext uri="{FF2B5EF4-FFF2-40B4-BE49-F238E27FC236}">
+                <a16:creationId xmlns:a16="http://schemas.microsoft.com/office/drawing/2014/main" id="{69B7775D-6619-47FA-95FC-2BFF98F90E33}"/>
+              </a:ext>
+            </a:extLst>
+          </p:cNvPr>
+          <p:cNvSpPr txBox="1"/>
+          <p:nvPr/>
+        </p:nvSpPr>
+        <p:spPr>
+          <a:xfrm>
+            <a:off x="1476461" y="1015284"/>
+            <a:ext cx="1325461" cy="307777"/>
+          </a:xfrm>
+          <a:prstGeom prst="rect">
+            <a:avLst/>
+          </a:prstGeom>
+          <a:solidFill>
+            <a:schemeClr val="bg1">
+              <a:lumMod val="75000"/>
+            </a:schemeClr>
+          </a:solidFill>
+          <a:ln>
+            <a:solidFill>
+              <a:schemeClr val="tx1"/>
+            </a:solidFill>
+          </a:ln>
+        </p:spPr>
+        <p:txBody>
+          <a:bodyPr wrap="square" rtlCol="0">
+            <a:spAutoFit/>
+          </a:bodyPr>
+          <a:lstStyle/>
+          <a:p>
+            <a:r>
+              <a:rPr lang="es-ES" sz="1400" dirty="0"/>
+              <a:t>Load </a:t>
+            </a:r>
+            <a:r>
+              <a:rPr lang="es-ES" sz="1400" dirty="0" err="1"/>
+              <a:t>track</a:t>
+            </a:r>
+            <a:endParaRPr lang="es-ES" sz="1400" dirty="0"/>
+          </a:p>
+        </p:txBody>
+      </p:sp>
+      <p:sp>
+        <p:nvSpPr>
+          <p:cNvPr id="10" name="CuadroTexto 9">
+            <a:extLst>
+              <a:ext uri="{FF2B5EF4-FFF2-40B4-BE49-F238E27FC236}">
+                <a16:creationId xmlns:a16="http://schemas.microsoft.com/office/drawing/2014/main" id="{E6B399B8-DA52-4C30-972E-53ADA9421924}"/>
+              </a:ext>
+            </a:extLst>
+          </p:cNvPr>
+          <p:cNvSpPr txBox="1"/>
+          <p:nvPr/>
+        </p:nvSpPr>
+        <p:spPr>
+          <a:xfrm>
+            <a:off x="1476460" y="1323061"/>
+            <a:ext cx="1325461" cy="307777"/>
+          </a:xfrm>
+          <a:prstGeom prst="rect">
+            <a:avLst/>
+          </a:prstGeom>
+          <a:solidFill>
+            <a:schemeClr val="bg1">
+              <a:lumMod val="75000"/>
+            </a:schemeClr>
+          </a:solidFill>
+          <a:ln>
+            <a:solidFill>
+              <a:schemeClr val="tx1"/>
+            </a:solidFill>
+          </a:ln>
+        </p:spPr>
+        <p:txBody>
+          <a:bodyPr wrap="square" rtlCol="0">
+            <a:spAutoFit/>
+          </a:bodyPr>
+          <a:lstStyle/>
+          <a:p>
+            <a:r>
+              <a:rPr lang="es-ES" sz="1400" dirty="0"/>
+              <a:t>Load </a:t>
+            </a:r>
+            <a:r>
+              <a:rPr lang="es-ES" sz="1400" dirty="0" err="1"/>
+              <a:t>session</a:t>
+            </a:r>
+            <a:endParaRPr lang="es-ES" sz="1400" dirty="0"/>
+          </a:p>
+        </p:txBody>
+      </p:sp>
+      <p:sp>
+        <p:nvSpPr>
+          <p:cNvPr id="11" name="CuadroTexto 10">
+            <a:extLst>
+              <a:ext uri="{FF2B5EF4-FFF2-40B4-BE49-F238E27FC236}">
+                <a16:creationId xmlns:a16="http://schemas.microsoft.com/office/drawing/2014/main" id="{D9B563DB-707C-4CD4-803E-C6573FDAE050}"/>
+              </a:ext>
+            </a:extLst>
+          </p:cNvPr>
+          <p:cNvSpPr txBox="1"/>
+          <p:nvPr/>
+        </p:nvSpPr>
+        <p:spPr>
+          <a:xfrm>
+            <a:off x="1476460" y="1615478"/>
+            <a:ext cx="1325461" cy="307777"/>
+          </a:xfrm>
+          <a:prstGeom prst="rect">
+            <a:avLst/>
+          </a:prstGeom>
+          <a:solidFill>
+            <a:schemeClr val="bg1">
+              <a:lumMod val="75000"/>
+            </a:schemeClr>
+          </a:solidFill>
+          <a:ln>
+            <a:solidFill>
+              <a:schemeClr val="tx1"/>
+            </a:solidFill>
+          </a:ln>
+        </p:spPr>
+        <p:txBody>
+          <a:bodyPr wrap="square" rtlCol="0">
+            <a:spAutoFit/>
+          </a:bodyPr>
+          <a:lstStyle/>
+          <a:p>
+            <a:r>
+              <a:rPr lang="es-ES" sz="1400" dirty="0"/>
+              <a:t>New </a:t>
+            </a:r>
+            <a:r>
+              <a:rPr lang="es-ES" sz="1400" dirty="0" err="1"/>
+              <a:t>session</a:t>
+            </a:r>
+            <a:endParaRPr lang="es-ES" sz="1400" dirty="0"/>
+          </a:p>
+        </p:txBody>
+      </p:sp>
+      <p:sp>
+        <p:nvSpPr>
+          <p:cNvPr id="12" name="CuadroTexto 11">
+            <a:extLst>
+              <a:ext uri="{FF2B5EF4-FFF2-40B4-BE49-F238E27FC236}">
+                <a16:creationId xmlns:a16="http://schemas.microsoft.com/office/drawing/2014/main" id="{33980FAD-8BDF-4D61-BA99-FBF4A8BD191D}"/>
+              </a:ext>
+            </a:extLst>
+          </p:cNvPr>
+          <p:cNvSpPr txBox="1"/>
+          <p:nvPr/>
+        </p:nvSpPr>
+        <p:spPr>
+          <a:xfrm>
+            <a:off x="1476460" y="1905363"/>
+            <a:ext cx="1325461" cy="307777"/>
+          </a:xfrm>
+          <a:prstGeom prst="rect">
+            <a:avLst/>
+          </a:prstGeom>
+          <a:solidFill>
+            <a:schemeClr val="bg1">
+              <a:lumMod val="75000"/>
+            </a:schemeClr>
+          </a:solidFill>
+          <a:ln>
+            <a:solidFill>
+              <a:schemeClr val="tx1"/>
+            </a:solidFill>
+          </a:ln>
+        </p:spPr>
+        <p:txBody>
+          <a:bodyPr wrap="square" rtlCol="0">
+            <a:spAutoFit/>
+          </a:bodyPr>
+          <a:lstStyle/>
+          <a:p>
+            <a:r>
+              <a:rPr lang="es-ES" sz="1400" dirty="0" err="1"/>
+              <a:t>Save</a:t>
+            </a:r>
+            <a:r>
+              <a:rPr lang="es-ES" sz="1400" dirty="0"/>
+              <a:t> </a:t>
+            </a:r>
+            <a:r>
+              <a:rPr lang="es-ES" sz="1400" dirty="0" err="1"/>
+              <a:t>session</a:t>
+            </a:r>
+            <a:endParaRPr lang="es-ES" sz="1400" dirty="0"/>
+          </a:p>
+        </p:txBody>
+      </p:sp>
+      <p:sp>
+        <p:nvSpPr>
+          <p:cNvPr id="13" name="CuadroTexto 12">
+            <a:extLst>
+              <a:ext uri="{FF2B5EF4-FFF2-40B4-BE49-F238E27FC236}">
+                <a16:creationId xmlns:a16="http://schemas.microsoft.com/office/drawing/2014/main" id="{785F6E4A-3AFF-444D-931D-D0FEA190FED5}"/>
+              </a:ext>
+            </a:extLst>
+          </p:cNvPr>
+          <p:cNvSpPr txBox="1"/>
+          <p:nvPr/>
+        </p:nvSpPr>
+        <p:spPr>
+          <a:xfrm>
+            <a:off x="1476459" y="2213140"/>
+            <a:ext cx="1325461" cy="307777"/>
+          </a:xfrm>
+          <a:prstGeom prst="rect">
+            <a:avLst/>
+          </a:prstGeom>
+          <a:solidFill>
+            <a:schemeClr val="bg1">
+              <a:lumMod val="75000"/>
+            </a:schemeClr>
+          </a:solidFill>
+          <a:ln>
+            <a:solidFill>
+              <a:schemeClr val="tx1"/>
+            </a:solidFill>
+          </a:ln>
+        </p:spPr>
+        <p:txBody>
+          <a:bodyPr wrap="square" rtlCol="0">
+            <a:spAutoFit/>
+          </a:bodyPr>
+          <a:lstStyle/>
+          <a:p>
+            <a:r>
+              <a:rPr lang="es-ES" sz="1400" dirty="0" err="1"/>
+              <a:t>Exit</a:t>
+            </a:r>
+            <a:endParaRPr lang="es-ES" sz="1400" dirty="0"/>
+          </a:p>
+        </p:txBody>
+      </p:sp>
+      <p:sp>
+        <p:nvSpPr>
+          <p:cNvPr id="14" name="CuadroTexto 13">
+            <a:extLst>
+              <a:ext uri="{FF2B5EF4-FFF2-40B4-BE49-F238E27FC236}">
+                <a16:creationId xmlns:a16="http://schemas.microsoft.com/office/drawing/2014/main" id="{141CAC72-0D93-49C6-8913-A7593E1C4044}"/>
+              </a:ext>
+            </a:extLst>
+          </p:cNvPr>
+          <p:cNvSpPr txBox="1"/>
+          <p:nvPr/>
+        </p:nvSpPr>
+        <p:spPr>
+          <a:xfrm>
+            <a:off x="8783273" y="234892"/>
+            <a:ext cx="3087149" cy="1477328"/>
+          </a:xfrm>
+          <a:prstGeom prst="rect">
+            <a:avLst/>
+          </a:prstGeom>
+          <a:noFill/>
+        </p:spPr>
+        <p:txBody>
+          <a:bodyPr wrap="square" rtlCol="0">
+            <a:spAutoFit/>
+          </a:bodyPr>
+          <a:lstStyle/>
+          <a:p>
+            <a:r>
+              <a:rPr lang="es-ES" dirty="0"/>
+              <a:t>Notes:</a:t>
+            </a:r>
+          </a:p>
+          <a:p>
+            <a:pPr marL="285750" indent="-285750">
+              <a:buFontTx/>
+              <a:buChar char="-"/>
+            </a:pPr>
+            <a:r>
+              <a:rPr lang="es-ES" dirty="0"/>
+              <a:t>V00.04</a:t>
+            </a:r>
+          </a:p>
+          <a:p>
+            <a:pPr marL="285750" indent="-285750">
+              <a:buFontTx/>
+              <a:buChar char="-"/>
+            </a:pPr>
+            <a:r>
+              <a:rPr lang="es-ES" dirty="0" err="1"/>
+              <a:t>Summary</a:t>
+            </a:r>
+            <a:r>
+              <a:rPr lang="es-ES" dirty="0"/>
+              <a:t> </a:t>
+            </a:r>
+            <a:r>
+              <a:rPr lang="es-ES" dirty="0" err="1"/>
+              <a:t>of</a:t>
+            </a:r>
+            <a:r>
+              <a:rPr lang="es-ES" dirty="0"/>
+              <a:t> full </a:t>
+            </a:r>
+            <a:r>
+              <a:rPr lang="es-ES" dirty="0" err="1"/>
+              <a:t>track</a:t>
+            </a:r>
+            <a:r>
+              <a:rPr lang="es-ES" dirty="0"/>
+              <a:t> in table and single </a:t>
+            </a:r>
+            <a:r>
+              <a:rPr lang="es-ES" dirty="0" err="1"/>
+              <a:t>segments</a:t>
+            </a:r>
+            <a:endParaRPr lang="es-ES" dirty="0"/>
+          </a:p>
+          <a:p>
+            <a:endParaRPr lang="es-ES" dirty="0"/>
+          </a:p>
+        </p:txBody>
+      </p:sp>
+      <p:sp>
+        <p:nvSpPr>
+          <p:cNvPr id="2" name="CuadroTexto 1">
+            <a:extLst>
+              <a:ext uri="{FF2B5EF4-FFF2-40B4-BE49-F238E27FC236}">
+                <a16:creationId xmlns:a16="http://schemas.microsoft.com/office/drawing/2014/main" id="{13EBE1A3-05B8-4CBB-94EE-98EFCC3BCE00}"/>
+              </a:ext>
+            </a:extLst>
+          </p:cNvPr>
+          <p:cNvSpPr txBox="1"/>
+          <p:nvPr/>
+        </p:nvSpPr>
+        <p:spPr>
+          <a:xfrm>
+            <a:off x="8513878" y="2278600"/>
+            <a:ext cx="2201663" cy="923330"/>
+          </a:xfrm>
+          <a:prstGeom prst="rect">
+            <a:avLst/>
+          </a:prstGeom>
+          <a:noFill/>
+          <a:ln w="6350">
+            <a:solidFill>
+              <a:schemeClr val="tx1"/>
+            </a:solidFill>
+          </a:ln>
+        </p:spPr>
+        <p:txBody>
+          <a:bodyPr wrap="square" rtlCol="0">
+            <a:spAutoFit/>
+          </a:bodyPr>
+          <a:lstStyle/>
+          <a:p>
+            <a:r>
+              <a:rPr lang="es-ES" dirty="0"/>
+              <a:t>Total </a:t>
+            </a:r>
+            <a:r>
+              <a:rPr lang="es-ES" dirty="0" err="1"/>
+              <a:t>distance</a:t>
+            </a:r>
+            <a:endParaRPr lang="es-ES" dirty="0"/>
+          </a:p>
+          <a:p>
+            <a:r>
+              <a:rPr lang="es-ES" dirty="0" err="1"/>
+              <a:t>Uphill</a:t>
+            </a:r>
+            <a:r>
+              <a:rPr lang="es-ES" dirty="0"/>
+              <a:t> </a:t>
+            </a:r>
+            <a:r>
+              <a:rPr lang="es-ES" dirty="0" err="1"/>
+              <a:t>elevation</a:t>
+            </a:r>
+            <a:endParaRPr lang="es-ES" dirty="0"/>
+          </a:p>
+          <a:p>
+            <a:r>
+              <a:rPr lang="es-ES" dirty="0" err="1"/>
+              <a:t>Downhill</a:t>
+            </a:r>
+            <a:r>
+              <a:rPr lang="es-ES" dirty="0"/>
+              <a:t> </a:t>
+            </a:r>
+            <a:r>
+              <a:rPr lang="es-ES" dirty="0" err="1"/>
+              <a:t>elevation</a:t>
+            </a:r>
+            <a:endParaRPr lang="es-ES" dirty="0"/>
+          </a:p>
+        </p:txBody>
+      </p:sp>
+      <p:pic>
+        <p:nvPicPr>
+          <p:cNvPr id="19" name="Picture 2" descr="Rendered Image">
+            <a:extLst>
+              <a:ext uri="{FF2B5EF4-FFF2-40B4-BE49-F238E27FC236}">
+                <a16:creationId xmlns:a16="http://schemas.microsoft.com/office/drawing/2014/main" id="{C873BD29-DB74-4368-82A1-D91AF8E68B7B}"/>
+              </a:ext>
+            </a:extLst>
+          </p:cNvPr>
+          <p:cNvPicPr>
+            <a:picLocks noChangeAspect="1" noChangeArrowheads="1"/>
+          </p:cNvPicPr>
+          <p:nvPr/>
+        </p:nvPicPr>
+        <p:blipFill>
+          <a:blip r:embed="rId4">
+            <a:extLst>
+              <a:ext uri="{28A0092B-C50C-407E-A947-70E740481C1C}">
+                <a14:useLocalDpi xmlns:a14="http://schemas.microsoft.com/office/drawing/2010/main" val="0"/>
+              </a:ext>
+            </a:extLst>
+          </a:blip>
+          <a:srcRect/>
+          <a:stretch>
+            <a:fillRect/>
+          </a:stretch>
+        </p:blipFill>
+        <p:spPr bwMode="auto">
+          <a:xfrm>
+            <a:off x="598240" y="5134504"/>
+            <a:ext cx="2019300" cy="1057275"/>
+          </a:xfrm>
+          <a:prstGeom prst="rect">
+            <a:avLst/>
+          </a:prstGeom>
+          <a:noFill/>
+          <a:extLst>
+            <a:ext uri="{909E8E84-426E-40DD-AFC4-6F175D3DCCD1}">
+              <a14:hiddenFill xmlns:a14="http://schemas.microsoft.com/office/drawing/2010/main">
+                <a:solidFill>
+                  <a:srgbClr val="FFFFFF"/>
+                </a:solidFill>
+              </a14:hiddenFill>
+            </a:ext>
+          </a:extLst>
+        </p:spPr>
+      </p:pic>
+    </p:spTree>
+    <p:extLst>
+      <p:ext uri="{BB962C8B-B14F-4D97-AF65-F5344CB8AC3E}">
+        <p14:creationId xmlns:p14="http://schemas.microsoft.com/office/powerpoint/2010/main" val="3703521982"/>
+      </p:ext>
+    </p:extLst>
+  </p:cSld>
+  <p:clrMapOvr>
+    <a:masterClrMapping/>
+  </p:clrMapOvr>
+</p:sld>
+</file>
+
+<file path=ppt/slides/slide6.xml><?xml version="1.0" encoding="utf-8"?>
+<p:sld xmlns:a="http://schemas.openxmlformats.org/drawingml/2006/main" xmlns:r="http://schemas.openxmlformats.org/officeDocument/2006/relationships" xmlns:p="http://schemas.openxmlformats.org/presentationml/2006/main">
+  <p:cSld>
+    <p:spTree>
+      <p:nvGrpSpPr>
+        <p:cNvPr id="1" name=""/>
+        <p:cNvGrpSpPr/>
+        <p:nvPr/>
+      </p:nvGrpSpPr>
+      <p:grpSpPr>
+        <a:xfrm>
+          <a:off x="0" y="0"/>
+          <a:ext cx="0" cy="0"/>
+          <a:chOff x="0" y="0"/>
+          <a:chExt cx="0" cy="0"/>
+        </a:xfrm>
+      </p:grpSpPr>
+      <p:pic>
+        <p:nvPicPr>
+          <p:cNvPr id="5" name="Imagen 4">
+            <a:extLst>
+              <a:ext uri="{FF2B5EF4-FFF2-40B4-BE49-F238E27FC236}">
+                <a16:creationId xmlns:a16="http://schemas.microsoft.com/office/drawing/2014/main" id="{20B84089-D466-4D04-9783-CB6ADAAD6C96}"/>
+              </a:ext>
+            </a:extLst>
+          </p:cNvPr>
+          <p:cNvPicPr>
+            <a:picLocks noChangeAspect="1"/>
+          </p:cNvPicPr>
+          <p:nvPr/>
+        </p:nvPicPr>
+        <p:blipFill>
+          <a:blip r:embed="rId2"/>
+          <a:stretch>
+            <a:fillRect/>
+          </a:stretch>
+        </p:blipFill>
+        <p:spPr>
+          <a:xfrm>
+            <a:off x="3318057" y="1193683"/>
+            <a:ext cx="5087713" cy="3562875"/>
+          </a:xfrm>
+          <a:prstGeom prst="rect">
+            <a:avLst/>
+          </a:prstGeom>
+        </p:spPr>
+      </p:pic>
+      <p:sp>
+        <p:nvSpPr>
+          <p:cNvPr id="8" name="CuadroTexto 7">
+            <a:extLst>
+              <a:ext uri="{FF2B5EF4-FFF2-40B4-BE49-F238E27FC236}">
+                <a16:creationId xmlns:a16="http://schemas.microsoft.com/office/drawing/2014/main" id="{87D8C68F-3C3F-474E-B2E2-87E9ABCA7C2D}"/>
+              </a:ext>
+            </a:extLst>
+          </p:cNvPr>
+          <p:cNvSpPr txBox="1"/>
+          <p:nvPr/>
+        </p:nvSpPr>
+        <p:spPr>
+          <a:xfrm>
+            <a:off x="1325461" y="645952"/>
+            <a:ext cx="964734" cy="369332"/>
+          </a:xfrm>
+          <a:prstGeom prst="rect">
+            <a:avLst/>
+          </a:prstGeom>
+          <a:solidFill>
+            <a:schemeClr val="bg1">
+              <a:lumMod val="75000"/>
+            </a:schemeClr>
+          </a:solidFill>
+          <a:ln>
+            <a:solidFill>
+              <a:schemeClr val="tx1"/>
+            </a:solidFill>
+          </a:ln>
+        </p:spPr>
+        <p:txBody>
+          <a:bodyPr wrap="square" rtlCol="0">
+            <a:spAutoFit/>
+          </a:bodyPr>
+          <a:lstStyle/>
+          <a:p>
+            <a:r>
+              <a:rPr lang="es-ES" dirty="0"/>
+              <a:t>File</a:t>
+            </a:r>
+          </a:p>
+        </p:txBody>
+      </p:sp>
+      <p:sp>
+        <p:nvSpPr>
+          <p:cNvPr id="9" name="CuadroTexto 8">
+            <a:extLst>
+              <a:ext uri="{FF2B5EF4-FFF2-40B4-BE49-F238E27FC236}">
+                <a16:creationId xmlns:a16="http://schemas.microsoft.com/office/drawing/2014/main" id="{69B7775D-6619-47FA-95FC-2BFF98F90E33}"/>
+              </a:ext>
+            </a:extLst>
+          </p:cNvPr>
+          <p:cNvSpPr txBox="1"/>
+          <p:nvPr/>
+        </p:nvSpPr>
+        <p:spPr>
+          <a:xfrm>
+            <a:off x="1476461" y="1015284"/>
+            <a:ext cx="1325461" cy="307777"/>
+          </a:xfrm>
+          <a:prstGeom prst="rect">
+            <a:avLst/>
+          </a:prstGeom>
+          <a:solidFill>
+            <a:schemeClr val="bg1">
+              <a:lumMod val="75000"/>
+            </a:schemeClr>
+          </a:solidFill>
+          <a:ln>
+            <a:solidFill>
+              <a:schemeClr val="tx1"/>
+            </a:solidFill>
+          </a:ln>
+        </p:spPr>
+        <p:txBody>
+          <a:bodyPr wrap="square" rtlCol="0">
+            <a:spAutoFit/>
+          </a:bodyPr>
+          <a:lstStyle/>
+          <a:p>
+            <a:r>
+              <a:rPr lang="es-ES" sz="1400" dirty="0"/>
+              <a:t>Load </a:t>
+            </a:r>
+            <a:r>
+              <a:rPr lang="es-ES" sz="1400" dirty="0" err="1"/>
+              <a:t>track</a:t>
+            </a:r>
+            <a:endParaRPr lang="es-ES" sz="1400" dirty="0"/>
+          </a:p>
+        </p:txBody>
+      </p:sp>
+      <p:sp>
+        <p:nvSpPr>
+          <p:cNvPr id="10" name="CuadroTexto 9">
+            <a:extLst>
+              <a:ext uri="{FF2B5EF4-FFF2-40B4-BE49-F238E27FC236}">
+                <a16:creationId xmlns:a16="http://schemas.microsoft.com/office/drawing/2014/main" id="{E6B399B8-DA52-4C30-972E-53ADA9421924}"/>
+              </a:ext>
+            </a:extLst>
+          </p:cNvPr>
+          <p:cNvSpPr txBox="1"/>
+          <p:nvPr/>
+        </p:nvSpPr>
+        <p:spPr>
+          <a:xfrm>
+            <a:off x="1476460" y="1323061"/>
+            <a:ext cx="1325461" cy="307777"/>
+          </a:xfrm>
+          <a:prstGeom prst="rect">
+            <a:avLst/>
+          </a:prstGeom>
+          <a:solidFill>
+            <a:schemeClr val="bg1">
+              <a:lumMod val="75000"/>
+            </a:schemeClr>
+          </a:solidFill>
+          <a:ln>
+            <a:solidFill>
+              <a:schemeClr val="tx1"/>
+            </a:solidFill>
+          </a:ln>
+        </p:spPr>
+        <p:txBody>
+          <a:bodyPr wrap="square" rtlCol="0">
+            <a:spAutoFit/>
+          </a:bodyPr>
+          <a:lstStyle/>
+          <a:p>
+            <a:r>
+              <a:rPr lang="es-ES" sz="1400" dirty="0"/>
+              <a:t>Load </a:t>
+            </a:r>
+            <a:r>
+              <a:rPr lang="es-ES" sz="1400" dirty="0" err="1"/>
+              <a:t>session</a:t>
+            </a:r>
+            <a:endParaRPr lang="es-ES" sz="1400" dirty="0"/>
+          </a:p>
+        </p:txBody>
+      </p:sp>
+      <p:sp>
+        <p:nvSpPr>
+          <p:cNvPr id="11" name="CuadroTexto 10">
+            <a:extLst>
+              <a:ext uri="{FF2B5EF4-FFF2-40B4-BE49-F238E27FC236}">
+                <a16:creationId xmlns:a16="http://schemas.microsoft.com/office/drawing/2014/main" id="{D9B563DB-707C-4CD4-803E-C6573FDAE050}"/>
+              </a:ext>
+            </a:extLst>
+          </p:cNvPr>
+          <p:cNvSpPr txBox="1"/>
+          <p:nvPr/>
+        </p:nvSpPr>
+        <p:spPr>
+          <a:xfrm>
+            <a:off x="1476460" y="1615478"/>
+            <a:ext cx="1325461" cy="307777"/>
+          </a:xfrm>
+          <a:prstGeom prst="rect">
+            <a:avLst/>
+          </a:prstGeom>
+          <a:solidFill>
+            <a:schemeClr val="bg1">
+              <a:lumMod val="75000"/>
+            </a:schemeClr>
+          </a:solidFill>
+          <a:ln>
+            <a:solidFill>
+              <a:schemeClr val="tx1"/>
+            </a:solidFill>
+          </a:ln>
+        </p:spPr>
+        <p:txBody>
+          <a:bodyPr wrap="square" rtlCol="0">
+            <a:spAutoFit/>
+          </a:bodyPr>
+          <a:lstStyle/>
+          <a:p>
+            <a:r>
+              <a:rPr lang="es-ES" sz="1400" dirty="0"/>
+              <a:t>New </a:t>
+            </a:r>
+            <a:r>
+              <a:rPr lang="es-ES" sz="1400" dirty="0" err="1"/>
+              <a:t>session</a:t>
+            </a:r>
+            <a:endParaRPr lang="es-ES" sz="1400" dirty="0"/>
+          </a:p>
+        </p:txBody>
+      </p:sp>
+      <p:sp>
+        <p:nvSpPr>
+          <p:cNvPr id="12" name="CuadroTexto 11">
+            <a:extLst>
+              <a:ext uri="{FF2B5EF4-FFF2-40B4-BE49-F238E27FC236}">
+                <a16:creationId xmlns:a16="http://schemas.microsoft.com/office/drawing/2014/main" id="{33980FAD-8BDF-4D61-BA99-FBF4A8BD191D}"/>
+              </a:ext>
+            </a:extLst>
+          </p:cNvPr>
+          <p:cNvSpPr txBox="1"/>
+          <p:nvPr/>
+        </p:nvSpPr>
+        <p:spPr>
+          <a:xfrm>
+            <a:off x="1476460" y="1905363"/>
+            <a:ext cx="1325461" cy="307777"/>
+          </a:xfrm>
+          <a:prstGeom prst="rect">
+            <a:avLst/>
+          </a:prstGeom>
+          <a:solidFill>
+            <a:schemeClr val="bg1">
+              <a:lumMod val="75000"/>
+            </a:schemeClr>
+          </a:solidFill>
+          <a:ln>
+            <a:solidFill>
+              <a:schemeClr val="tx1"/>
+            </a:solidFill>
+          </a:ln>
+        </p:spPr>
+        <p:txBody>
+          <a:bodyPr wrap="square" rtlCol="0">
+            <a:spAutoFit/>
+          </a:bodyPr>
+          <a:lstStyle/>
+          <a:p>
+            <a:r>
+              <a:rPr lang="es-ES" sz="1400" dirty="0" err="1"/>
+              <a:t>Save</a:t>
+            </a:r>
+            <a:r>
+              <a:rPr lang="es-ES" sz="1400" dirty="0"/>
+              <a:t> </a:t>
+            </a:r>
+            <a:r>
+              <a:rPr lang="es-ES" sz="1400" dirty="0" err="1"/>
+              <a:t>session</a:t>
+            </a:r>
+            <a:endParaRPr lang="es-ES" sz="1400" dirty="0"/>
+          </a:p>
+        </p:txBody>
+      </p:sp>
+      <p:sp>
+        <p:nvSpPr>
+          <p:cNvPr id="13" name="CuadroTexto 12">
+            <a:extLst>
+              <a:ext uri="{FF2B5EF4-FFF2-40B4-BE49-F238E27FC236}">
+                <a16:creationId xmlns:a16="http://schemas.microsoft.com/office/drawing/2014/main" id="{785F6E4A-3AFF-444D-931D-D0FEA190FED5}"/>
+              </a:ext>
+            </a:extLst>
+          </p:cNvPr>
+          <p:cNvSpPr txBox="1"/>
+          <p:nvPr/>
+        </p:nvSpPr>
+        <p:spPr>
+          <a:xfrm>
+            <a:off x="1476459" y="2213140"/>
+            <a:ext cx="1325461" cy="307777"/>
+          </a:xfrm>
+          <a:prstGeom prst="rect">
+            <a:avLst/>
+          </a:prstGeom>
+          <a:solidFill>
+            <a:schemeClr val="bg1">
+              <a:lumMod val="75000"/>
+            </a:schemeClr>
+          </a:solidFill>
+          <a:ln>
+            <a:solidFill>
+              <a:schemeClr val="tx1"/>
+            </a:solidFill>
+          </a:ln>
+        </p:spPr>
+        <p:txBody>
+          <a:bodyPr wrap="square" rtlCol="0">
+            <a:spAutoFit/>
+          </a:bodyPr>
+          <a:lstStyle/>
+          <a:p>
+            <a:r>
+              <a:rPr lang="es-ES" sz="1400" dirty="0" err="1"/>
+              <a:t>Exit</a:t>
+            </a:r>
+            <a:endParaRPr lang="es-ES" sz="1400" dirty="0"/>
+          </a:p>
+        </p:txBody>
+      </p:sp>
+      <p:sp>
+        <p:nvSpPr>
+          <p:cNvPr id="14" name="CuadroTexto 13">
+            <a:extLst>
+              <a:ext uri="{FF2B5EF4-FFF2-40B4-BE49-F238E27FC236}">
+                <a16:creationId xmlns:a16="http://schemas.microsoft.com/office/drawing/2014/main" id="{141CAC72-0D93-49C6-8913-A7593E1C4044}"/>
+              </a:ext>
+            </a:extLst>
+          </p:cNvPr>
+          <p:cNvSpPr txBox="1"/>
+          <p:nvPr/>
+        </p:nvSpPr>
+        <p:spPr>
+          <a:xfrm>
+            <a:off x="8854294" y="105013"/>
+            <a:ext cx="3087149" cy="1938992"/>
+          </a:xfrm>
+          <a:prstGeom prst="rect">
+            <a:avLst/>
+          </a:prstGeom>
+          <a:noFill/>
+        </p:spPr>
+        <p:txBody>
+          <a:bodyPr wrap="square" rtlCol="0">
+            <a:spAutoFit/>
+          </a:bodyPr>
+          <a:lstStyle/>
+          <a:p>
+            <a:r>
+              <a:rPr lang="es-ES" dirty="0"/>
+              <a:t>Notes:</a:t>
+            </a:r>
+          </a:p>
+          <a:p>
+            <a:pPr marL="285750" indent="-285750">
+              <a:buFontTx/>
+              <a:buChar char="-"/>
+            </a:pPr>
+            <a:r>
+              <a:rPr lang="es-ES" dirty="0"/>
+              <a:t>V00.05</a:t>
+            </a:r>
+          </a:p>
+          <a:p>
+            <a:pPr marL="285750" indent="-285750">
+              <a:buFontTx/>
+              <a:buChar char="-"/>
+            </a:pPr>
+            <a:r>
+              <a:rPr lang="es-ES" sz="1400" dirty="0" err="1"/>
+              <a:t>When</a:t>
+            </a:r>
+            <a:r>
+              <a:rPr lang="es-ES" sz="1400" dirty="0"/>
+              <a:t> </a:t>
+            </a:r>
+            <a:r>
+              <a:rPr lang="es-ES" sz="1400" dirty="0" err="1"/>
+              <a:t>selecting</a:t>
+            </a:r>
+            <a:r>
+              <a:rPr lang="es-ES" sz="1400" dirty="0"/>
+              <a:t> a line in </a:t>
+            </a:r>
+            <a:r>
+              <a:rPr lang="es-ES" sz="1400" dirty="0" err="1"/>
+              <a:t>the</a:t>
+            </a:r>
+            <a:r>
+              <a:rPr lang="es-ES" sz="1400" dirty="0"/>
+              <a:t> </a:t>
+            </a:r>
+            <a:r>
+              <a:rPr lang="es-ES" sz="1400" dirty="0" err="1"/>
+              <a:t>plot</a:t>
+            </a:r>
+            <a:r>
+              <a:rPr lang="es-ES" sz="1400" dirty="0"/>
+              <a:t>: </a:t>
+            </a:r>
+          </a:p>
+          <a:p>
+            <a:pPr marL="742950" lvl="1" indent="-285750">
+              <a:buFontTx/>
+              <a:buChar char="-"/>
+            </a:pPr>
+            <a:r>
+              <a:rPr lang="es-ES" sz="1400" dirty="0"/>
+              <a:t> </a:t>
+            </a:r>
+            <a:r>
+              <a:rPr lang="es-ES" sz="1400" dirty="0" err="1"/>
+              <a:t>its</a:t>
+            </a:r>
+            <a:r>
+              <a:rPr lang="es-ES" sz="1400" dirty="0"/>
+              <a:t> </a:t>
+            </a:r>
+            <a:r>
+              <a:rPr lang="es-ES" sz="1400" dirty="0" err="1"/>
+              <a:t>thickness</a:t>
+            </a:r>
+            <a:r>
+              <a:rPr lang="es-ES" sz="1400" dirty="0"/>
+              <a:t> </a:t>
+            </a:r>
+            <a:r>
+              <a:rPr lang="es-ES" sz="1400" dirty="0" err="1"/>
+              <a:t>is</a:t>
+            </a:r>
+            <a:r>
+              <a:rPr lang="es-ES" sz="1400" dirty="0"/>
+              <a:t> </a:t>
+            </a:r>
+            <a:r>
+              <a:rPr lang="es-ES" sz="1400" dirty="0" err="1"/>
+              <a:t>increased</a:t>
+            </a:r>
+            <a:endParaRPr lang="es-ES" sz="1400" dirty="0"/>
+          </a:p>
+          <a:p>
+            <a:pPr marL="742950" lvl="1" indent="-285750">
+              <a:buFontTx/>
+              <a:buChar char="-"/>
+            </a:pPr>
+            <a:r>
+              <a:rPr lang="es-ES" sz="1400" dirty="0" err="1"/>
+              <a:t>Elevation</a:t>
+            </a:r>
+            <a:r>
+              <a:rPr lang="es-ES" sz="1400" dirty="0"/>
+              <a:t> </a:t>
+            </a:r>
+            <a:r>
+              <a:rPr lang="es-ES" sz="1400" dirty="0" err="1"/>
+              <a:t>of</a:t>
+            </a:r>
+            <a:r>
+              <a:rPr lang="es-ES" sz="1400" dirty="0"/>
+              <a:t> </a:t>
+            </a:r>
+            <a:r>
+              <a:rPr lang="es-ES" sz="1400" dirty="0" err="1"/>
+              <a:t>that</a:t>
+            </a:r>
+            <a:r>
+              <a:rPr lang="es-ES" sz="1400" dirty="0"/>
+              <a:t> </a:t>
+            </a:r>
+            <a:r>
+              <a:rPr lang="es-ES" sz="1400" dirty="0" err="1"/>
+              <a:t>segment</a:t>
+            </a:r>
+            <a:r>
+              <a:rPr lang="es-ES" sz="1400" dirty="0"/>
+              <a:t> </a:t>
+            </a:r>
+            <a:r>
+              <a:rPr lang="es-ES" sz="1400" dirty="0" err="1"/>
+              <a:t>is</a:t>
+            </a:r>
+            <a:r>
+              <a:rPr lang="es-ES" sz="1400" dirty="0"/>
+              <a:t> </a:t>
+            </a:r>
+            <a:r>
+              <a:rPr lang="es-ES" sz="1400"/>
+              <a:t>displayed</a:t>
+            </a:r>
+            <a:endParaRPr lang="es-ES" sz="1400" dirty="0"/>
+          </a:p>
+          <a:p>
+            <a:pPr marL="742950" lvl="1" indent="-285750">
+              <a:buFontTx/>
+              <a:buChar char="-"/>
+            </a:pPr>
+            <a:r>
+              <a:rPr lang="es-ES" sz="1400" dirty="0" err="1"/>
+              <a:t>Information</a:t>
+            </a:r>
+            <a:r>
+              <a:rPr lang="es-ES" sz="1400" dirty="0"/>
+              <a:t> table </a:t>
+            </a:r>
+            <a:r>
+              <a:rPr lang="es-ES" sz="1400" dirty="0" err="1"/>
+              <a:t>for</a:t>
+            </a:r>
+            <a:r>
+              <a:rPr lang="es-ES" sz="1400" dirty="0"/>
+              <a:t> </a:t>
+            </a:r>
+            <a:r>
+              <a:rPr lang="es-ES" sz="1400" dirty="0" err="1"/>
+              <a:t>that</a:t>
+            </a:r>
+            <a:r>
+              <a:rPr lang="es-ES" sz="1400" dirty="0"/>
+              <a:t> single </a:t>
+            </a:r>
+            <a:r>
+              <a:rPr lang="es-ES" sz="1400" dirty="0" err="1"/>
+              <a:t>segment</a:t>
+            </a:r>
+            <a:r>
+              <a:rPr lang="es-ES" sz="1400" dirty="0"/>
+              <a:t> in </a:t>
+            </a:r>
+            <a:r>
+              <a:rPr lang="es-ES" sz="1400" dirty="0" err="1"/>
+              <a:t>bold</a:t>
+            </a:r>
+            <a:endParaRPr lang="es-ES" sz="1400" dirty="0"/>
+          </a:p>
+        </p:txBody>
+      </p:sp>
       <p:grpSp>
         <p:nvGrpSpPr>
           <p:cNvPr id="18" name="Grupo 17">
@@ -6093,12 +7289,260 @@
           </p:txBody>
         </p:sp>
       </p:grpSp>
+      <p:sp>
+        <p:nvSpPr>
+          <p:cNvPr id="2" name="CuadroTexto 1">
+            <a:extLst>
+              <a:ext uri="{FF2B5EF4-FFF2-40B4-BE49-F238E27FC236}">
+                <a16:creationId xmlns:a16="http://schemas.microsoft.com/office/drawing/2014/main" id="{13EBE1A3-05B8-4CBB-94EE-98EFCC3BCE00}"/>
+              </a:ext>
+            </a:extLst>
+          </p:cNvPr>
+          <p:cNvSpPr txBox="1"/>
+          <p:nvPr/>
+        </p:nvSpPr>
+        <p:spPr>
+          <a:xfrm>
+            <a:off x="8646850" y="2213140"/>
+            <a:ext cx="2201663" cy="923330"/>
+          </a:xfrm>
+          <a:prstGeom prst="rect">
+            <a:avLst/>
+          </a:prstGeom>
+          <a:noFill/>
+          <a:ln w="6350">
+            <a:solidFill>
+              <a:schemeClr val="tx1"/>
+            </a:solidFill>
+          </a:ln>
+        </p:spPr>
+        <p:txBody>
+          <a:bodyPr wrap="square" rtlCol="0">
+            <a:spAutoFit/>
+          </a:bodyPr>
+          <a:lstStyle/>
+          <a:p>
+            <a:r>
+              <a:rPr lang="es-ES" dirty="0"/>
+              <a:t>Total </a:t>
+            </a:r>
+            <a:r>
+              <a:rPr lang="es-ES" dirty="0" err="1"/>
+              <a:t>distance</a:t>
+            </a:r>
+            <a:endParaRPr lang="es-ES" dirty="0"/>
+          </a:p>
+          <a:p>
+            <a:r>
+              <a:rPr lang="es-ES" dirty="0" err="1"/>
+              <a:t>Uphill</a:t>
+            </a:r>
+            <a:r>
+              <a:rPr lang="es-ES" dirty="0"/>
+              <a:t> </a:t>
+            </a:r>
+            <a:r>
+              <a:rPr lang="es-ES" dirty="0" err="1"/>
+              <a:t>elevation</a:t>
+            </a:r>
+            <a:endParaRPr lang="es-ES" dirty="0"/>
+          </a:p>
+          <a:p>
+            <a:r>
+              <a:rPr lang="es-ES" dirty="0" err="1"/>
+              <a:t>Downhill</a:t>
+            </a:r>
+            <a:r>
+              <a:rPr lang="es-ES" dirty="0"/>
+              <a:t> </a:t>
+            </a:r>
+            <a:r>
+              <a:rPr lang="es-ES" dirty="0" err="1"/>
+              <a:t>elevation</a:t>
+            </a:r>
+            <a:endParaRPr lang="es-ES" dirty="0"/>
+          </a:p>
+        </p:txBody>
+      </p:sp>
+      <p:sp>
+        <p:nvSpPr>
+          <p:cNvPr id="19" name="Flecha: hacia abajo 18">
+            <a:extLst>
+              <a:ext uri="{FF2B5EF4-FFF2-40B4-BE49-F238E27FC236}">
+                <a16:creationId xmlns:a16="http://schemas.microsoft.com/office/drawing/2014/main" id="{615D0BC7-ADE7-459C-B1BC-0D694DC7D9AE}"/>
+              </a:ext>
+            </a:extLst>
+          </p:cNvPr>
+          <p:cNvSpPr/>
+          <p:nvPr/>
+        </p:nvSpPr>
+        <p:spPr>
+          <a:xfrm rot="8514297">
+            <a:off x="10249956" y="3049430"/>
+            <a:ext cx="195309" cy="1695635"/>
+          </a:xfrm>
+          <a:prstGeom prst="downArrow">
+            <a:avLst/>
+          </a:prstGeom>
+        </p:spPr>
+        <p:style>
+          <a:lnRef idx="2">
+            <a:schemeClr val="accent1">
+              <a:shade val="50000"/>
+            </a:schemeClr>
+          </a:lnRef>
+          <a:fillRef idx="1">
+            <a:schemeClr val="accent1"/>
+          </a:fillRef>
+          <a:effectRef idx="0">
+            <a:schemeClr val="accent1"/>
+          </a:effectRef>
+          <a:fontRef idx="minor">
+            <a:schemeClr val="lt1"/>
+          </a:fontRef>
+        </p:style>
+        <p:txBody>
+          <a:bodyPr rtlCol="0" anchor="ctr"/>
+          <a:lstStyle/>
+          <a:p>
+            <a:pPr algn="ctr"/>
+            <a:endParaRPr lang="es-ES"/>
+          </a:p>
+        </p:txBody>
+      </p:sp>
+      <mc:AlternateContent xmlns:mc="http://schemas.openxmlformats.org/markup-compatibility/2006" xmlns:p14="http://schemas.microsoft.com/office/powerpoint/2010/main">
+        <mc:Choice Requires="p14">
+          <p:contentPart p14:bwMode="auto" r:id="rId3">
+            <p14:nvContentPartPr>
+              <p14:cNvPr id="22" name="Entrada de lápiz 21">
+                <a:extLst>
+                  <a:ext uri="{FF2B5EF4-FFF2-40B4-BE49-F238E27FC236}">
+                    <a16:creationId xmlns:a16="http://schemas.microsoft.com/office/drawing/2014/main" id="{5A236FC7-AB2F-44E3-821D-76E45DE63B8A}"/>
+                  </a:ext>
+                </a:extLst>
+              </p14:cNvPr>
+              <p14:cNvContentPartPr/>
+              <p14:nvPr/>
+            </p14:nvContentPartPr>
+            <p14:xfrm>
+              <a:off x="5063755" y="3342260"/>
+              <a:ext cx="537120" cy="443160"/>
+            </p14:xfrm>
+          </p:contentPart>
+        </mc:Choice>
+        <mc:Fallback xmlns="">
+          <p:pic>
+            <p:nvPicPr>
+              <p:cNvPr id="22" name="Entrada de lápiz 21">
+                <a:extLst>
+                  <a:ext uri="{FF2B5EF4-FFF2-40B4-BE49-F238E27FC236}">
+                    <a16:creationId xmlns:a16="http://schemas.microsoft.com/office/drawing/2014/main" id="{5A236FC7-AB2F-44E3-821D-76E45DE63B8A}"/>
+                  </a:ext>
+                </a:extLst>
+              </p:cNvPr>
+              <p:cNvPicPr/>
+              <p:nvPr/>
+            </p:nvPicPr>
+            <p:blipFill>
+              <a:blip r:embed="rId5"/>
+              <a:stretch>
+                <a:fillRect/>
+              </a:stretch>
+            </p:blipFill>
+            <p:spPr>
+              <a:xfrm>
+                <a:off x="5046115" y="3324620"/>
+                <a:ext cx="572760" cy="478800"/>
+              </a:xfrm>
+              <a:prstGeom prst="rect">
+                <a:avLst/>
+              </a:prstGeom>
+            </p:spPr>
+          </p:pic>
+        </mc:Fallback>
+      </mc:AlternateContent>
       <p:pic>
         <p:nvPicPr>
-          <p:cNvPr id="19" name="Picture 2" descr="Rendered Image">
-            <a:extLst>
-              <a:ext uri="{FF2B5EF4-FFF2-40B4-BE49-F238E27FC236}">
-                <a16:creationId xmlns:a16="http://schemas.microsoft.com/office/drawing/2014/main" id="{33779A03-33C4-42CE-8D14-70C44AE26E37}"/>
+          <p:cNvPr id="28" name="Imagen 27">
+            <a:extLst>
+              <a:ext uri="{FF2B5EF4-FFF2-40B4-BE49-F238E27FC236}">
+                <a16:creationId xmlns:a16="http://schemas.microsoft.com/office/drawing/2014/main" id="{291D2744-3EC0-4703-85C3-FFDDCAC12C9E}"/>
+              </a:ext>
+            </a:extLst>
+          </p:cNvPr>
+          <p:cNvPicPr>
+            <a:picLocks noChangeAspect="1"/>
+          </p:cNvPicPr>
+          <p:nvPr/>
+        </p:nvPicPr>
+        <p:blipFill>
+          <a:blip r:embed="rId6"/>
+          <a:stretch>
+            <a:fillRect/>
+          </a:stretch>
+        </p:blipFill>
+        <p:spPr>
+          <a:xfrm>
+            <a:off x="3263684" y="4799866"/>
+            <a:ext cx="5142086" cy="1770919"/>
+          </a:xfrm>
+          <a:prstGeom prst="rect">
+            <a:avLst/>
+          </a:prstGeom>
+        </p:spPr>
+      </p:pic>
+      <p:sp>
+        <p:nvSpPr>
+          <p:cNvPr id="3" name="Flecha: hacia abajo 2">
+            <a:extLst>
+              <a:ext uri="{FF2B5EF4-FFF2-40B4-BE49-F238E27FC236}">
+                <a16:creationId xmlns:a16="http://schemas.microsoft.com/office/drawing/2014/main" id="{71DE474A-0DE1-4B69-9232-D9BC8AF88DB1}"/>
+              </a:ext>
+            </a:extLst>
+          </p:cNvPr>
+          <p:cNvSpPr/>
+          <p:nvPr/>
+        </p:nvSpPr>
+        <p:spPr>
+          <a:xfrm rot="3380404">
+            <a:off x="8824250" y="4189566"/>
+            <a:ext cx="195309" cy="1695635"/>
+          </a:xfrm>
+          <a:prstGeom prst="downArrow">
+            <a:avLst/>
+          </a:prstGeom>
+        </p:spPr>
+        <p:style>
+          <a:lnRef idx="2">
+            <a:schemeClr val="accent1">
+              <a:shade val="50000"/>
+            </a:schemeClr>
+          </a:lnRef>
+          <a:fillRef idx="1">
+            <a:schemeClr val="accent1"/>
+          </a:fillRef>
+          <a:effectRef idx="0">
+            <a:schemeClr val="accent1"/>
+          </a:effectRef>
+          <a:fontRef idx="minor">
+            <a:schemeClr val="lt1"/>
+          </a:fontRef>
+        </p:style>
+        <p:txBody>
+          <a:bodyPr rtlCol="0" anchor="ctr"/>
+          <a:lstStyle/>
+          <a:p>
+            <a:pPr algn="ctr"/>
+            <a:endParaRPr lang="es-ES"/>
+          </a:p>
+        </p:txBody>
+      </p:sp>
+      <p:pic>
+        <p:nvPicPr>
+          <p:cNvPr id="20" name="Picture 2" descr="Rendered Image">
+            <a:extLst>
+              <a:ext uri="{FF2B5EF4-FFF2-40B4-BE49-F238E27FC236}">
+                <a16:creationId xmlns:a16="http://schemas.microsoft.com/office/drawing/2014/main" id="{FDC25E55-6BF9-469C-BBB7-C84F0BBE5B0C}"/>
               </a:ext>
             </a:extLst>
           </p:cNvPr>
@@ -6108,7 +7552,7 @@
           <p:nvPr/>
         </p:nvPicPr>
         <p:blipFill>
-          <a:blip r:embed="rId4">
+          <a:blip r:embed="rId7">
             <a:extLst>
               <a:ext uri="{28A0092B-C50C-407E-A947-70E740481C1C}">
                 <a14:useLocalDpi xmlns:a14="http://schemas.microsoft.com/office/drawing/2010/main" val="0"/>
@@ -6143,7 +7587,7 @@
     </p:spTree>
     <p:extLst>
       <p:ext uri="{BB962C8B-B14F-4D97-AF65-F5344CB8AC3E}">
-        <p14:creationId xmlns:p14="http://schemas.microsoft.com/office/powerpoint/2010/main" val="3950845870"/>
+        <p14:creationId xmlns:p14="http://schemas.microsoft.com/office/powerpoint/2010/main" val="1142972357"/>
       </p:ext>
     </p:extLst>
   </p:cSld>
@@ -6153,7 +7597,7 @@
 </p:sld>
 </file>
 
-<file path=ppt/slides/slide5.xml><?xml version="1.0" encoding="utf-8"?>
+<file path=ppt/slides/slide7.xml><?xml version="1.0" encoding="utf-8"?>
 <p:sld xmlns:a="http://schemas.openxmlformats.org/drawingml/2006/main" xmlns:r="http://schemas.openxmlformats.org/officeDocument/2006/relationships" xmlns:p="http://schemas.openxmlformats.org/presentationml/2006/main">
   <p:cSld>
     <p:spTree>
@@ -6200,36 +7644,6 @@
           </a:prstGeom>
         </p:spPr>
       </p:pic>
-      <p:pic>
-        <p:nvPicPr>
-          <p:cNvPr id="6" name="Imagen 5">
-            <a:extLst>
-              <a:ext uri="{FF2B5EF4-FFF2-40B4-BE49-F238E27FC236}">
-                <a16:creationId xmlns:a16="http://schemas.microsoft.com/office/drawing/2014/main" id="{4A8A3EDD-413E-4611-B0F7-F3E7B0E8B4B8}"/>
-              </a:ext>
-            </a:extLst>
-          </p:cNvPr>
-          <p:cNvPicPr>
-            <a:picLocks noChangeAspect="1"/>
-          </p:cNvPicPr>
-          <p:nvPr/>
-        </p:nvPicPr>
-        <p:blipFill>
-          <a:blip r:embed="rId3"/>
-          <a:stretch>
-            <a:fillRect/>
-          </a:stretch>
-        </p:blipFill>
-        <p:spPr>
-          <a:xfrm>
-            <a:off x="3216217" y="4884598"/>
-            <a:ext cx="5332428" cy="1411427"/>
-          </a:xfrm>
-          <a:prstGeom prst="rect">
-            <a:avLst/>
-          </a:prstGeom>
-        </p:spPr>
-      </p:pic>
       <p:sp>
         <p:nvSpPr>
           <p:cNvPr id="8" name="CuadroTexto 7">
@@ -6513,7 +7927,15 @@
           <a:p>
             <a:r>
               <a:rPr lang="es-ES" sz="1400" dirty="0" err="1"/>
-              <a:t>Exit</a:t>
+              <a:t>Save</a:t>
+            </a:r>
+            <a:r>
+              <a:rPr lang="es-ES" sz="1400" dirty="0"/>
+              <a:t> </a:t>
+            </a:r>
+            <a:r>
+              <a:rPr lang="es-ES" sz="1400" dirty="0" err="1"/>
+              <a:t>gpx</a:t>
             </a:r>
             <a:endParaRPr lang="es-ES" sz="1400" dirty="0"/>
           </a:p>
@@ -6533,8 +7955,8 @@
         </p:nvSpPr>
         <p:spPr>
           <a:xfrm>
-            <a:off x="8783273" y="234892"/>
-            <a:ext cx="3087149" cy="1477328"/>
+            <a:off x="8854294" y="105013"/>
+            <a:ext cx="3087149" cy="923330"/>
           </a:xfrm>
           <a:prstGeom prst="rect">
             <a:avLst/>
@@ -6559,7 +7981,7 @@
             </a:pPr>
             <a:r>
               <a:rPr lang="es-ES" dirty="0"/>
-              <a:t>V00.04</a:t>
+              <a:t>V00.06</a:t>
             </a:r>
           </a:p>
           <a:p>
@@ -6569,7 +7991,7 @@
             </a:pPr>
             <a:r>
               <a:rPr lang="es-ES" dirty="0" err="1"/>
-              <a:t>Summary</a:t>
+              <a:t>Save</a:t>
             </a:r>
             <a:r>
               <a:rPr lang="es-ES" dirty="0"/>
@@ -6577,223 +7999,21 @@
             </a:r>
             <a:r>
               <a:rPr lang="es-ES" dirty="0" err="1"/>
-              <a:t>of</a:t>
+              <a:t>gpx</a:t>
             </a:r>
             <a:r>
               <a:rPr lang="es-ES" dirty="0"/>
-              <a:t> full </a:t>
-            </a:r>
-            <a:r>
-              <a:rPr lang="es-ES" dirty="0" err="1"/>
-              <a:t>track</a:t>
-            </a:r>
-            <a:r>
-              <a:rPr lang="es-ES" dirty="0"/>
-              <a:t> in table and single </a:t>
-            </a:r>
-            <a:r>
-              <a:rPr lang="es-ES" dirty="0" err="1"/>
-              <a:t>segments</a:t>
-            </a:r>
-            <a:endParaRPr lang="es-ES" dirty="0"/>
-          </a:p>
-          <a:p>
-            <a:endParaRPr lang="es-ES" dirty="0"/>
-          </a:p>
-        </p:txBody>
-      </p:sp>
-      <p:grpSp>
-        <p:nvGrpSpPr>
-          <p:cNvPr id="18" name="Grupo 17">
-            <a:extLst>
-              <a:ext uri="{FF2B5EF4-FFF2-40B4-BE49-F238E27FC236}">
-                <a16:creationId xmlns:a16="http://schemas.microsoft.com/office/drawing/2014/main" id="{CE082FDB-5094-4F0F-8661-7B8640501D0A}"/>
-              </a:ext>
-            </a:extLst>
-          </p:cNvPr>
-          <p:cNvGrpSpPr/>
-          <p:nvPr/>
-        </p:nvGrpSpPr>
-        <p:grpSpPr>
-          <a:xfrm>
-            <a:off x="7945770" y="3897247"/>
-            <a:ext cx="267052" cy="615554"/>
-            <a:chOff x="8851781" y="2520917"/>
-            <a:chExt cx="267052" cy="615554"/>
-          </a:xfrm>
-        </p:grpSpPr>
-        <p:sp>
-          <p:nvSpPr>
-            <p:cNvPr id="16" name="CuadroTexto 15">
-              <a:extLst>
-                <a:ext uri="{FF2B5EF4-FFF2-40B4-BE49-F238E27FC236}">
-                  <a16:creationId xmlns:a16="http://schemas.microsoft.com/office/drawing/2014/main" id="{19713EAB-5261-4665-91F7-2DFD19C8A273}"/>
-                </a:ext>
-              </a:extLst>
-            </p:cNvPr>
-            <p:cNvSpPr txBox="1"/>
-            <p:nvPr/>
-          </p:nvSpPr>
-          <p:spPr>
-            <a:xfrm>
-              <a:off x="8851782" y="2520917"/>
-              <a:ext cx="267051" cy="307777"/>
-            </a:xfrm>
-            <a:prstGeom prst="rect">
-              <a:avLst/>
-            </a:prstGeom>
-            <a:solidFill>
-              <a:schemeClr val="bg1">
-                <a:lumMod val="85000"/>
-              </a:schemeClr>
-            </a:solidFill>
-            <a:ln>
-              <a:solidFill>
-                <a:schemeClr val="tx1"/>
-              </a:solidFill>
-            </a:ln>
-          </p:spPr>
-          <p:txBody>
-            <a:bodyPr wrap="square" rtlCol="0">
-              <a:spAutoFit/>
-            </a:bodyPr>
-            <a:lstStyle/>
-            <a:p>
-              <a:pPr algn="ctr"/>
-              <a:r>
-                <a:rPr lang="es-ES" sz="1400" dirty="0"/>
-                <a:t>+</a:t>
-              </a:r>
-            </a:p>
-          </p:txBody>
-        </p:sp>
-        <p:sp>
-          <p:nvSpPr>
-            <p:cNvPr id="17" name="CuadroTexto 16">
-              <a:extLst>
-                <a:ext uri="{FF2B5EF4-FFF2-40B4-BE49-F238E27FC236}">
-                  <a16:creationId xmlns:a16="http://schemas.microsoft.com/office/drawing/2014/main" id="{F98C1302-45BF-449D-BD36-6743087E2F05}"/>
-                </a:ext>
-              </a:extLst>
-            </p:cNvPr>
-            <p:cNvSpPr txBox="1"/>
-            <p:nvPr/>
-          </p:nvSpPr>
-          <p:spPr>
-            <a:xfrm>
-              <a:off x="8851781" y="2828694"/>
-              <a:ext cx="267051" cy="307777"/>
-            </a:xfrm>
-            <a:prstGeom prst="rect">
-              <a:avLst/>
-            </a:prstGeom>
-            <a:solidFill>
-              <a:schemeClr val="bg1">
-                <a:lumMod val="85000"/>
-              </a:schemeClr>
-            </a:solidFill>
-            <a:ln>
-              <a:solidFill>
-                <a:schemeClr val="tx1"/>
-              </a:solidFill>
-            </a:ln>
-          </p:spPr>
-          <p:txBody>
-            <a:bodyPr wrap="square" rtlCol="0">
-              <a:spAutoFit/>
-            </a:bodyPr>
-            <a:lstStyle/>
-            <a:p>
-              <a:pPr algn="ctr"/>
-              <a:r>
-                <a:rPr lang="es-ES" sz="1400" dirty="0"/>
-                <a:t>-</a:t>
-              </a:r>
-            </a:p>
-          </p:txBody>
-        </p:sp>
-      </p:grpSp>
-      <p:sp>
-        <p:nvSpPr>
-          <p:cNvPr id="2" name="CuadroTexto 1">
-            <a:extLst>
-              <a:ext uri="{FF2B5EF4-FFF2-40B4-BE49-F238E27FC236}">
-                <a16:creationId xmlns:a16="http://schemas.microsoft.com/office/drawing/2014/main" id="{13EBE1A3-05B8-4CBB-94EE-98EFCC3BCE00}"/>
-              </a:ext>
-            </a:extLst>
-          </p:cNvPr>
-          <p:cNvSpPr txBox="1"/>
-          <p:nvPr/>
-        </p:nvSpPr>
-        <p:spPr>
-          <a:xfrm>
-            <a:off x="8513878" y="2278600"/>
-            <a:ext cx="2201663" cy="923330"/>
-          </a:xfrm>
-          <a:prstGeom prst="rect">
-            <a:avLst/>
-          </a:prstGeom>
-          <a:noFill/>
-          <a:ln w="6350">
-            <a:solidFill>
-              <a:schemeClr val="tx1"/>
-            </a:solidFill>
-          </a:ln>
-        </p:spPr>
-        <p:txBody>
-          <a:bodyPr wrap="square" rtlCol="0">
-            <a:spAutoFit/>
-          </a:bodyPr>
-          <a:lstStyle/>
-          <a:p>
-            <a:r>
-              <a:rPr lang="es-ES" dirty="0"/>
-              <a:t>Total </a:t>
-            </a:r>
-            <a:r>
-              <a:rPr lang="es-ES" dirty="0" err="1"/>
-              <a:t>distance</a:t>
-            </a:r>
-            <a:endParaRPr lang="es-ES" dirty="0"/>
-          </a:p>
-          <a:p>
-            <a:r>
-              <a:rPr lang="es-ES" dirty="0" err="1"/>
-              <a:t>Uphill</a:t>
-            </a:r>
-            <a:r>
-              <a:rPr lang="es-ES" dirty="0"/>
-              <a:t> </a:t>
-            </a:r>
-            <a:r>
-              <a:rPr lang="es-ES" dirty="0" err="1"/>
-              <a:t>elevation</a:t>
-            </a:r>
-            <a:endParaRPr lang="es-ES" dirty="0"/>
-          </a:p>
-          <a:p>
-            <a:r>
-              <a:rPr lang="es-ES" dirty="0" err="1"/>
-              <a:t>Downhill</a:t>
-            </a:r>
-            <a:r>
-              <a:rPr lang="es-ES" dirty="0"/>
-              <a:t> </a:t>
-            </a:r>
-            <a:r>
-              <a:rPr lang="es-ES" dirty="0" err="1"/>
-              <a:t>elevation</a:t>
-            </a:r>
-            <a:endParaRPr lang="es-ES" dirty="0"/>
+              <a:t> file</a:t>
+            </a:r>
           </a:p>
         </p:txBody>
       </p:sp>
       <p:pic>
         <p:nvPicPr>
-          <p:cNvPr id="19" name="Picture 2" descr="Rendered Image">
-            <a:extLst>
-              <a:ext uri="{FF2B5EF4-FFF2-40B4-BE49-F238E27FC236}">
-                <a16:creationId xmlns:a16="http://schemas.microsoft.com/office/drawing/2014/main" id="{C873BD29-DB74-4368-82A1-D91AF8E68B7B}"/>
+          <p:cNvPr id="15" name="Picture 2" descr="Rendered Image">
+            <a:extLst>
+              <a:ext uri="{FF2B5EF4-FFF2-40B4-BE49-F238E27FC236}">
+                <a16:creationId xmlns:a16="http://schemas.microsoft.com/office/drawing/2014/main" id="{7B2E289B-43CF-4B37-97C5-425FBF055A8C}"/>
               </a:ext>
             </a:extLst>
           </p:cNvPr>
@@ -6803,7 +8023,7 @@
           <p:nvPr/>
         </p:nvPicPr>
         <p:blipFill>
-          <a:blip r:embed="rId4">
+          <a:blip r:embed="rId3">
             <a:extLst>
               <a:ext uri="{28A0092B-C50C-407E-A947-70E740481C1C}">
                 <a14:useLocalDpi xmlns:a14="http://schemas.microsoft.com/office/drawing/2010/main" val="0"/>
@@ -6817,8 +8037,8 @@
         </p:blipFill>
         <p:spPr bwMode="auto">
           <a:xfrm>
-            <a:off x="598240" y="5134504"/>
-            <a:ext cx="2019300" cy="1057275"/>
+            <a:off x="324331" y="5331161"/>
+            <a:ext cx="2181225" cy="809625"/>
           </a:xfrm>
           <a:prstGeom prst="rect">
             <a:avLst/>
@@ -6835,729 +8055,6 @@
           </a:extLst>
         </p:spPr>
       </p:pic>
-    </p:spTree>
-    <p:extLst>
-      <p:ext uri="{BB962C8B-B14F-4D97-AF65-F5344CB8AC3E}">
-        <p14:creationId xmlns:p14="http://schemas.microsoft.com/office/powerpoint/2010/main" val="3703521982"/>
-      </p:ext>
-    </p:extLst>
-  </p:cSld>
-  <p:clrMapOvr>
-    <a:masterClrMapping/>
-  </p:clrMapOvr>
-</p:sld>
-</file>
-
-<file path=ppt/slides/slide6.xml><?xml version="1.0" encoding="utf-8"?>
-<p:sld xmlns:a="http://schemas.openxmlformats.org/drawingml/2006/main" xmlns:r="http://schemas.openxmlformats.org/officeDocument/2006/relationships" xmlns:p="http://schemas.openxmlformats.org/presentationml/2006/main">
-  <p:cSld>
-    <p:spTree>
-      <p:nvGrpSpPr>
-        <p:cNvPr id="1" name=""/>
-        <p:cNvGrpSpPr/>
-        <p:nvPr/>
-      </p:nvGrpSpPr>
-      <p:grpSpPr>
-        <a:xfrm>
-          <a:off x="0" y="0"/>
-          <a:ext cx="0" cy="0"/>
-          <a:chOff x="0" y="0"/>
-          <a:chExt cx="0" cy="0"/>
-        </a:xfrm>
-      </p:grpSpPr>
-      <p:pic>
-        <p:nvPicPr>
-          <p:cNvPr id="5" name="Imagen 4">
-            <a:extLst>
-              <a:ext uri="{FF2B5EF4-FFF2-40B4-BE49-F238E27FC236}">
-                <a16:creationId xmlns:a16="http://schemas.microsoft.com/office/drawing/2014/main" id="{20B84089-D466-4D04-9783-CB6ADAAD6C96}"/>
-              </a:ext>
-            </a:extLst>
-          </p:cNvPr>
-          <p:cNvPicPr>
-            <a:picLocks noChangeAspect="1"/>
-          </p:cNvPicPr>
-          <p:nvPr/>
-        </p:nvPicPr>
-        <p:blipFill>
-          <a:blip r:embed="rId2"/>
-          <a:stretch>
-            <a:fillRect/>
-          </a:stretch>
-        </p:blipFill>
-        <p:spPr>
-          <a:xfrm>
-            <a:off x="3318057" y="1193683"/>
-            <a:ext cx="5087713" cy="3562875"/>
-          </a:xfrm>
-          <a:prstGeom prst="rect">
-            <a:avLst/>
-          </a:prstGeom>
-        </p:spPr>
-      </p:pic>
-      <p:sp>
-        <p:nvSpPr>
-          <p:cNvPr id="8" name="CuadroTexto 7">
-            <a:extLst>
-              <a:ext uri="{FF2B5EF4-FFF2-40B4-BE49-F238E27FC236}">
-                <a16:creationId xmlns:a16="http://schemas.microsoft.com/office/drawing/2014/main" id="{87D8C68F-3C3F-474E-B2E2-87E9ABCA7C2D}"/>
-              </a:ext>
-            </a:extLst>
-          </p:cNvPr>
-          <p:cNvSpPr txBox="1"/>
-          <p:nvPr/>
-        </p:nvSpPr>
-        <p:spPr>
-          <a:xfrm>
-            <a:off x="1325461" y="645952"/>
-            <a:ext cx="964734" cy="369332"/>
-          </a:xfrm>
-          <a:prstGeom prst="rect">
-            <a:avLst/>
-          </a:prstGeom>
-          <a:solidFill>
-            <a:schemeClr val="bg1">
-              <a:lumMod val="75000"/>
-            </a:schemeClr>
-          </a:solidFill>
-          <a:ln>
-            <a:solidFill>
-              <a:schemeClr val="tx1"/>
-            </a:solidFill>
-          </a:ln>
-        </p:spPr>
-        <p:txBody>
-          <a:bodyPr wrap="square" rtlCol="0">
-            <a:spAutoFit/>
-          </a:bodyPr>
-          <a:lstStyle/>
-          <a:p>
-            <a:r>
-              <a:rPr lang="es-ES" dirty="0"/>
-              <a:t>File</a:t>
-            </a:r>
-          </a:p>
-        </p:txBody>
-      </p:sp>
-      <p:sp>
-        <p:nvSpPr>
-          <p:cNvPr id="9" name="CuadroTexto 8">
-            <a:extLst>
-              <a:ext uri="{FF2B5EF4-FFF2-40B4-BE49-F238E27FC236}">
-                <a16:creationId xmlns:a16="http://schemas.microsoft.com/office/drawing/2014/main" id="{69B7775D-6619-47FA-95FC-2BFF98F90E33}"/>
-              </a:ext>
-            </a:extLst>
-          </p:cNvPr>
-          <p:cNvSpPr txBox="1"/>
-          <p:nvPr/>
-        </p:nvSpPr>
-        <p:spPr>
-          <a:xfrm>
-            <a:off x="1476461" y="1015284"/>
-            <a:ext cx="1325461" cy="307777"/>
-          </a:xfrm>
-          <a:prstGeom prst="rect">
-            <a:avLst/>
-          </a:prstGeom>
-          <a:solidFill>
-            <a:schemeClr val="bg1">
-              <a:lumMod val="75000"/>
-            </a:schemeClr>
-          </a:solidFill>
-          <a:ln>
-            <a:solidFill>
-              <a:schemeClr val="tx1"/>
-            </a:solidFill>
-          </a:ln>
-        </p:spPr>
-        <p:txBody>
-          <a:bodyPr wrap="square" rtlCol="0">
-            <a:spAutoFit/>
-          </a:bodyPr>
-          <a:lstStyle/>
-          <a:p>
-            <a:r>
-              <a:rPr lang="es-ES" sz="1400" dirty="0"/>
-              <a:t>Load </a:t>
-            </a:r>
-            <a:r>
-              <a:rPr lang="es-ES" sz="1400" dirty="0" err="1"/>
-              <a:t>track</a:t>
-            </a:r>
-            <a:endParaRPr lang="es-ES" sz="1400" dirty="0"/>
-          </a:p>
-        </p:txBody>
-      </p:sp>
-      <p:sp>
-        <p:nvSpPr>
-          <p:cNvPr id="10" name="CuadroTexto 9">
-            <a:extLst>
-              <a:ext uri="{FF2B5EF4-FFF2-40B4-BE49-F238E27FC236}">
-                <a16:creationId xmlns:a16="http://schemas.microsoft.com/office/drawing/2014/main" id="{E6B399B8-DA52-4C30-972E-53ADA9421924}"/>
-              </a:ext>
-            </a:extLst>
-          </p:cNvPr>
-          <p:cNvSpPr txBox="1"/>
-          <p:nvPr/>
-        </p:nvSpPr>
-        <p:spPr>
-          <a:xfrm>
-            <a:off x="1476460" y="1323061"/>
-            <a:ext cx="1325461" cy="307777"/>
-          </a:xfrm>
-          <a:prstGeom prst="rect">
-            <a:avLst/>
-          </a:prstGeom>
-          <a:solidFill>
-            <a:schemeClr val="bg1">
-              <a:lumMod val="75000"/>
-            </a:schemeClr>
-          </a:solidFill>
-          <a:ln>
-            <a:solidFill>
-              <a:schemeClr val="tx1"/>
-            </a:solidFill>
-          </a:ln>
-        </p:spPr>
-        <p:txBody>
-          <a:bodyPr wrap="square" rtlCol="0">
-            <a:spAutoFit/>
-          </a:bodyPr>
-          <a:lstStyle/>
-          <a:p>
-            <a:r>
-              <a:rPr lang="es-ES" sz="1400" dirty="0"/>
-              <a:t>Load </a:t>
-            </a:r>
-            <a:r>
-              <a:rPr lang="es-ES" sz="1400" dirty="0" err="1"/>
-              <a:t>session</a:t>
-            </a:r>
-            <a:endParaRPr lang="es-ES" sz="1400" dirty="0"/>
-          </a:p>
-        </p:txBody>
-      </p:sp>
-      <p:sp>
-        <p:nvSpPr>
-          <p:cNvPr id="11" name="CuadroTexto 10">
-            <a:extLst>
-              <a:ext uri="{FF2B5EF4-FFF2-40B4-BE49-F238E27FC236}">
-                <a16:creationId xmlns:a16="http://schemas.microsoft.com/office/drawing/2014/main" id="{D9B563DB-707C-4CD4-803E-C6573FDAE050}"/>
-              </a:ext>
-            </a:extLst>
-          </p:cNvPr>
-          <p:cNvSpPr txBox="1"/>
-          <p:nvPr/>
-        </p:nvSpPr>
-        <p:spPr>
-          <a:xfrm>
-            <a:off x="1476460" y="1615478"/>
-            <a:ext cx="1325461" cy="307777"/>
-          </a:xfrm>
-          <a:prstGeom prst="rect">
-            <a:avLst/>
-          </a:prstGeom>
-          <a:solidFill>
-            <a:schemeClr val="bg1">
-              <a:lumMod val="75000"/>
-            </a:schemeClr>
-          </a:solidFill>
-          <a:ln>
-            <a:solidFill>
-              <a:schemeClr val="tx1"/>
-            </a:solidFill>
-          </a:ln>
-        </p:spPr>
-        <p:txBody>
-          <a:bodyPr wrap="square" rtlCol="0">
-            <a:spAutoFit/>
-          </a:bodyPr>
-          <a:lstStyle/>
-          <a:p>
-            <a:r>
-              <a:rPr lang="es-ES" sz="1400" dirty="0"/>
-              <a:t>New </a:t>
-            </a:r>
-            <a:r>
-              <a:rPr lang="es-ES" sz="1400" dirty="0" err="1"/>
-              <a:t>session</a:t>
-            </a:r>
-            <a:endParaRPr lang="es-ES" sz="1400" dirty="0"/>
-          </a:p>
-        </p:txBody>
-      </p:sp>
-      <p:sp>
-        <p:nvSpPr>
-          <p:cNvPr id="12" name="CuadroTexto 11">
-            <a:extLst>
-              <a:ext uri="{FF2B5EF4-FFF2-40B4-BE49-F238E27FC236}">
-                <a16:creationId xmlns:a16="http://schemas.microsoft.com/office/drawing/2014/main" id="{33980FAD-8BDF-4D61-BA99-FBF4A8BD191D}"/>
-              </a:ext>
-            </a:extLst>
-          </p:cNvPr>
-          <p:cNvSpPr txBox="1"/>
-          <p:nvPr/>
-        </p:nvSpPr>
-        <p:spPr>
-          <a:xfrm>
-            <a:off x="1476460" y="1905363"/>
-            <a:ext cx="1325461" cy="307777"/>
-          </a:xfrm>
-          <a:prstGeom prst="rect">
-            <a:avLst/>
-          </a:prstGeom>
-          <a:solidFill>
-            <a:schemeClr val="bg1">
-              <a:lumMod val="75000"/>
-            </a:schemeClr>
-          </a:solidFill>
-          <a:ln>
-            <a:solidFill>
-              <a:schemeClr val="tx1"/>
-            </a:solidFill>
-          </a:ln>
-        </p:spPr>
-        <p:txBody>
-          <a:bodyPr wrap="square" rtlCol="0">
-            <a:spAutoFit/>
-          </a:bodyPr>
-          <a:lstStyle/>
-          <a:p>
-            <a:r>
-              <a:rPr lang="es-ES" sz="1400" dirty="0" err="1"/>
-              <a:t>Save</a:t>
-            </a:r>
-            <a:r>
-              <a:rPr lang="es-ES" sz="1400" dirty="0"/>
-              <a:t> </a:t>
-            </a:r>
-            <a:r>
-              <a:rPr lang="es-ES" sz="1400" dirty="0" err="1"/>
-              <a:t>session</a:t>
-            </a:r>
-            <a:endParaRPr lang="es-ES" sz="1400" dirty="0"/>
-          </a:p>
-        </p:txBody>
-      </p:sp>
-      <p:sp>
-        <p:nvSpPr>
-          <p:cNvPr id="13" name="CuadroTexto 12">
-            <a:extLst>
-              <a:ext uri="{FF2B5EF4-FFF2-40B4-BE49-F238E27FC236}">
-                <a16:creationId xmlns:a16="http://schemas.microsoft.com/office/drawing/2014/main" id="{785F6E4A-3AFF-444D-931D-D0FEA190FED5}"/>
-              </a:ext>
-            </a:extLst>
-          </p:cNvPr>
-          <p:cNvSpPr txBox="1"/>
-          <p:nvPr/>
-        </p:nvSpPr>
-        <p:spPr>
-          <a:xfrm>
-            <a:off x="1476459" y="2213140"/>
-            <a:ext cx="1325461" cy="307777"/>
-          </a:xfrm>
-          <a:prstGeom prst="rect">
-            <a:avLst/>
-          </a:prstGeom>
-          <a:solidFill>
-            <a:schemeClr val="bg1">
-              <a:lumMod val="75000"/>
-            </a:schemeClr>
-          </a:solidFill>
-          <a:ln>
-            <a:solidFill>
-              <a:schemeClr val="tx1"/>
-            </a:solidFill>
-          </a:ln>
-        </p:spPr>
-        <p:txBody>
-          <a:bodyPr wrap="square" rtlCol="0">
-            <a:spAutoFit/>
-          </a:bodyPr>
-          <a:lstStyle/>
-          <a:p>
-            <a:r>
-              <a:rPr lang="es-ES" sz="1400" dirty="0" err="1"/>
-              <a:t>Exit</a:t>
-            </a:r>
-            <a:endParaRPr lang="es-ES" sz="1400" dirty="0"/>
-          </a:p>
-        </p:txBody>
-      </p:sp>
-      <p:sp>
-        <p:nvSpPr>
-          <p:cNvPr id="14" name="CuadroTexto 13">
-            <a:extLst>
-              <a:ext uri="{FF2B5EF4-FFF2-40B4-BE49-F238E27FC236}">
-                <a16:creationId xmlns:a16="http://schemas.microsoft.com/office/drawing/2014/main" id="{141CAC72-0D93-49C6-8913-A7593E1C4044}"/>
-              </a:ext>
-            </a:extLst>
-          </p:cNvPr>
-          <p:cNvSpPr txBox="1"/>
-          <p:nvPr/>
-        </p:nvSpPr>
-        <p:spPr>
-          <a:xfrm>
-            <a:off x="8854294" y="105013"/>
-            <a:ext cx="3087149" cy="1938992"/>
-          </a:xfrm>
-          <a:prstGeom prst="rect">
-            <a:avLst/>
-          </a:prstGeom>
-          <a:noFill/>
-        </p:spPr>
-        <p:txBody>
-          <a:bodyPr wrap="square" rtlCol="0">
-            <a:spAutoFit/>
-          </a:bodyPr>
-          <a:lstStyle/>
-          <a:p>
-            <a:r>
-              <a:rPr lang="es-ES" dirty="0"/>
-              <a:t>Notes:</a:t>
-            </a:r>
-          </a:p>
-          <a:p>
-            <a:pPr marL="285750" indent="-285750">
-              <a:buFontTx/>
-              <a:buChar char="-"/>
-            </a:pPr>
-            <a:r>
-              <a:rPr lang="es-ES" dirty="0"/>
-              <a:t>V00.05</a:t>
-            </a:r>
-          </a:p>
-          <a:p>
-            <a:pPr marL="285750" indent="-285750">
-              <a:buFontTx/>
-              <a:buChar char="-"/>
-            </a:pPr>
-            <a:r>
-              <a:rPr lang="es-ES" sz="1400" dirty="0" err="1"/>
-              <a:t>When</a:t>
-            </a:r>
-            <a:r>
-              <a:rPr lang="es-ES" sz="1400" dirty="0"/>
-              <a:t> </a:t>
-            </a:r>
-            <a:r>
-              <a:rPr lang="es-ES" sz="1400" dirty="0" err="1"/>
-              <a:t>selecting</a:t>
-            </a:r>
-            <a:r>
-              <a:rPr lang="es-ES" sz="1400" dirty="0"/>
-              <a:t> a line in </a:t>
-            </a:r>
-            <a:r>
-              <a:rPr lang="es-ES" sz="1400" dirty="0" err="1"/>
-              <a:t>the</a:t>
-            </a:r>
-            <a:r>
-              <a:rPr lang="es-ES" sz="1400" dirty="0"/>
-              <a:t> </a:t>
-            </a:r>
-            <a:r>
-              <a:rPr lang="es-ES" sz="1400" dirty="0" err="1"/>
-              <a:t>plot</a:t>
-            </a:r>
-            <a:r>
-              <a:rPr lang="es-ES" sz="1400" dirty="0"/>
-              <a:t>: </a:t>
-            </a:r>
-          </a:p>
-          <a:p>
-            <a:pPr marL="742950" lvl="1" indent="-285750">
-              <a:buFontTx/>
-              <a:buChar char="-"/>
-            </a:pPr>
-            <a:r>
-              <a:rPr lang="es-ES" sz="1400" dirty="0"/>
-              <a:t> </a:t>
-            </a:r>
-            <a:r>
-              <a:rPr lang="es-ES" sz="1400" dirty="0" err="1"/>
-              <a:t>its</a:t>
-            </a:r>
-            <a:r>
-              <a:rPr lang="es-ES" sz="1400" dirty="0"/>
-              <a:t> </a:t>
-            </a:r>
-            <a:r>
-              <a:rPr lang="es-ES" sz="1400" dirty="0" err="1"/>
-              <a:t>thickness</a:t>
-            </a:r>
-            <a:r>
-              <a:rPr lang="es-ES" sz="1400" dirty="0"/>
-              <a:t> </a:t>
-            </a:r>
-            <a:r>
-              <a:rPr lang="es-ES" sz="1400" dirty="0" err="1"/>
-              <a:t>is</a:t>
-            </a:r>
-            <a:r>
-              <a:rPr lang="es-ES" sz="1400" dirty="0"/>
-              <a:t> </a:t>
-            </a:r>
-            <a:r>
-              <a:rPr lang="es-ES" sz="1400" dirty="0" err="1"/>
-              <a:t>increased</a:t>
-            </a:r>
-            <a:endParaRPr lang="es-ES" sz="1400" dirty="0"/>
-          </a:p>
-          <a:p>
-            <a:pPr marL="742950" lvl="1" indent="-285750">
-              <a:buFontTx/>
-              <a:buChar char="-"/>
-            </a:pPr>
-            <a:r>
-              <a:rPr lang="es-ES" sz="1400" dirty="0" err="1"/>
-              <a:t>Elevation</a:t>
-            </a:r>
-            <a:r>
-              <a:rPr lang="es-ES" sz="1400" dirty="0"/>
-              <a:t> </a:t>
-            </a:r>
-            <a:r>
-              <a:rPr lang="es-ES" sz="1400" dirty="0" err="1"/>
-              <a:t>of</a:t>
-            </a:r>
-            <a:r>
-              <a:rPr lang="es-ES" sz="1400" dirty="0"/>
-              <a:t> </a:t>
-            </a:r>
-            <a:r>
-              <a:rPr lang="es-ES" sz="1400" dirty="0" err="1"/>
-              <a:t>that</a:t>
-            </a:r>
-            <a:r>
-              <a:rPr lang="es-ES" sz="1400" dirty="0"/>
-              <a:t> </a:t>
-            </a:r>
-            <a:r>
-              <a:rPr lang="es-ES" sz="1400" dirty="0" err="1"/>
-              <a:t>segment</a:t>
-            </a:r>
-            <a:r>
-              <a:rPr lang="es-ES" sz="1400" dirty="0"/>
-              <a:t> </a:t>
-            </a:r>
-            <a:r>
-              <a:rPr lang="es-ES" sz="1400" dirty="0" err="1"/>
-              <a:t>is</a:t>
-            </a:r>
-            <a:r>
-              <a:rPr lang="es-ES" sz="1400" dirty="0"/>
-              <a:t> </a:t>
-            </a:r>
-            <a:r>
-              <a:rPr lang="es-ES" sz="1400" dirty="0" err="1"/>
-              <a:t>displayd</a:t>
-            </a:r>
-            <a:endParaRPr lang="es-ES" sz="1400" dirty="0"/>
-          </a:p>
-          <a:p>
-            <a:pPr marL="742950" lvl="1" indent="-285750">
-              <a:buFontTx/>
-              <a:buChar char="-"/>
-            </a:pPr>
-            <a:r>
-              <a:rPr lang="es-ES" sz="1400" dirty="0" err="1"/>
-              <a:t>Information</a:t>
-            </a:r>
-            <a:r>
-              <a:rPr lang="es-ES" sz="1400" dirty="0"/>
-              <a:t> table </a:t>
-            </a:r>
-            <a:r>
-              <a:rPr lang="es-ES" sz="1400" dirty="0" err="1"/>
-              <a:t>for</a:t>
-            </a:r>
-            <a:r>
-              <a:rPr lang="es-ES" sz="1400" dirty="0"/>
-              <a:t> </a:t>
-            </a:r>
-            <a:r>
-              <a:rPr lang="es-ES" sz="1400" dirty="0" err="1"/>
-              <a:t>that</a:t>
-            </a:r>
-            <a:r>
-              <a:rPr lang="es-ES" sz="1400" dirty="0"/>
-              <a:t> single </a:t>
-            </a:r>
-            <a:r>
-              <a:rPr lang="es-ES" sz="1400" dirty="0" err="1"/>
-              <a:t>segment</a:t>
-            </a:r>
-            <a:r>
-              <a:rPr lang="es-ES" sz="1400" dirty="0"/>
-              <a:t> in </a:t>
-            </a:r>
-            <a:r>
-              <a:rPr lang="es-ES" sz="1400" dirty="0" err="1"/>
-              <a:t>bold</a:t>
-            </a:r>
-            <a:endParaRPr lang="es-ES" sz="1400" dirty="0"/>
-          </a:p>
-        </p:txBody>
-      </p:sp>
-      <p:grpSp>
-        <p:nvGrpSpPr>
-          <p:cNvPr id="18" name="Grupo 17">
-            <a:extLst>
-              <a:ext uri="{FF2B5EF4-FFF2-40B4-BE49-F238E27FC236}">
-                <a16:creationId xmlns:a16="http://schemas.microsoft.com/office/drawing/2014/main" id="{CE082FDB-5094-4F0F-8661-7B8640501D0A}"/>
-              </a:ext>
-            </a:extLst>
-          </p:cNvPr>
-          <p:cNvGrpSpPr/>
-          <p:nvPr/>
-        </p:nvGrpSpPr>
-        <p:grpSpPr>
-          <a:xfrm>
-            <a:off x="7945770" y="3897247"/>
-            <a:ext cx="267052" cy="615554"/>
-            <a:chOff x="8851781" y="2520917"/>
-            <a:chExt cx="267052" cy="615554"/>
-          </a:xfrm>
-        </p:grpSpPr>
-        <p:sp>
-          <p:nvSpPr>
-            <p:cNvPr id="16" name="CuadroTexto 15">
-              <a:extLst>
-                <a:ext uri="{FF2B5EF4-FFF2-40B4-BE49-F238E27FC236}">
-                  <a16:creationId xmlns:a16="http://schemas.microsoft.com/office/drawing/2014/main" id="{19713EAB-5261-4665-91F7-2DFD19C8A273}"/>
-                </a:ext>
-              </a:extLst>
-            </p:cNvPr>
-            <p:cNvSpPr txBox="1"/>
-            <p:nvPr/>
-          </p:nvSpPr>
-          <p:spPr>
-            <a:xfrm>
-              <a:off x="8851782" y="2520917"/>
-              <a:ext cx="267051" cy="307777"/>
-            </a:xfrm>
-            <a:prstGeom prst="rect">
-              <a:avLst/>
-            </a:prstGeom>
-            <a:solidFill>
-              <a:schemeClr val="bg1">
-                <a:lumMod val="85000"/>
-              </a:schemeClr>
-            </a:solidFill>
-            <a:ln>
-              <a:solidFill>
-                <a:schemeClr val="tx1"/>
-              </a:solidFill>
-            </a:ln>
-          </p:spPr>
-          <p:txBody>
-            <a:bodyPr wrap="square" rtlCol="0">
-              <a:spAutoFit/>
-            </a:bodyPr>
-            <a:lstStyle/>
-            <a:p>
-              <a:pPr algn="ctr"/>
-              <a:r>
-                <a:rPr lang="es-ES" sz="1400" dirty="0"/>
-                <a:t>+</a:t>
-              </a:r>
-            </a:p>
-          </p:txBody>
-        </p:sp>
-        <p:sp>
-          <p:nvSpPr>
-            <p:cNvPr id="17" name="CuadroTexto 16">
-              <a:extLst>
-                <a:ext uri="{FF2B5EF4-FFF2-40B4-BE49-F238E27FC236}">
-                  <a16:creationId xmlns:a16="http://schemas.microsoft.com/office/drawing/2014/main" id="{F98C1302-45BF-449D-BD36-6743087E2F05}"/>
-                </a:ext>
-              </a:extLst>
-            </p:cNvPr>
-            <p:cNvSpPr txBox="1"/>
-            <p:nvPr/>
-          </p:nvSpPr>
-          <p:spPr>
-            <a:xfrm>
-              <a:off x="8851781" y="2828694"/>
-              <a:ext cx="267051" cy="307777"/>
-            </a:xfrm>
-            <a:prstGeom prst="rect">
-              <a:avLst/>
-            </a:prstGeom>
-            <a:solidFill>
-              <a:schemeClr val="bg1">
-                <a:lumMod val="85000"/>
-              </a:schemeClr>
-            </a:solidFill>
-            <a:ln>
-              <a:solidFill>
-                <a:schemeClr val="tx1"/>
-              </a:solidFill>
-            </a:ln>
-          </p:spPr>
-          <p:txBody>
-            <a:bodyPr wrap="square" rtlCol="0">
-              <a:spAutoFit/>
-            </a:bodyPr>
-            <a:lstStyle/>
-            <a:p>
-              <a:pPr algn="ctr"/>
-              <a:r>
-                <a:rPr lang="es-ES" sz="1400" dirty="0"/>
-                <a:t>-</a:t>
-              </a:r>
-            </a:p>
-          </p:txBody>
-        </p:sp>
-      </p:grpSp>
-      <p:pic>
-        <p:nvPicPr>
-          <p:cNvPr id="15" name="Picture 2" descr="Rendered Image">
-            <a:extLst>
-              <a:ext uri="{FF2B5EF4-FFF2-40B4-BE49-F238E27FC236}">
-                <a16:creationId xmlns:a16="http://schemas.microsoft.com/office/drawing/2014/main" id="{7B2E289B-43CF-4B37-97C5-425FBF055A8C}"/>
-              </a:ext>
-            </a:extLst>
-          </p:cNvPr>
-          <p:cNvPicPr>
-            <a:picLocks noChangeAspect="1" noChangeArrowheads="1"/>
-          </p:cNvPicPr>
-          <p:nvPr/>
-        </p:nvPicPr>
-        <p:blipFill>
-          <a:blip r:embed="rId3">
-            <a:extLst>
-              <a:ext uri="{28A0092B-C50C-407E-A947-70E740481C1C}">
-                <a14:useLocalDpi xmlns:a14="http://schemas.microsoft.com/office/drawing/2010/main" val="0"/>
-              </a:ext>
-            </a:extLst>
-          </a:blip>
-          <a:srcRect/>
-          <a:stretch>
-            <a:fillRect/>
-          </a:stretch>
-        </p:blipFill>
-        <p:spPr bwMode="auto">
-          <a:xfrm>
-            <a:off x="324331" y="5331161"/>
-            <a:ext cx="2181225" cy="809625"/>
-          </a:xfrm>
-          <a:prstGeom prst="rect">
-            <a:avLst/>
-          </a:prstGeom>
-          <a:noFill/>
-          <a:extLst>
-            <a:ext uri="{909E8E84-426E-40DD-AFC4-6F175D3DCCD1}">
-              <a14:hiddenFill xmlns:a14="http://schemas.microsoft.com/office/drawing/2010/main">
-                <a:solidFill>
-                  <a:srgbClr val="FFFFFF"/>
-                </a:solidFill>
-              </a14:hiddenFill>
-            </a:ext>
-          </a:extLst>
-        </p:spPr>
-      </p:pic>
       <p:sp>
         <p:nvSpPr>
           <p:cNvPr id="2" name="CuadroTexto 1">
@@ -7630,52 +8127,6 @@
               <a:t>elevation</a:t>
             </a:r>
             <a:endParaRPr lang="es-ES" dirty="0"/>
-          </a:p>
-        </p:txBody>
-      </p:sp>
-      <p:sp>
-        <p:nvSpPr>
-          <p:cNvPr id="19" name="Flecha: hacia abajo 18">
-            <a:extLst>
-              <a:ext uri="{FF2B5EF4-FFF2-40B4-BE49-F238E27FC236}">
-                <a16:creationId xmlns:a16="http://schemas.microsoft.com/office/drawing/2014/main" id="{615D0BC7-ADE7-459C-B1BC-0D694DC7D9AE}"/>
-              </a:ext>
-            </a:extLst>
-          </p:cNvPr>
-          <p:cNvSpPr/>
-          <p:nvPr/>
-        </p:nvSpPr>
-        <p:spPr>
-          <a:xfrm rot="8514297">
-            <a:off x="10249956" y="3049430"/>
-            <a:ext cx="195309" cy="1695635"/>
-          </a:xfrm>
-          <a:prstGeom prst="downArrow">
-            <a:avLst/>
-          </a:prstGeom>
-        </p:spPr>
-        <p:style>
-          <a:lnRef idx="2">
-            <a:schemeClr val="accent1">
-              <a:shade val="50000"/>
-            </a:schemeClr>
-          </a:lnRef>
-          <a:fillRef idx="1">
-            <a:schemeClr val="accent1"/>
-          </a:fillRef>
-          <a:effectRef idx="0">
-            <a:schemeClr val="accent1"/>
-          </a:effectRef>
-          <a:fontRef idx="minor">
-            <a:schemeClr val="lt1"/>
-          </a:fontRef>
-        </p:style>
-        <p:txBody>
-          <a:bodyPr rtlCol="0" anchor="ctr"/>
-          <a:lstStyle/>
-          <a:p>
-            <a:pPr algn="ctr"/>
-            <a:endParaRPr lang="es-ES"/>
           </a:p>
         </p:txBody>
       </p:sp>
@@ -7762,54 +8213,53 @@
       </p:pic>
       <p:sp>
         <p:nvSpPr>
-          <p:cNvPr id="3" name="Flecha: hacia abajo 2">
-            <a:extLst>
-              <a:ext uri="{FF2B5EF4-FFF2-40B4-BE49-F238E27FC236}">
-                <a16:creationId xmlns:a16="http://schemas.microsoft.com/office/drawing/2014/main" id="{71DE474A-0DE1-4B69-9232-D9BC8AF88DB1}"/>
-              </a:ext>
-            </a:extLst>
-          </p:cNvPr>
-          <p:cNvSpPr/>
-          <p:nvPr/>
-        </p:nvSpPr>
-        <p:spPr>
-          <a:xfrm rot="3380404">
-            <a:off x="8824250" y="4189566"/>
-            <a:ext cx="195309" cy="1695635"/>
-          </a:xfrm>
-          <a:prstGeom prst="downArrow">
-            <a:avLst/>
-          </a:prstGeom>
-        </p:spPr>
-        <p:style>
-          <a:lnRef idx="2">
-            <a:schemeClr val="accent1">
-              <a:shade val="50000"/>
+          <p:cNvPr id="20" name="CuadroTexto 19">
+            <a:extLst>
+              <a:ext uri="{FF2B5EF4-FFF2-40B4-BE49-F238E27FC236}">
+                <a16:creationId xmlns:a16="http://schemas.microsoft.com/office/drawing/2014/main" id="{0469235D-51B2-4129-A70E-95B5F8B9F6AE}"/>
+              </a:ext>
+            </a:extLst>
+          </p:cNvPr>
+          <p:cNvSpPr txBox="1"/>
+          <p:nvPr/>
+        </p:nvSpPr>
+        <p:spPr>
+          <a:xfrm>
+            <a:off x="1476459" y="2520916"/>
+            <a:ext cx="1325461" cy="307777"/>
+          </a:xfrm>
+          <a:prstGeom prst="rect">
+            <a:avLst/>
+          </a:prstGeom>
+          <a:solidFill>
+            <a:schemeClr val="bg1">
+              <a:lumMod val="75000"/>
             </a:schemeClr>
-          </a:lnRef>
-          <a:fillRef idx="1">
-            <a:schemeClr val="accent1"/>
-          </a:fillRef>
-          <a:effectRef idx="0">
-            <a:schemeClr val="accent1"/>
-          </a:effectRef>
-          <a:fontRef idx="minor">
-            <a:schemeClr val="lt1"/>
-          </a:fontRef>
-        </p:style>
-        <p:txBody>
-          <a:bodyPr rtlCol="0" anchor="ctr"/>
-          <a:lstStyle/>
-          <a:p>
-            <a:pPr algn="ctr"/>
-            <a:endParaRPr lang="es-ES"/>
+          </a:solidFill>
+          <a:ln>
+            <a:solidFill>
+              <a:schemeClr val="tx1"/>
+            </a:solidFill>
+          </a:ln>
+        </p:spPr>
+        <p:txBody>
+          <a:bodyPr wrap="square" rtlCol="0">
+            <a:spAutoFit/>
+          </a:bodyPr>
+          <a:lstStyle/>
+          <a:p>
+            <a:r>
+              <a:rPr lang="es-ES" sz="1400" dirty="0" err="1"/>
+              <a:t>Exit</a:t>
+            </a:r>
+            <a:endParaRPr lang="es-ES" sz="1400" dirty="0"/>
           </a:p>
         </p:txBody>
       </p:sp>
     </p:spTree>
     <p:extLst>
       <p:ext uri="{BB962C8B-B14F-4D97-AF65-F5344CB8AC3E}">
-        <p14:creationId xmlns:p14="http://schemas.microsoft.com/office/powerpoint/2010/main" val="1142972357"/>
+        <p14:creationId xmlns:p14="http://schemas.microsoft.com/office/powerpoint/2010/main" val="4255573760"/>
       </p:ext>
     </p:extLst>
   </p:cSld>
@@ -7819,7 +8269,7 @@
 </p:sld>
 </file>
 
-<file path=ppt/slides/slide7.xml><?xml version="1.0" encoding="utf-8"?>
+<file path=ppt/slides/slide8.xml><?xml version="1.0" encoding="utf-8"?>
 <p:sld xmlns:a="http://schemas.openxmlformats.org/drawingml/2006/main" xmlns:r="http://schemas.openxmlformats.org/officeDocument/2006/relationships" xmlns:p="http://schemas.openxmlformats.org/presentationml/2006/main">
   <p:cSld>
     <p:spTree>
@@ -7911,7 +8361,7 @@
         <p:spPr>
           <a:xfrm>
             <a:off x="8783273" y="234892"/>
-            <a:ext cx="3087149" cy="2308324"/>
+            <a:ext cx="3087149" cy="2862322"/>
           </a:xfrm>
           <a:prstGeom prst="rect">
             <a:avLst/>
@@ -7936,7 +8386,7 @@
             </a:pPr>
             <a:r>
               <a:rPr lang="es-ES" dirty="0"/>
-              <a:t>V00.06</a:t>
+              <a:t>V00.07</a:t>
             </a:r>
           </a:p>
           <a:p>
@@ -7952,7 +8402,50 @@
               <a:rPr lang="es-ES" dirty="0" err="1"/>
               <a:t>management</a:t>
             </a:r>
-            <a:endParaRPr lang="es-ES" dirty="0"/>
+            <a:r>
+              <a:rPr lang="es-ES" dirty="0"/>
+              <a:t> (+/- </a:t>
+            </a:r>
+            <a:r>
+              <a:rPr lang="es-ES" dirty="0" err="1"/>
+              <a:t>buttons</a:t>
+            </a:r>
+            <a:r>
+              <a:rPr lang="es-ES" dirty="0"/>
+              <a:t> </a:t>
+            </a:r>
+            <a:r>
+              <a:rPr lang="es-ES" dirty="0" err="1"/>
+              <a:t>or</a:t>
+            </a:r>
+            <a:r>
+              <a:rPr lang="es-ES" dirty="0"/>
+              <a:t> </a:t>
+            </a:r>
+            <a:r>
+              <a:rPr lang="es-ES" b="1" dirty="0" err="1"/>
+              <a:t>scroll_event</a:t>
+            </a:r>
+            <a:r>
+              <a:rPr lang="es-ES" b="1" dirty="0"/>
+              <a:t> </a:t>
+            </a:r>
+            <a:r>
+              <a:rPr lang="es-ES" b="1" dirty="0" err="1"/>
+              <a:t>matplotlib</a:t>
+            </a:r>
+            <a:r>
+              <a:rPr lang="es-ES" b="1" dirty="0"/>
+              <a:t> </a:t>
+            </a:r>
+            <a:r>
+              <a:rPr lang="es-ES" b="1" dirty="0" err="1"/>
+              <a:t>connection</a:t>
+            </a:r>
+            <a:r>
+              <a:rPr lang="es-ES" dirty="0"/>
+              <a:t>)</a:t>
+            </a:r>
           </a:p>
           <a:p>
             <a:pPr marL="285750" indent="-285750">
@@ -8451,7 +8944,7 @@
         </p:nvSpPr>
         <p:spPr>
           <a:xfrm>
-            <a:off x="1476459" y="2213140"/>
+            <a:off x="1476460" y="2514965"/>
             <a:ext cx="1325461" cy="307777"/>
           </a:xfrm>
           <a:prstGeom prst="rect">
@@ -8482,72 +8975,12 @@
           </a:p>
         </p:txBody>
       </p:sp>
-    </p:spTree>
-    <p:extLst>
-      <p:ext uri="{BB962C8B-B14F-4D97-AF65-F5344CB8AC3E}">
-        <p14:creationId xmlns:p14="http://schemas.microsoft.com/office/powerpoint/2010/main" val="2520566424"/>
-      </p:ext>
-    </p:extLst>
-  </p:cSld>
-  <p:clrMapOvr>
-    <a:masterClrMapping/>
-  </p:clrMapOvr>
-</p:sld>
-</file>
-
-<file path=ppt/slides/slide8.xml><?xml version="1.0" encoding="utf-8"?>
-<p:sld xmlns:a="http://schemas.openxmlformats.org/drawingml/2006/main" xmlns:r="http://schemas.openxmlformats.org/officeDocument/2006/relationships" xmlns:p="http://schemas.openxmlformats.org/presentationml/2006/main">
-  <p:cSld>
-    <p:spTree>
-      <p:nvGrpSpPr>
-        <p:cNvPr id="1" name=""/>
-        <p:cNvGrpSpPr/>
-        <p:nvPr/>
-      </p:nvGrpSpPr>
-      <p:grpSpPr>
-        <a:xfrm>
-          <a:off x="0" y="0"/>
-          <a:ext cx="0" cy="0"/>
-          <a:chOff x="0" y="0"/>
-          <a:chExt cx="0" cy="0"/>
-        </a:xfrm>
-      </p:grpSpPr>
-      <p:pic>
-        <p:nvPicPr>
-          <p:cNvPr id="5" name="Imagen 4">
-            <a:extLst>
-              <a:ext uri="{FF2B5EF4-FFF2-40B4-BE49-F238E27FC236}">
-                <a16:creationId xmlns:a16="http://schemas.microsoft.com/office/drawing/2014/main" id="{20B84089-D466-4D04-9783-CB6ADAAD6C96}"/>
-              </a:ext>
-            </a:extLst>
-          </p:cNvPr>
-          <p:cNvPicPr>
-            <a:picLocks noChangeAspect="1"/>
-          </p:cNvPicPr>
-          <p:nvPr/>
-        </p:nvPicPr>
-        <p:blipFill>
-          <a:blip r:embed="rId2"/>
-          <a:stretch>
-            <a:fillRect/>
-          </a:stretch>
-        </p:blipFill>
-        <p:spPr>
-          <a:xfrm>
-            <a:off x="3318057" y="1193683"/>
-            <a:ext cx="5087713" cy="3562875"/>
-          </a:xfrm>
-          <a:prstGeom prst="rect">
-            <a:avLst/>
-          </a:prstGeom>
-        </p:spPr>
-      </p:pic>
-      <p:sp>
-        <p:nvSpPr>
-          <p:cNvPr id="8" name="CuadroTexto 7">
-            <a:extLst>
-              <a:ext uri="{FF2B5EF4-FFF2-40B4-BE49-F238E27FC236}">
-                <a16:creationId xmlns:a16="http://schemas.microsoft.com/office/drawing/2014/main" id="{87D8C68F-3C3F-474E-B2E2-87E9ABCA7C2D}"/>
+      <p:sp>
+        <p:nvSpPr>
+          <p:cNvPr id="22" name="CuadroTexto 21">
+            <a:extLst>
+              <a:ext uri="{FF2B5EF4-FFF2-40B4-BE49-F238E27FC236}">
+                <a16:creationId xmlns:a16="http://schemas.microsoft.com/office/drawing/2014/main" id="{87ABCC56-8420-4948-BDAF-3D9434B20F6A}"/>
               </a:ext>
             </a:extLst>
           </p:cNvPr>
@@ -8556,8 +8989,8 @@
         </p:nvSpPr>
         <p:spPr>
           <a:xfrm>
-            <a:off x="1325461" y="645952"/>
-            <a:ext cx="964734" cy="369332"/>
+            <a:off x="1476460" y="2207188"/>
+            <a:ext cx="1325461" cy="307777"/>
           </a:xfrm>
           <a:prstGeom prst="rect">
             <a:avLst/>
@@ -8580,197 +9013,6 @@
           <a:lstStyle/>
           <a:p>
             <a:r>
-              <a:rPr lang="es-ES" dirty="0"/>
-              <a:t>File</a:t>
-            </a:r>
-          </a:p>
-        </p:txBody>
-      </p:sp>
-      <p:sp>
-        <p:nvSpPr>
-          <p:cNvPr id="9" name="CuadroTexto 8">
-            <a:extLst>
-              <a:ext uri="{FF2B5EF4-FFF2-40B4-BE49-F238E27FC236}">
-                <a16:creationId xmlns:a16="http://schemas.microsoft.com/office/drawing/2014/main" id="{69B7775D-6619-47FA-95FC-2BFF98F90E33}"/>
-              </a:ext>
-            </a:extLst>
-          </p:cNvPr>
-          <p:cNvSpPr txBox="1"/>
-          <p:nvPr/>
-        </p:nvSpPr>
-        <p:spPr>
-          <a:xfrm>
-            <a:off x="1476461" y="1015284"/>
-            <a:ext cx="1325461" cy="307777"/>
-          </a:xfrm>
-          <a:prstGeom prst="rect">
-            <a:avLst/>
-          </a:prstGeom>
-          <a:solidFill>
-            <a:schemeClr val="bg1">
-              <a:lumMod val="75000"/>
-            </a:schemeClr>
-          </a:solidFill>
-          <a:ln>
-            <a:solidFill>
-              <a:schemeClr val="tx1"/>
-            </a:solidFill>
-          </a:ln>
-        </p:spPr>
-        <p:txBody>
-          <a:bodyPr wrap="square" rtlCol="0">
-            <a:spAutoFit/>
-          </a:bodyPr>
-          <a:lstStyle/>
-          <a:p>
-            <a:r>
-              <a:rPr lang="es-ES" sz="1400" dirty="0"/>
-              <a:t>Load </a:t>
-            </a:r>
-            <a:r>
-              <a:rPr lang="es-ES" sz="1400" dirty="0" err="1"/>
-              <a:t>track</a:t>
-            </a:r>
-            <a:endParaRPr lang="es-ES" sz="1400" dirty="0"/>
-          </a:p>
-        </p:txBody>
-      </p:sp>
-      <p:sp>
-        <p:nvSpPr>
-          <p:cNvPr id="10" name="CuadroTexto 9">
-            <a:extLst>
-              <a:ext uri="{FF2B5EF4-FFF2-40B4-BE49-F238E27FC236}">
-                <a16:creationId xmlns:a16="http://schemas.microsoft.com/office/drawing/2014/main" id="{E6B399B8-DA52-4C30-972E-53ADA9421924}"/>
-              </a:ext>
-            </a:extLst>
-          </p:cNvPr>
-          <p:cNvSpPr txBox="1"/>
-          <p:nvPr/>
-        </p:nvSpPr>
-        <p:spPr>
-          <a:xfrm>
-            <a:off x="1476460" y="1323061"/>
-            <a:ext cx="1325461" cy="307777"/>
-          </a:xfrm>
-          <a:prstGeom prst="rect">
-            <a:avLst/>
-          </a:prstGeom>
-          <a:solidFill>
-            <a:schemeClr val="bg1">
-              <a:lumMod val="75000"/>
-            </a:schemeClr>
-          </a:solidFill>
-          <a:ln>
-            <a:solidFill>
-              <a:schemeClr val="tx1"/>
-            </a:solidFill>
-          </a:ln>
-        </p:spPr>
-        <p:txBody>
-          <a:bodyPr wrap="square" rtlCol="0">
-            <a:spAutoFit/>
-          </a:bodyPr>
-          <a:lstStyle/>
-          <a:p>
-            <a:r>
-              <a:rPr lang="es-ES" sz="1400" dirty="0"/>
-              <a:t>Load </a:t>
-            </a:r>
-            <a:r>
-              <a:rPr lang="es-ES" sz="1400" dirty="0" err="1"/>
-              <a:t>session</a:t>
-            </a:r>
-            <a:endParaRPr lang="es-ES" sz="1400" dirty="0"/>
-          </a:p>
-        </p:txBody>
-      </p:sp>
-      <p:sp>
-        <p:nvSpPr>
-          <p:cNvPr id="11" name="CuadroTexto 10">
-            <a:extLst>
-              <a:ext uri="{FF2B5EF4-FFF2-40B4-BE49-F238E27FC236}">
-                <a16:creationId xmlns:a16="http://schemas.microsoft.com/office/drawing/2014/main" id="{D9B563DB-707C-4CD4-803E-C6573FDAE050}"/>
-              </a:ext>
-            </a:extLst>
-          </p:cNvPr>
-          <p:cNvSpPr txBox="1"/>
-          <p:nvPr/>
-        </p:nvSpPr>
-        <p:spPr>
-          <a:xfrm>
-            <a:off x="1476460" y="1615478"/>
-            <a:ext cx="1325461" cy="307777"/>
-          </a:xfrm>
-          <a:prstGeom prst="rect">
-            <a:avLst/>
-          </a:prstGeom>
-          <a:solidFill>
-            <a:schemeClr val="bg1">
-              <a:lumMod val="75000"/>
-            </a:schemeClr>
-          </a:solidFill>
-          <a:ln>
-            <a:solidFill>
-              <a:schemeClr val="tx1"/>
-            </a:solidFill>
-          </a:ln>
-        </p:spPr>
-        <p:txBody>
-          <a:bodyPr wrap="square" rtlCol="0">
-            <a:spAutoFit/>
-          </a:bodyPr>
-          <a:lstStyle/>
-          <a:p>
-            <a:r>
-              <a:rPr lang="es-ES" sz="1400" dirty="0"/>
-              <a:t>New </a:t>
-            </a:r>
-            <a:r>
-              <a:rPr lang="es-ES" sz="1400" dirty="0" err="1"/>
-              <a:t>session</a:t>
-            </a:r>
-            <a:endParaRPr lang="es-ES" sz="1400" dirty="0"/>
-          </a:p>
-        </p:txBody>
-      </p:sp>
-      <p:sp>
-        <p:nvSpPr>
-          <p:cNvPr id="12" name="CuadroTexto 11">
-            <a:extLst>
-              <a:ext uri="{FF2B5EF4-FFF2-40B4-BE49-F238E27FC236}">
-                <a16:creationId xmlns:a16="http://schemas.microsoft.com/office/drawing/2014/main" id="{33980FAD-8BDF-4D61-BA99-FBF4A8BD191D}"/>
-              </a:ext>
-            </a:extLst>
-          </p:cNvPr>
-          <p:cNvSpPr txBox="1"/>
-          <p:nvPr/>
-        </p:nvSpPr>
-        <p:spPr>
-          <a:xfrm>
-            <a:off x="1476460" y="1905363"/>
-            <a:ext cx="1325461" cy="307777"/>
-          </a:xfrm>
-          <a:prstGeom prst="rect">
-            <a:avLst/>
-          </a:prstGeom>
-          <a:solidFill>
-            <a:schemeClr val="bg1">
-              <a:lumMod val="75000"/>
-            </a:schemeClr>
-          </a:solidFill>
-          <a:ln>
-            <a:solidFill>
-              <a:schemeClr val="tx1"/>
-            </a:solidFill>
-          </a:ln>
-        </p:spPr>
-        <p:txBody>
-          <a:bodyPr wrap="square" rtlCol="0">
-            <a:spAutoFit/>
-          </a:bodyPr>
-          <a:lstStyle/>
-          <a:p>
-            <a:r>
               <a:rPr lang="es-ES" sz="1400" dirty="0" err="1"/>
               <a:t>Save</a:t>
             </a:r>
@@ -8780,486 +9022,7 @@
             </a:r>
             <a:r>
               <a:rPr lang="es-ES" sz="1400" dirty="0" err="1"/>
-              <a:t>session</a:t>
-            </a:r>
-            <a:endParaRPr lang="es-ES" sz="1400" dirty="0"/>
-          </a:p>
-        </p:txBody>
-      </p:sp>
-      <p:sp>
-        <p:nvSpPr>
-          <p:cNvPr id="13" name="CuadroTexto 12">
-            <a:extLst>
-              <a:ext uri="{FF2B5EF4-FFF2-40B4-BE49-F238E27FC236}">
-                <a16:creationId xmlns:a16="http://schemas.microsoft.com/office/drawing/2014/main" id="{785F6E4A-3AFF-444D-931D-D0FEA190FED5}"/>
-              </a:ext>
-            </a:extLst>
-          </p:cNvPr>
-          <p:cNvSpPr txBox="1"/>
-          <p:nvPr/>
-        </p:nvSpPr>
-        <p:spPr>
-          <a:xfrm>
-            <a:off x="1476459" y="2213140"/>
-            <a:ext cx="1325461" cy="307777"/>
-          </a:xfrm>
-          <a:prstGeom prst="rect">
-            <a:avLst/>
-          </a:prstGeom>
-          <a:solidFill>
-            <a:schemeClr val="bg1">
-              <a:lumMod val="75000"/>
-            </a:schemeClr>
-          </a:solidFill>
-          <a:ln>
-            <a:solidFill>
-              <a:schemeClr val="tx1"/>
-            </a:solidFill>
-          </a:ln>
-        </p:spPr>
-        <p:txBody>
-          <a:bodyPr wrap="square" rtlCol="0">
-            <a:spAutoFit/>
-          </a:bodyPr>
-          <a:lstStyle/>
-          <a:p>
-            <a:r>
-              <a:rPr lang="es-ES" sz="1400" dirty="0" err="1"/>
-              <a:t>Save</a:t>
-            </a:r>
-            <a:r>
-              <a:rPr lang="es-ES" sz="1400" dirty="0"/>
-              <a:t> </a:t>
-            </a:r>
-            <a:r>
-              <a:rPr lang="es-ES" sz="1400" dirty="0" err="1"/>
               <a:t>gpx</a:t>
-            </a:r>
-            <a:endParaRPr lang="es-ES" sz="1400" dirty="0"/>
-          </a:p>
-        </p:txBody>
-      </p:sp>
-      <p:sp>
-        <p:nvSpPr>
-          <p:cNvPr id="14" name="CuadroTexto 13">
-            <a:extLst>
-              <a:ext uri="{FF2B5EF4-FFF2-40B4-BE49-F238E27FC236}">
-                <a16:creationId xmlns:a16="http://schemas.microsoft.com/office/drawing/2014/main" id="{141CAC72-0D93-49C6-8913-A7593E1C4044}"/>
-              </a:ext>
-            </a:extLst>
-          </p:cNvPr>
-          <p:cNvSpPr txBox="1"/>
-          <p:nvPr/>
-        </p:nvSpPr>
-        <p:spPr>
-          <a:xfrm>
-            <a:off x="8854294" y="105013"/>
-            <a:ext cx="3087149" cy="923330"/>
-          </a:xfrm>
-          <a:prstGeom prst="rect">
-            <a:avLst/>
-          </a:prstGeom>
-          <a:noFill/>
-        </p:spPr>
-        <p:txBody>
-          <a:bodyPr wrap="square" rtlCol="0">
-            <a:spAutoFit/>
-          </a:bodyPr>
-          <a:lstStyle/>
-          <a:p>
-            <a:r>
-              <a:rPr lang="es-ES" dirty="0"/>
-              <a:t>Notes:</a:t>
-            </a:r>
-          </a:p>
-          <a:p>
-            <a:pPr marL="285750" indent="-285750">
-              <a:buFontTx/>
-              <a:buChar char="-"/>
-            </a:pPr>
-            <a:r>
-              <a:rPr lang="es-ES" dirty="0"/>
-              <a:t>V00.07</a:t>
-            </a:r>
-          </a:p>
-          <a:p>
-            <a:pPr marL="285750" indent="-285750">
-              <a:buFontTx/>
-              <a:buChar char="-"/>
-            </a:pPr>
-            <a:r>
-              <a:rPr lang="es-ES" dirty="0" err="1"/>
-              <a:t>Save</a:t>
-            </a:r>
-            <a:r>
-              <a:rPr lang="es-ES" dirty="0"/>
-              <a:t> </a:t>
-            </a:r>
-            <a:r>
-              <a:rPr lang="es-ES" dirty="0" err="1"/>
-              <a:t>gpx</a:t>
-            </a:r>
-            <a:r>
-              <a:rPr lang="es-ES" dirty="0"/>
-              <a:t> file</a:t>
-            </a:r>
-          </a:p>
-        </p:txBody>
-      </p:sp>
-      <p:grpSp>
-        <p:nvGrpSpPr>
-          <p:cNvPr id="18" name="Grupo 17">
-            <a:extLst>
-              <a:ext uri="{FF2B5EF4-FFF2-40B4-BE49-F238E27FC236}">
-                <a16:creationId xmlns:a16="http://schemas.microsoft.com/office/drawing/2014/main" id="{CE082FDB-5094-4F0F-8661-7B8640501D0A}"/>
-              </a:ext>
-            </a:extLst>
-          </p:cNvPr>
-          <p:cNvGrpSpPr/>
-          <p:nvPr/>
-        </p:nvGrpSpPr>
-        <p:grpSpPr>
-          <a:xfrm>
-            <a:off x="7945770" y="3897247"/>
-            <a:ext cx="267052" cy="615554"/>
-            <a:chOff x="8851781" y="2520917"/>
-            <a:chExt cx="267052" cy="615554"/>
-          </a:xfrm>
-        </p:grpSpPr>
-        <p:sp>
-          <p:nvSpPr>
-            <p:cNvPr id="16" name="CuadroTexto 15">
-              <a:extLst>
-                <a:ext uri="{FF2B5EF4-FFF2-40B4-BE49-F238E27FC236}">
-                  <a16:creationId xmlns:a16="http://schemas.microsoft.com/office/drawing/2014/main" id="{19713EAB-5261-4665-91F7-2DFD19C8A273}"/>
-                </a:ext>
-              </a:extLst>
-            </p:cNvPr>
-            <p:cNvSpPr txBox="1"/>
-            <p:nvPr/>
-          </p:nvSpPr>
-          <p:spPr>
-            <a:xfrm>
-              <a:off x="8851782" y="2520917"/>
-              <a:ext cx="267051" cy="307777"/>
-            </a:xfrm>
-            <a:prstGeom prst="rect">
-              <a:avLst/>
-            </a:prstGeom>
-            <a:solidFill>
-              <a:schemeClr val="bg1">
-                <a:lumMod val="85000"/>
-              </a:schemeClr>
-            </a:solidFill>
-            <a:ln>
-              <a:solidFill>
-                <a:schemeClr val="tx1"/>
-              </a:solidFill>
-            </a:ln>
-          </p:spPr>
-          <p:txBody>
-            <a:bodyPr wrap="square" rtlCol="0">
-              <a:spAutoFit/>
-            </a:bodyPr>
-            <a:lstStyle/>
-            <a:p>
-              <a:pPr algn="ctr"/>
-              <a:r>
-                <a:rPr lang="es-ES" sz="1400" dirty="0"/>
-                <a:t>+</a:t>
-              </a:r>
-            </a:p>
-          </p:txBody>
-        </p:sp>
-        <p:sp>
-          <p:nvSpPr>
-            <p:cNvPr id="17" name="CuadroTexto 16">
-              <a:extLst>
-                <a:ext uri="{FF2B5EF4-FFF2-40B4-BE49-F238E27FC236}">
-                  <a16:creationId xmlns:a16="http://schemas.microsoft.com/office/drawing/2014/main" id="{F98C1302-45BF-449D-BD36-6743087E2F05}"/>
-                </a:ext>
-              </a:extLst>
-            </p:cNvPr>
-            <p:cNvSpPr txBox="1"/>
-            <p:nvPr/>
-          </p:nvSpPr>
-          <p:spPr>
-            <a:xfrm>
-              <a:off x="8851781" y="2828694"/>
-              <a:ext cx="267051" cy="307777"/>
-            </a:xfrm>
-            <a:prstGeom prst="rect">
-              <a:avLst/>
-            </a:prstGeom>
-            <a:solidFill>
-              <a:schemeClr val="bg1">
-                <a:lumMod val="85000"/>
-              </a:schemeClr>
-            </a:solidFill>
-            <a:ln>
-              <a:solidFill>
-                <a:schemeClr val="tx1"/>
-              </a:solidFill>
-            </a:ln>
-          </p:spPr>
-          <p:txBody>
-            <a:bodyPr wrap="square" rtlCol="0">
-              <a:spAutoFit/>
-            </a:bodyPr>
-            <a:lstStyle/>
-            <a:p>
-              <a:pPr algn="ctr"/>
-              <a:r>
-                <a:rPr lang="es-ES" sz="1400" dirty="0"/>
-                <a:t>-</a:t>
-              </a:r>
-            </a:p>
-          </p:txBody>
-        </p:sp>
-      </p:grpSp>
-      <p:pic>
-        <p:nvPicPr>
-          <p:cNvPr id="15" name="Picture 2" descr="Rendered Image">
-            <a:extLst>
-              <a:ext uri="{FF2B5EF4-FFF2-40B4-BE49-F238E27FC236}">
-                <a16:creationId xmlns:a16="http://schemas.microsoft.com/office/drawing/2014/main" id="{7B2E289B-43CF-4B37-97C5-425FBF055A8C}"/>
-              </a:ext>
-            </a:extLst>
-          </p:cNvPr>
-          <p:cNvPicPr>
-            <a:picLocks noChangeAspect="1" noChangeArrowheads="1"/>
-          </p:cNvPicPr>
-          <p:nvPr/>
-        </p:nvPicPr>
-        <p:blipFill>
-          <a:blip r:embed="rId3">
-            <a:extLst>
-              <a:ext uri="{28A0092B-C50C-407E-A947-70E740481C1C}">
-                <a14:useLocalDpi xmlns:a14="http://schemas.microsoft.com/office/drawing/2010/main" val="0"/>
-              </a:ext>
-            </a:extLst>
-          </a:blip>
-          <a:srcRect/>
-          <a:stretch>
-            <a:fillRect/>
-          </a:stretch>
-        </p:blipFill>
-        <p:spPr bwMode="auto">
-          <a:xfrm>
-            <a:off x="324331" y="5331161"/>
-            <a:ext cx="2181225" cy="809625"/>
-          </a:xfrm>
-          <a:prstGeom prst="rect">
-            <a:avLst/>
-          </a:prstGeom>
-          <a:noFill/>
-          <a:extLst>
-            <a:ext uri="{909E8E84-426E-40DD-AFC4-6F175D3DCCD1}">
-              <a14:hiddenFill xmlns:a14="http://schemas.microsoft.com/office/drawing/2010/main">
-                <a:solidFill>
-                  <a:srgbClr val="FFFFFF"/>
-                </a:solidFill>
-              </a14:hiddenFill>
-            </a:ext>
-          </a:extLst>
-        </p:spPr>
-      </p:pic>
-      <p:sp>
-        <p:nvSpPr>
-          <p:cNvPr id="2" name="CuadroTexto 1">
-            <a:extLst>
-              <a:ext uri="{FF2B5EF4-FFF2-40B4-BE49-F238E27FC236}">
-                <a16:creationId xmlns:a16="http://schemas.microsoft.com/office/drawing/2014/main" id="{13EBE1A3-05B8-4CBB-94EE-98EFCC3BCE00}"/>
-              </a:ext>
-            </a:extLst>
-          </p:cNvPr>
-          <p:cNvSpPr txBox="1"/>
-          <p:nvPr/>
-        </p:nvSpPr>
-        <p:spPr>
-          <a:xfrm>
-            <a:off x="8646850" y="2213140"/>
-            <a:ext cx="2201663" cy="923330"/>
-          </a:xfrm>
-          <a:prstGeom prst="rect">
-            <a:avLst/>
-          </a:prstGeom>
-          <a:noFill/>
-          <a:ln w="6350">
-            <a:solidFill>
-              <a:schemeClr val="tx1"/>
-            </a:solidFill>
-          </a:ln>
-        </p:spPr>
-        <p:txBody>
-          <a:bodyPr wrap="square" rtlCol="0">
-            <a:spAutoFit/>
-          </a:bodyPr>
-          <a:lstStyle/>
-          <a:p>
-            <a:r>
-              <a:rPr lang="es-ES" dirty="0"/>
-              <a:t>Total </a:t>
-            </a:r>
-            <a:r>
-              <a:rPr lang="es-ES" dirty="0" err="1"/>
-              <a:t>distance</a:t>
-            </a:r>
-            <a:endParaRPr lang="es-ES" dirty="0"/>
-          </a:p>
-          <a:p>
-            <a:r>
-              <a:rPr lang="es-ES" dirty="0" err="1"/>
-              <a:t>Uphill</a:t>
-            </a:r>
-            <a:r>
-              <a:rPr lang="es-ES" dirty="0"/>
-              <a:t> </a:t>
-            </a:r>
-            <a:r>
-              <a:rPr lang="es-ES" dirty="0" err="1"/>
-              <a:t>elevation</a:t>
-            </a:r>
-            <a:endParaRPr lang="es-ES" dirty="0"/>
-          </a:p>
-          <a:p>
-            <a:r>
-              <a:rPr lang="es-ES" dirty="0" err="1"/>
-              <a:t>Downhill</a:t>
-            </a:r>
-            <a:r>
-              <a:rPr lang="es-ES" dirty="0"/>
-              <a:t> </a:t>
-            </a:r>
-            <a:r>
-              <a:rPr lang="es-ES" dirty="0" err="1"/>
-              <a:t>elevation</a:t>
-            </a:r>
-            <a:endParaRPr lang="es-ES" dirty="0"/>
-          </a:p>
-        </p:txBody>
-      </p:sp>
-      <mc:AlternateContent xmlns:mc="http://schemas.openxmlformats.org/markup-compatibility/2006" xmlns:p14="http://schemas.microsoft.com/office/powerpoint/2010/main">
-        <mc:Choice Requires="p14">
-          <p:contentPart p14:bwMode="auto" r:id="rId4">
-            <p14:nvContentPartPr>
-              <p14:cNvPr id="22" name="Entrada de lápiz 21">
-                <a:extLst>
-                  <a:ext uri="{FF2B5EF4-FFF2-40B4-BE49-F238E27FC236}">
-                    <a16:creationId xmlns:a16="http://schemas.microsoft.com/office/drawing/2014/main" id="{5A236FC7-AB2F-44E3-821D-76E45DE63B8A}"/>
-                  </a:ext>
-                </a:extLst>
-              </p14:cNvPr>
-              <p14:cNvContentPartPr/>
-              <p14:nvPr/>
-            </p14:nvContentPartPr>
-            <p14:xfrm>
-              <a:off x="5063755" y="3342260"/>
-              <a:ext cx="537120" cy="443160"/>
-            </p14:xfrm>
-          </p:contentPart>
-        </mc:Choice>
-        <mc:Fallback xmlns="">
-          <p:pic>
-            <p:nvPicPr>
-              <p:cNvPr id="22" name="Entrada de lápiz 21">
-                <a:extLst>
-                  <a:ext uri="{FF2B5EF4-FFF2-40B4-BE49-F238E27FC236}">
-                    <a16:creationId xmlns:a16="http://schemas.microsoft.com/office/drawing/2014/main" id="{5A236FC7-AB2F-44E3-821D-76E45DE63B8A}"/>
-                  </a:ext>
-                </a:extLst>
-              </p:cNvPr>
-              <p:cNvPicPr/>
-              <p:nvPr/>
-            </p:nvPicPr>
-            <p:blipFill>
-              <a:blip r:embed="rId5"/>
-              <a:stretch>
-                <a:fillRect/>
-              </a:stretch>
-            </p:blipFill>
-            <p:spPr>
-              <a:xfrm>
-                <a:off x="5046115" y="3324620"/>
-                <a:ext cx="572760" cy="478800"/>
-              </a:xfrm>
-              <a:prstGeom prst="rect">
-                <a:avLst/>
-              </a:prstGeom>
-            </p:spPr>
-          </p:pic>
-        </mc:Fallback>
-      </mc:AlternateContent>
-      <p:pic>
-        <p:nvPicPr>
-          <p:cNvPr id="28" name="Imagen 27">
-            <a:extLst>
-              <a:ext uri="{FF2B5EF4-FFF2-40B4-BE49-F238E27FC236}">
-                <a16:creationId xmlns:a16="http://schemas.microsoft.com/office/drawing/2014/main" id="{291D2744-3EC0-4703-85C3-FFDDCAC12C9E}"/>
-              </a:ext>
-            </a:extLst>
-          </p:cNvPr>
-          <p:cNvPicPr>
-            <a:picLocks noChangeAspect="1"/>
-          </p:cNvPicPr>
-          <p:nvPr/>
-        </p:nvPicPr>
-        <p:blipFill>
-          <a:blip r:embed="rId6"/>
-          <a:stretch>
-            <a:fillRect/>
-          </a:stretch>
-        </p:blipFill>
-        <p:spPr>
-          <a:xfrm>
-            <a:off x="3263684" y="4799866"/>
-            <a:ext cx="5142086" cy="1770919"/>
-          </a:xfrm>
-          <a:prstGeom prst="rect">
-            <a:avLst/>
-          </a:prstGeom>
-        </p:spPr>
-      </p:pic>
-      <p:sp>
-        <p:nvSpPr>
-          <p:cNvPr id="20" name="CuadroTexto 19">
-            <a:extLst>
-              <a:ext uri="{FF2B5EF4-FFF2-40B4-BE49-F238E27FC236}">
-                <a16:creationId xmlns:a16="http://schemas.microsoft.com/office/drawing/2014/main" id="{0469235D-51B2-4129-A70E-95B5F8B9F6AE}"/>
-              </a:ext>
-            </a:extLst>
-          </p:cNvPr>
-          <p:cNvSpPr txBox="1"/>
-          <p:nvPr/>
-        </p:nvSpPr>
-        <p:spPr>
-          <a:xfrm>
-            <a:off x="1476459" y="2520916"/>
-            <a:ext cx="1325461" cy="307777"/>
-          </a:xfrm>
-          <a:prstGeom prst="rect">
-            <a:avLst/>
-          </a:prstGeom>
-          <a:solidFill>
-            <a:schemeClr val="bg1">
-              <a:lumMod val="75000"/>
-            </a:schemeClr>
-          </a:solidFill>
-          <a:ln>
-            <a:solidFill>
-              <a:schemeClr val="tx1"/>
-            </a:solidFill>
-          </a:ln>
-        </p:spPr>
-        <p:txBody>
-          <a:bodyPr wrap="square" rtlCol="0">
-            <a:spAutoFit/>
-          </a:bodyPr>
-          <a:lstStyle/>
-          <a:p>
-            <a:r>
-              <a:rPr lang="es-ES" sz="1400" dirty="0" err="1"/>
-              <a:t>Exit</a:t>
             </a:r>
             <a:endParaRPr lang="es-ES" sz="1400" dirty="0"/>
           </a:p>
@@ -9268,7 +9031,7 @@
     </p:spTree>
     <p:extLst>
       <p:ext uri="{BB962C8B-B14F-4D97-AF65-F5344CB8AC3E}">
-        <p14:creationId xmlns:p14="http://schemas.microsoft.com/office/powerpoint/2010/main" val="4255573760"/>
+        <p14:creationId xmlns:p14="http://schemas.microsoft.com/office/powerpoint/2010/main" val="2520566424"/>
       </p:ext>
     </p:extLst>
   </p:cSld>

</xml_diff>

<commit_message>
Map display modifications - Square maps, given by number of tiles - auto_zoom has been moved to plots.py - iosm can download by coordinates or tile boxes - plot_world is a 2x2 tail-square with zoom=1 - debug prints are not removed, this is not a release candidate commit
</commit_message>
<xml_diff>
--- a/gui_design.pptx
+++ b/gui_design.pptx
@@ -323,7 +323,7 @@
           <a:p>
             <a:fld id="{B3E02414-0C21-4CC3-871B-2D6AD27EF3B6}" type="datetimeFigureOut">
               <a:rPr lang="es-ES" smtClean="0"/>
-              <a:t>09/06/2020</a:t>
+              <a:t>11/06/2020</a:t>
             </a:fld>
             <a:endParaRPr lang="es-ES"/>
           </a:p>
@@ -521,7 +521,7 @@
           <a:p>
             <a:fld id="{B3E02414-0C21-4CC3-871B-2D6AD27EF3B6}" type="datetimeFigureOut">
               <a:rPr lang="es-ES" smtClean="0"/>
-              <a:t>09/06/2020</a:t>
+              <a:t>11/06/2020</a:t>
             </a:fld>
             <a:endParaRPr lang="es-ES"/>
           </a:p>
@@ -729,7 +729,7 @@
           <a:p>
             <a:fld id="{B3E02414-0C21-4CC3-871B-2D6AD27EF3B6}" type="datetimeFigureOut">
               <a:rPr lang="es-ES" smtClean="0"/>
-              <a:t>09/06/2020</a:t>
+              <a:t>11/06/2020</a:t>
             </a:fld>
             <a:endParaRPr lang="es-ES"/>
           </a:p>
@@ -927,7 +927,7 @@
           <a:p>
             <a:fld id="{B3E02414-0C21-4CC3-871B-2D6AD27EF3B6}" type="datetimeFigureOut">
               <a:rPr lang="es-ES" smtClean="0"/>
-              <a:t>09/06/2020</a:t>
+              <a:t>11/06/2020</a:t>
             </a:fld>
             <a:endParaRPr lang="es-ES"/>
           </a:p>
@@ -1202,7 +1202,7 @@
           <a:p>
             <a:fld id="{B3E02414-0C21-4CC3-871B-2D6AD27EF3B6}" type="datetimeFigureOut">
               <a:rPr lang="es-ES" smtClean="0"/>
-              <a:t>09/06/2020</a:t>
+              <a:t>11/06/2020</a:t>
             </a:fld>
             <a:endParaRPr lang="es-ES"/>
           </a:p>
@@ -1467,7 +1467,7 @@
           <a:p>
             <a:fld id="{B3E02414-0C21-4CC3-871B-2D6AD27EF3B6}" type="datetimeFigureOut">
               <a:rPr lang="es-ES" smtClean="0"/>
-              <a:t>09/06/2020</a:t>
+              <a:t>11/06/2020</a:t>
             </a:fld>
             <a:endParaRPr lang="es-ES"/>
           </a:p>
@@ -1879,7 +1879,7 @@
           <a:p>
             <a:fld id="{B3E02414-0C21-4CC3-871B-2D6AD27EF3B6}" type="datetimeFigureOut">
               <a:rPr lang="es-ES" smtClean="0"/>
-              <a:t>09/06/2020</a:t>
+              <a:t>11/06/2020</a:t>
             </a:fld>
             <a:endParaRPr lang="es-ES"/>
           </a:p>
@@ -2020,7 +2020,7 @@
           <a:p>
             <a:fld id="{B3E02414-0C21-4CC3-871B-2D6AD27EF3B6}" type="datetimeFigureOut">
               <a:rPr lang="es-ES" smtClean="0"/>
-              <a:t>09/06/2020</a:t>
+              <a:t>11/06/2020</a:t>
             </a:fld>
             <a:endParaRPr lang="es-ES"/>
           </a:p>
@@ -2133,7 +2133,7 @@
           <a:p>
             <a:fld id="{B3E02414-0C21-4CC3-871B-2D6AD27EF3B6}" type="datetimeFigureOut">
               <a:rPr lang="es-ES" smtClean="0"/>
-              <a:t>09/06/2020</a:t>
+              <a:t>11/06/2020</a:t>
             </a:fld>
             <a:endParaRPr lang="es-ES"/>
           </a:p>
@@ -2444,7 +2444,7 @@
           <a:p>
             <a:fld id="{B3E02414-0C21-4CC3-871B-2D6AD27EF3B6}" type="datetimeFigureOut">
               <a:rPr lang="es-ES" smtClean="0"/>
-              <a:t>09/06/2020</a:t>
+              <a:t>11/06/2020</a:t>
             </a:fld>
             <a:endParaRPr lang="es-ES"/>
           </a:p>
@@ -2732,7 +2732,7 @@
           <a:p>
             <a:fld id="{B3E02414-0C21-4CC3-871B-2D6AD27EF3B6}" type="datetimeFigureOut">
               <a:rPr lang="es-ES" smtClean="0"/>
-              <a:t>09/06/2020</a:t>
+              <a:t>11/06/2020</a:t>
             </a:fld>
             <a:endParaRPr lang="es-ES"/>
           </a:p>
@@ -2973,7 +2973,7 @@
           <a:p>
             <a:fld id="{B3E02414-0C21-4CC3-871B-2D6AD27EF3B6}" type="datetimeFigureOut">
               <a:rPr lang="es-ES" smtClean="0"/>
-              <a:t>09/06/2020</a:t>
+              <a:t>11/06/2020</a:t>
             </a:fld>
             <a:endParaRPr lang="es-ES"/>
           </a:p>
@@ -4805,9 +4805,21 @@
               <a:t>: </a:t>
             </a:r>
             <a:r>
-              <a:rPr lang="en-US" altLang="en-US" sz="1400" dirty="0"/>
+              <a:rPr lang="en-US" altLang="en-US" sz="1400" dirty="0">
+                <a:hlinkClick r:id="rId4"/>
+              </a:rPr>
               <a:t>https://stackoverflow.com/questions/17466561/best-way-to-structure-a-tk-application</a:t>
             </a:r>
+            <a:endParaRPr lang="en-US" altLang="en-US" sz="1400" dirty="0"/>
+          </a:p>
+          <a:p>
+            <a:r>
+              <a:rPr lang="en-US" sz="1400">
+                <a:hlinkClick r:id="rId5"/>
+              </a:rPr>
+              <a:t>https://www.oreilly.com/content/5-reasons-you-need-to-learn-to-write-python-decorators/</a:t>
+            </a:r>
+            <a:endParaRPr lang="en-US" altLang="en-US" sz="1400" dirty="0"/>
           </a:p>
           <a:p>
             <a:pPr marL="0" indent="0">
@@ -8360,8 +8372,8 @@
         </p:nvSpPr>
         <p:spPr>
           <a:xfrm>
-            <a:off x="8783273" y="234892"/>
-            <a:ext cx="3087149" cy="2862322"/>
+            <a:off x="8548645" y="234892"/>
+            <a:ext cx="3556669" cy="3600986"/>
           </a:xfrm>
           <a:prstGeom prst="rect">
             <a:avLst/>
@@ -8395,55 +8407,55 @@
               <a:buChar char="-"/>
             </a:pPr>
             <a:r>
-              <a:rPr lang="es-ES" dirty="0"/>
+              <a:rPr lang="es-ES" sz="1600" dirty="0"/>
               <a:t>Zoom </a:t>
             </a:r>
             <a:r>
-              <a:rPr lang="es-ES" dirty="0" err="1"/>
+              <a:rPr lang="es-ES" sz="1600" dirty="0" err="1"/>
               <a:t>management</a:t>
             </a:r>
             <a:r>
-              <a:rPr lang="es-ES" dirty="0"/>
+              <a:rPr lang="es-ES" sz="1600" dirty="0"/>
               <a:t> (+/- </a:t>
             </a:r>
             <a:r>
-              <a:rPr lang="es-ES" dirty="0" err="1"/>
+              <a:rPr lang="es-ES" sz="1600" dirty="0" err="1"/>
               <a:t>buttons</a:t>
             </a:r>
             <a:r>
-              <a:rPr lang="es-ES" dirty="0"/>
+              <a:rPr lang="es-ES" sz="1600" dirty="0"/>
               <a:t> </a:t>
             </a:r>
             <a:r>
-              <a:rPr lang="es-ES" dirty="0" err="1"/>
+              <a:rPr lang="es-ES" sz="1600" dirty="0" err="1"/>
               <a:t>or</a:t>
             </a:r>
             <a:r>
-              <a:rPr lang="es-ES" dirty="0"/>
+              <a:rPr lang="es-ES" sz="1600" dirty="0"/>
               <a:t> </a:t>
             </a:r>
             <a:r>
-              <a:rPr lang="es-ES" b="1" dirty="0" err="1"/>
+              <a:rPr lang="es-ES" sz="1600" b="1" dirty="0" err="1"/>
               <a:t>scroll_event</a:t>
             </a:r>
             <a:r>
-              <a:rPr lang="es-ES" b="1" dirty="0"/>
+              <a:rPr lang="es-ES" sz="1600" b="1" dirty="0"/>
               <a:t> </a:t>
             </a:r>
             <a:r>
-              <a:rPr lang="es-ES" b="1" dirty="0" err="1"/>
+              <a:rPr lang="es-ES" sz="1600" b="1" dirty="0" err="1"/>
               <a:t>matplotlib</a:t>
             </a:r>
             <a:r>
-              <a:rPr lang="es-ES" b="1" dirty="0"/>
+              <a:rPr lang="es-ES" sz="1600" b="1" dirty="0"/>
               <a:t> </a:t>
             </a:r>
             <a:r>
-              <a:rPr lang="es-ES" b="1" dirty="0" err="1"/>
+              <a:rPr lang="es-ES" sz="1600" b="1" dirty="0" err="1"/>
               <a:t>connection</a:t>
             </a:r>
             <a:r>
-              <a:rPr lang="es-ES" dirty="0"/>
+              <a:rPr lang="es-ES" sz="1600" dirty="0"/>
               <a:t>)</a:t>
             </a:r>
           </a:p>
@@ -8453,18 +8465,18 @@
               <a:buChar char="-"/>
             </a:pPr>
             <a:r>
-              <a:rPr lang="es-ES" dirty="0" err="1"/>
+              <a:rPr lang="es-ES" sz="1600" dirty="0" err="1"/>
               <a:t>Matplotlib</a:t>
             </a:r>
             <a:r>
-              <a:rPr lang="es-ES" dirty="0"/>
+              <a:rPr lang="es-ES" sz="1600" dirty="0"/>
               <a:t> bar </a:t>
             </a:r>
             <a:r>
-              <a:rPr lang="en-US" dirty="0"/>
+              <a:rPr lang="en-US" sz="1600" dirty="0"/>
               <a:t>✔</a:t>
             </a:r>
-            <a:endParaRPr lang="es-ES" dirty="0"/>
+            <a:endParaRPr lang="es-ES" sz="1600" dirty="0"/>
           </a:p>
           <a:p>
             <a:pPr marL="285750" indent="-285750">
@@ -8472,21 +8484,26 @@
               <a:buChar char="-"/>
             </a:pPr>
             <a:r>
-              <a:rPr lang="es-ES" dirty="0" err="1"/>
+              <a:rPr lang="es-ES" sz="1600" dirty="0" err="1"/>
               <a:t>Fixed</a:t>
             </a:r>
             <a:r>
-              <a:rPr lang="es-ES" dirty="0"/>
+              <a:rPr lang="es-ES" sz="1600" dirty="0"/>
               <a:t> </a:t>
             </a:r>
             <a:r>
-              <a:rPr lang="es-ES" dirty="0" err="1"/>
+              <a:rPr lang="es-ES" sz="1600" dirty="0" err="1"/>
               <a:t>aspect</a:t>
             </a:r>
             <a:r>
-              <a:rPr lang="es-ES" dirty="0"/>
-              <a:t> ratio</a:t>
-            </a:r>
+              <a:rPr lang="es-ES" sz="1600" dirty="0"/>
+              <a:t> ratio </a:t>
+            </a:r>
+            <a:r>
+              <a:rPr lang="en-US" sz="1600" dirty="0"/>
+              <a:t>✔</a:t>
+            </a:r>
+            <a:endParaRPr lang="es-ES" sz="1600" dirty="0"/>
           </a:p>
           <a:p>
             <a:pPr marL="285750" indent="-285750">
@@ -8494,37 +8511,202 @@
               <a:buChar char="-"/>
             </a:pPr>
             <a:r>
-              <a:rPr lang="es-ES" dirty="0" err="1"/>
+              <a:rPr lang="es-ES" sz="1600" dirty="0" err="1"/>
               <a:t>Add</a:t>
             </a:r>
             <a:r>
-              <a:rPr lang="es-ES" dirty="0"/>
+              <a:rPr lang="es-ES" sz="1600" dirty="0"/>
               <a:t> extra tiles </a:t>
             </a:r>
             <a:r>
-              <a:rPr lang="es-ES" dirty="0" err="1"/>
+              <a:rPr lang="es-ES" sz="1600" dirty="0" err="1"/>
               <a:t>to</a:t>
             </a:r>
             <a:r>
-              <a:rPr lang="es-ES" dirty="0"/>
+              <a:rPr lang="es-ES" sz="1600" dirty="0"/>
               <a:t> </a:t>
             </a:r>
             <a:r>
-              <a:rPr lang="es-ES" dirty="0" err="1"/>
+              <a:rPr lang="es-ES" sz="1600" dirty="0" err="1"/>
               <a:t>allow</a:t>
             </a:r>
             <a:r>
-              <a:rPr lang="es-ES" dirty="0"/>
+              <a:rPr lang="es-ES" sz="1600" dirty="0"/>
               <a:t> </a:t>
             </a:r>
             <a:r>
-              <a:rPr lang="es-ES" dirty="0" err="1"/>
+              <a:rPr lang="es-ES" sz="1600" dirty="0" err="1"/>
               <a:t>exploration</a:t>
             </a:r>
-            <a:endParaRPr lang="es-ES" dirty="0"/>
-          </a:p>
-          <a:p>
-            <a:endParaRPr lang="es-ES" dirty="0"/>
+            <a:r>
+              <a:rPr lang="es-ES" sz="1600" dirty="0"/>
+              <a:t> (</a:t>
+            </a:r>
+            <a:r>
+              <a:rPr lang="es-ES" sz="1600" dirty="0" err="1"/>
+              <a:t>or</a:t>
+            </a:r>
+            <a:r>
+              <a:rPr lang="es-ES" sz="1600" dirty="0"/>
+              <a:t> a </a:t>
+            </a:r>
+            <a:r>
+              <a:rPr lang="es-ES" sz="1600" dirty="0" err="1"/>
+              <a:t>exploration</a:t>
+            </a:r>
+            <a:r>
+              <a:rPr lang="es-ES" sz="1600" dirty="0"/>
+              <a:t> </a:t>
+            </a:r>
+            <a:r>
+              <a:rPr lang="es-ES" sz="1600" dirty="0" err="1"/>
+              <a:t>mode</a:t>
+            </a:r>
+            <a:r>
+              <a:rPr lang="es-ES" sz="1600" dirty="0"/>
+              <a:t> </a:t>
+            </a:r>
+            <a:r>
+              <a:rPr lang="es-ES" sz="1600" dirty="0" err="1"/>
+              <a:t>with</a:t>
+            </a:r>
+            <a:r>
+              <a:rPr lang="es-ES" sz="1600" dirty="0"/>
+              <a:t> </a:t>
+            </a:r>
+            <a:r>
+              <a:rPr lang="es-ES" sz="1600" dirty="0" err="1"/>
+              <a:t>mplleaflet</a:t>
+            </a:r>
+            <a:r>
+              <a:rPr lang="es-ES" sz="1600" dirty="0"/>
+              <a:t>?)</a:t>
+            </a:r>
+          </a:p>
+          <a:p>
+            <a:pPr marL="285750" indent="-285750">
+              <a:buFontTx/>
+              <a:buChar char="-"/>
+            </a:pPr>
+            <a:r>
+              <a:rPr lang="es-ES" sz="1600" dirty="0"/>
+              <a:t>Reduce </a:t>
+            </a:r>
+            <a:r>
+              <a:rPr lang="es-ES" sz="1600" dirty="0" err="1"/>
+              <a:t>number</a:t>
+            </a:r>
+            <a:r>
+              <a:rPr lang="es-ES" sz="1600" dirty="0"/>
+              <a:t> </a:t>
+            </a:r>
+            <a:r>
+              <a:rPr lang="es-ES" sz="1600" dirty="0" err="1"/>
+              <a:t>of</a:t>
+            </a:r>
+            <a:r>
+              <a:rPr lang="es-ES" sz="1600" dirty="0"/>
+              <a:t> </a:t>
+            </a:r>
+            <a:r>
+              <a:rPr lang="es-ES" sz="1600" dirty="0" err="1"/>
+              <a:t>displayed</a:t>
+            </a:r>
+            <a:r>
+              <a:rPr lang="es-ES" sz="1600" dirty="0"/>
+              <a:t> </a:t>
+            </a:r>
+            <a:r>
+              <a:rPr lang="es-ES" sz="1600" dirty="0" err="1"/>
+              <a:t>points</a:t>
+            </a:r>
+            <a:endParaRPr lang="es-ES" sz="1600" dirty="0"/>
+          </a:p>
+          <a:p>
+            <a:pPr marL="285750" indent="-285750">
+              <a:buFontTx/>
+              <a:buChar char="-"/>
+            </a:pPr>
+            <a:r>
+              <a:rPr lang="es-ES" sz="1600" dirty="0" err="1"/>
+              <a:t>Enlarge</a:t>
+            </a:r>
+            <a:r>
+              <a:rPr lang="es-ES" sz="1600" dirty="0"/>
+              <a:t> </a:t>
+            </a:r>
+            <a:r>
+              <a:rPr lang="es-ES" sz="1600" dirty="0" err="1"/>
+              <a:t>max_zoom</a:t>
+            </a:r>
+            <a:r>
+              <a:rPr lang="es-ES" sz="1600" dirty="0"/>
+              <a:t> </a:t>
+            </a:r>
+            <a:r>
+              <a:rPr lang="es-ES" sz="1600" dirty="0" err="1"/>
+              <a:t>constant</a:t>
+            </a:r>
+            <a:endParaRPr lang="es-ES" sz="1600" dirty="0"/>
+          </a:p>
+          <a:p>
+            <a:pPr marL="285750" indent="-285750">
+              <a:buFontTx/>
+              <a:buChar char="-"/>
+            </a:pPr>
+            <a:r>
+              <a:rPr lang="es-ES" sz="1600" b="1" dirty="0" err="1"/>
+              <a:t>On-going</a:t>
+            </a:r>
+            <a:r>
+              <a:rPr lang="es-ES" sz="1600" b="1" dirty="0"/>
+              <a:t>: </a:t>
+            </a:r>
+            <a:r>
+              <a:rPr lang="es-ES" sz="1600" b="1" dirty="0" err="1"/>
+              <a:t>some</a:t>
+            </a:r>
+            <a:r>
+              <a:rPr lang="es-ES" sz="1600" b="1" dirty="0"/>
+              <a:t> tiles are </a:t>
+            </a:r>
+            <a:r>
+              <a:rPr lang="es-ES" sz="1600" b="1" dirty="0" err="1"/>
+              <a:t>not</a:t>
+            </a:r>
+            <a:r>
+              <a:rPr lang="es-ES" sz="1600" b="1" dirty="0"/>
+              <a:t> </a:t>
+            </a:r>
+            <a:r>
+              <a:rPr lang="es-ES" sz="1600" b="1" dirty="0" err="1"/>
+              <a:t>properly</a:t>
+            </a:r>
+            <a:r>
+              <a:rPr lang="es-ES" sz="1600" b="1" dirty="0"/>
+              <a:t> </a:t>
+            </a:r>
+            <a:r>
+              <a:rPr lang="es-ES" sz="1600" b="1" dirty="0" err="1"/>
+              <a:t>shown</a:t>
+            </a:r>
+            <a:r>
+              <a:rPr lang="es-ES" sz="1600" b="1" dirty="0"/>
+              <a:t> in inaccesible </a:t>
+            </a:r>
+            <a:r>
+              <a:rPr lang="es-ES" sz="1600" b="1" dirty="0" err="1"/>
+              <a:t>island</a:t>
+            </a:r>
+            <a:r>
+              <a:rPr lang="es-ES" sz="1600" b="1" dirty="0"/>
+              <a:t> </a:t>
+            </a:r>
+            <a:r>
+              <a:rPr lang="es-ES" sz="1600" b="1" dirty="0" err="1"/>
+              <a:t>tests</a:t>
+            </a:r>
+            <a:endParaRPr lang="es-ES" sz="1600" b="1" dirty="0"/>
           </a:p>
         </p:txBody>
       </p:sp>

</xml_diff>